<commit_message>
v2 PPT updates made
</commit_message>
<xml_diff>
--- a/DS6306 Group Project 1 v2.pptx
+++ b/DS6306 Group Project 1 v2.pptx
@@ -5,24 +5,22 @@
     <p:sldMasterId id="2147483648" r:id="rId1"/>
   </p:sldMasterIdLst>
   <p:notesMasterIdLst>
-    <p:notesMasterId r:id="rId14"/>
+    <p:notesMasterId r:id="rId12"/>
   </p:notesMasterIdLst>
   <p:handoutMasterIdLst>
-    <p:handoutMasterId r:id="rId15"/>
+    <p:handoutMasterId r:id="rId13"/>
   </p:handoutMasterIdLst>
   <p:sldIdLst>
     <p:sldId id="256" r:id="rId2"/>
     <p:sldId id="272" r:id="rId3"/>
     <p:sldId id="271" r:id="rId4"/>
-    <p:sldId id="263" r:id="rId5"/>
-    <p:sldId id="262" r:id="rId6"/>
-    <p:sldId id="261" r:id="rId7"/>
-    <p:sldId id="264" r:id="rId8"/>
-    <p:sldId id="268" r:id="rId9"/>
-    <p:sldId id="265" r:id="rId10"/>
-    <p:sldId id="266" r:id="rId11"/>
-    <p:sldId id="267" r:id="rId12"/>
-    <p:sldId id="273" r:id="rId13"/>
+    <p:sldId id="261" r:id="rId5"/>
+    <p:sldId id="264" r:id="rId6"/>
+    <p:sldId id="268" r:id="rId7"/>
+    <p:sldId id="265" r:id="rId8"/>
+    <p:sldId id="266" r:id="rId9"/>
+    <p:sldId id="267" r:id="rId10"/>
+    <p:sldId id="273" r:id="rId11"/>
   </p:sldIdLst>
   <p:sldSz cx="9144000" cy="5143500" type="screen16x9"/>
   <p:notesSz cx="6858000" cy="9144000"/>
@@ -154,6 +152,237 @@
 </p:presentation>
 </file>
 
+<file path=ppt/revisionInfo.xml><?xml version="1.0" encoding="utf-8"?>
+<p1510:revInfo xmlns:a="http://schemas.openxmlformats.org/drawingml/2006/main" xmlns:r="http://schemas.openxmlformats.org/officeDocument/2006/relationships" xmlns:p1510="http://schemas.microsoft.com/office/powerpoint/2015/10/main">
+  <p1510:revLst>
+    <p1510:client id="{704E13B9-32D7-4A28-92D8-A92CE0D0E976}" v="99" dt="2020-02-28T23:03:38.351"/>
+  </p1510:revLst>
+</p1510:revInfo>
+</file>
+
+<file path=ppt/changesInfos/changesInfo1.xml><?xml version="1.0" encoding="utf-8"?>
+<pc:chgInfo xmlns:a="http://schemas.openxmlformats.org/drawingml/2006/main" xmlns:r="http://schemas.openxmlformats.org/officeDocument/2006/relationships" xmlns:ac="http://schemas.microsoft.com/office/drawing/2013/main/command" xmlns:pc="http://schemas.microsoft.com/office/powerpoint/2013/main/command">
+  <pc:docChgLst>
+    <pc:chgData name="Thad Schwebke" userId="8a3b078b179e4a90" providerId="LiveId" clId="{704E13B9-32D7-4A28-92D8-A92CE0D0E976}"/>
+    <pc:docChg chg="undo custSel modSld">
+      <pc:chgData name="Thad Schwebke" userId="8a3b078b179e4a90" providerId="LiveId" clId="{704E13B9-32D7-4A28-92D8-A92CE0D0E976}" dt="2020-02-28T23:19:44.629" v="1605" actId="33524"/>
+      <pc:docMkLst>
+        <pc:docMk/>
+      </pc:docMkLst>
+      <pc:sldChg chg="modSp mod modNotesTx">
+        <pc:chgData name="Thad Schwebke" userId="8a3b078b179e4a90" providerId="LiveId" clId="{704E13B9-32D7-4A28-92D8-A92CE0D0E976}" dt="2020-02-28T22:04:54.060" v="167" actId="20577"/>
+        <pc:sldMkLst>
+          <pc:docMk/>
+          <pc:sldMk cId="3849262026" sldId="261"/>
+        </pc:sldMkLst>
+        <pc:spChg chg="mod">
+          <ac:chgData name="Thad Schwebke" userId="8a3b078b179e4a90" providerId="LiveId" clId="{704E13B9-32D7-4A28-92D8-A92CE0D0E976}" dt="2020-02-28T21:52:23.770" v="12" actId="20577"/>
+          <ac:spMkLst>
+            <pc:docMk/>
+            <pc:sldMk cId="3849262026" sldId="261"/>
+            <ac:spMk id="13" creationId="{3AEE4A84-F268-4FBB-BBBF-E08ACC13DA49}"/>
+          </ac:spMkLst>
+        </pc:spChg>
+      </pc:sldChg>
+      <pc:sldChg chg="addSp delSp modSp mod modNotesTx">
+        <pc:chgData name="Thad Schwebke" userId="8a3b078b179e4a90" providerId="LiveId" clId="{704E13B9-32D7-4A28-92D8-A92CE0D0E976}" dt="2020-02-28T23:16:36.045" v="1337" actId="20577"/>
+        <pc:sldMkLst>
+          <pc:docMk/>
+          <pc:sldMk cId="2663868610" sldId="264"/>
+        </pc:sldMkLst>
+        <pc:spChg chg="add mod">
+          <ac:chgData name="Thad Schwebke" userId="8a3b078b179e4a90" providerId="LiveId" clId="{704E13B9-32D7-4A28-92D8-A92CE0D0E976}" dt="2020-02-28T23:16:36.045" v="1337" actId="20577"/>
+          <ac:spMkLst>
+            <pc:docMk/>
+            <pc:sldMk cId="2663868610" sldId="264"/>
+            <ac:spMk id="3" creationId="{74882E81-5526-42AC-A6FF-41F41DF63B40}"/>
+          </ac:spMkLst>
+        </pc:spChg>
+        <pc:spChg chg="add mod">
+          <ac:chgData name="Thad Schwebke" userId="8a3b078b179e4a90" providerId="LiveId" clId="{704E13B9-32D7-4A28-92D8-A92CE0D0E976}" dt="2020-02-28T22:40:39.010" v="576" actId="1036"/>
+          <ac:spMkLst>
+            <pc:docMk/>
+            <pc:sldMk cId="2663868610" sldId="264"/>
+            <ac:spMk id="5" creationId="{2C90659F-55B5-4268-93E8-9FE2ADD9FE80}"/>
+          </ac:spMkLst>
+        </pc:spChg>
+        <pc:spChg chg="add del mod">
+          <ac:chgData name="Thad Schwebke" userId="8a3b078b179e4a90" providerId="LiveId" clId="{704E13B9-32D7-4A28-92D8-A92CE0D0E976}" dt="2020-02-28T22:20:38.938" v="281" actId="478"/>
+          <ac:spMkLst>
+            <pc:docMk/>
+            <pc:sldMk cId="2663868610" sldId="264"/>
+            <ac:spMk id="6" creationId="{9326970A-F845-4346-A01B-FAB052929860}"/>
+          </ac:spMkLst>
+        </pc:spChg>
+        <pc:spChg chg="add mod">
+          <ac:chgData name="Thad Schwebke" userId="8a3b078b179e4a90" providerId="LiveId" clId="{704E13B9-32D7-4A28-92D8-A92CE0D0E976}" dt="2020-02-28T22:40:44.261" v="578" actId="1035"/>
+          <ac:spMkLst>
+            <pc:docMk/>
+            <pc:sldMk cId="2663868610" sldId="264"/>
+            <ac:spMk id="7" creationId="{8096F17D-6248-417E-A780-BE3D7A4F4E55}"/>
+          </ac:spMkLst>
+        </pc:spChg>
+        <pc:spChg chg="add mod">
+          <ac:chgData name="Thad Schwebke" userId="8a3b078b179e4a90" providerId="LiveId" clId="{704E13B9-32D7-4A28-92D8-A92CE0D0E976}" dt="2020-02-28T22:40:49.895" v="580" actId="1035"/>
+          <ac:spMkLst>
+            <pc:docMk/>
+            <pc:sldMk cId="2663868610" sldId="264"/>
+            <ac:spMk id="8" creationId="{612B8AB7-AF78-4751-955A-0A095D0B171F}"/>
+          </ac:spMkLst>
+        </pc:spChg>
+        <pc:spChg chg="add mod">
+          <ac:chgData name="Thad Schwebke" userId="8a3b078b179e4a90" providerId="LiveId" clId="{704E13B9-32D7-4A28-92D8-A92CE0D0E976}" dt="2020-02-28T22:40:59.932" v="585" actId="1037"/>
+          <ac:spMkLst>
+            <pc:docMk/>
+            <pc:sldMk cId="2663868610" sldId="264"/>
+            <ac:spMk id="9" creationId="{E37FECA1-0D5F-42F0-BCAA-F29A29D6596F}"/>
+          </ac:spMkLst>
+        </pc:spChg>
+        <pc:picChg chg="del">
+          <ac:chgData name="Thad Schwebke" userId="8a3b078b179e4a90" providerId="LiveId" clId="{704E13B9-32D7-4A28-92D8-A92CE0D0E976}" dt="2020-02-28T22:39:09.919" v="560" actId="478"/>
+          <ac:picMkLst>
+            <pc:docMk/>
+            <pc:sldMk cId="2663868610" sldId="264"/>
+            <ac:picMk id="4" creationId="{1FA308B8-1B1A-48F8-B418-8FA3D89BFF1F}"/>
+          </ac:picMkLst>
+        </pc:picChg>
+        <pc:picChg chg="add mod">
+          <ac:chgData name="Thad Schwebke" userId="8a3b078b179e4a90" providerId="LiveId" clId="{704E13B9-32D7-4A28-92D8-A92CE0D0E976}" dt="2020-02-28T22:40:17.479" v="570" actId="1038"/>
+          <ac:picMkLst>
+            <pc:docMk/>
+            <pc:sldMk cId="2663868610" sldId="264"/>
+            <ac:picMk id="1026" creationId="{F6925CE4-416A-4DC9-8FF4-3CF120BD9CD7}"/>
+          </ac:picMkLst>
+        </pc:picChg>
+      </pc:sldChg>
+      <pc:sldChg chg="addSp delSp modSp mod">
+        <pc:chgData name="Thad Schwebke" userId="8a3b078b179e4a90" providerId="LiveId" clId="{704E13B9-32D7-4A28-92D8-A92CE0D0E976}" dt="2020-02-28T23:01:20.723" v="1102" actId="20577"/>
+        <pc:sldMkLst>
+          <pc:docMk/>
+          <pc:sldMk cId="245379799" sldId="265"/>
+        </pc:sldMkLst>
+        <pc:spChg chg="add mod">
+          <ac:chgData name="Thad Schwebke" userId="8a3b078b179e4a90" providerId="LiveId" clId="{704E13B9-32D7-4A28-92D8-A92CE0D0E976}" dt="2020-02-28T23:01:20.723" v="1102" actId="20577"/>
+          <ac:spMkLst>
+            <pc:docMk/>
+            <pc:sldMk cId="245379799" sldId="265"/>
+            <ac:spMk id="7" creationId="{E0FA0565-B86C-447A-930A-4F644DA70F73}"/>
+          </ac:spMkLst>
+        </pc:spChg>
+        <pc:picChg chg="del mod">
+          <ac:chgData name="Thad Schwebke" userId="8a3b078b179e4a90" providerId="LiveId" clId="{704E13B9-32D7-4A28-92D8-A92CE0D0E976}" dt="2020-02-28T22:45:02.129" v="617" actId="478"/>
+          <ac:picMkLst>
+            <pc:docMk/>
+            <pc:sldMk cId="245379799" sldId="265"/>
+            <ac:picMk id="5" creationId="{783DD891-5D34-446E-9988-4CC3B77CB1F1}"/>
+          </ac:picMkLst>
+        </pc:picChg>
+        <pc:picChg chg="del mod">
+          <ac:chgData name="Thad Schwebke" userId="8a3b078b179e4a90" providerId="LiveId" clId="{704E13B9-32D7-4A28-92D8-A92CE0D0E976}" dt="2020-02-28T22:45:03.842" v="618" actId="478"/>
+          <ac:picMkLst>
+            <pc:docMk/>
+            <pc:sldMk cId="245379799" sldId="265"/>
+            <ac:picMk id="6" creationId="{CB821A3B-407E-4F72-B7F8-A7D4A975031E}"/>
+          </ac:picMkLst>
+        </pc:picChg>
+        <pc:picChg chg="add mod">
+          <ac:chgData name="Thad Schwebke" userId="8a3b078b179e4a90" providerId="LiveId" clId="{704E13B9-32D7-4A28-92D8-A92CE0D0E976}" dt="2020-02-28T22:45:52.191" v="628" actId="1036"/>
+          <ac:picMkLst>
+            <pc:docMk/>
+            <pc:sldMk cId="245379799" sldId="265"/>
+            <ac:picMk id="2050" creationId="{E68324F2-06F6-44DF-A810-517B2049BB93}"/>
+          </ac:picMkLst>
+        </pc:picChg>
+        <pc:picChg chg="add mod">
+          <ac:chgData name="Thad Schwebke" userId="8a3b078b179e4a90" providerId="LiveId" clId="{704E13B9-32D7-4A28-92D8-A92CE0D0E976}" dt="2020-02-28T22:45:52.191" v="628" actId="1036"/>
+          <ac:picMkLst>
+            <pc:docMk/>
+            <pc:sldMk cId="245379799" sldId="265"/>
+            <ac:picMk id="2052" creationId="{5CFEAA06-4EA4-4AA6-8893-E43263412426}"/>
+          </ac:picMkLst>
+        </pc:picChg>
+      </pc:sldChg>
+      <pc:sldChg chg="addSp modSp mod">
+        <pc:chgData name="Thad Schwebke" userId="8a3b078b179e4a90" providerId="LiveId" clId="{704E13B9-32D7-4A28-92D8-A92CE0D0E976}" dt="2020-02-28T23:19:44.629" v="1605" actId="33524"/>
+        <pc:sldMkLst>
+          <pc:docMk/>
+          <pc:sldMk cId="1387322310" sldId="266"/>
+        </pc:sldMkLst>
+        <pc:spChg chg="add mod">
+          <ac:chgData name="Thad Schwebke" userId="8a3b078b179e4a90" providerId="LiveId" clId="{704E13B9-32D7-4A28-92D8-A92CE0D0E976}" dt="2020-02-28T23:19:44.629" v="1605" actId="33524"/>
+          <ac:spMkLst>
+            <pc:docMk/>
+            <pc:sldMk cId="1387322310" sldId="266"/>
+            <ac:spMk id="8" creationId="{827C587C-DA10-4965-BD51-C25071B901C4}"/>
+          </ac:spMkLst>
+        </pc:spChg>
+      </pc:sldChg>
+      <pc:sldChg chg="addSp modSp mod">
+        <pc:chgData name="Thad Schwebke" userId="8a3b078b179e4a90" providerId="LiveId" clId="{704E13B9-32D7-4A28-92D8-A92CE0D0E976}" dt="2020-02-28T23:17:18.400" v="1392" actId="20577"/>
+        <pc:sldMkLst>
+          <pc:docMk/>
+          <pc:sldMk cId="4003640020" sldId="267"/>
+        </pc:sldMkLst>
+        <pc:spChg chg="add mod">
+          <ac:chgData name="Thad Schwebke" userId="8a3b078b179e4a90" providerId="LiveId" clId="{704E13B9-32D7-4A28-92D8-A92CE0D0E976}" dt="2020-02-28T23:17:18.400" v="1392" actId="20577"/>
+          <ac:spMkLst>
+            <pc:docMk/>
+            <pc:sldMk cId="4003640020" sldId="267"/>
+            <ac:spMk id="3" creationId="{B931521C-8D09-4634-A177-CE683FD68DFA}"/>
+          </ac:spMkLst>
+        </pc:spChg>
+      </pc:sldChg>
+      <pc:sldChg chg="addSp modSp mod">
+        <pc:chgData name="Thad Schwebke" userId="8a3b078b179e4a90" providerId="LiveId" clId="{704E13B9-32D7-4A28-92D8-A92CE0D0E976}" dt="2020-02-28T22:52:15.367" v="815" actId="1076"/>
+        <pc:sldMkLst>
+          <pc:docMk/>
+          <pc:sldMk cId="2005336270" sldId="268"/>
+        </pc:sldMkLst>
+        <pc:spChg chg="add mod">
+          <ac:chgData name="Thad Schwebke" userId="8a3b078b179e4a90" providerId="LiveId" clId="{704E13B9-32D7-4A28-92D8-A92CE0D0E976}" dt="2020-02-28T22:52:15.367" v="815" actId="1076"/>
+          <ac:spMkLst>
+            <pc:docMk/>
+            <pc:sldMk cId="2005336270" sldId="268"/>
+            <ac:spMk id="5" creationId="{5EF3F279-2AC6-4FC8-AE6A-1D976E15B713}"/>
+          </ac:spMkLst>
+        </pc:spChg>
+        <pc:picChg chg="mod">
+          <ac:chgData name="Thad Schwebke" userId="8a3b078b179e4a90" providerId="LiveId" clId="{704E13B9-32D7-4A28-92D8-A92CE0D0E976}" dt="2020-02-28T22:44:18.038" v="608" actId="1076"/>
+          <ac:picMkLst>
+            <pc:docMk/>
+            <pc:sldMk cId="2005336270" sldId="268"/>
+            <ac:picMk id="6" creationId="{373817C9-89CA-46E9-AB0D-999F923AEB79}"/>
+          </ac:picMkLst>
+        </pc:picChg>
+        <pc:picChg chg="mod">
+          <ac:chgData name="Thad Schwebke" userId="8a3b078b179e4a90" providerId="LiveId" clId="{704E13B9-32D7-4A28-92D8-A92CE0D0E976}" dt="2020-02-28T22:44:14.601" v="607" actId="1076"/>
+          <ac:picMkLst>
+            <pc:docMk/>
+            <pc:sldMk cId="2005336270" sldId="268"/>
+            <ac:picMk id="7" creationId="{A1CB0376-FE9D-4869-8DFA-36E7B01214B8}"/>
+          </ac:picMkLst>
+        </pc:picChg>
+      </pc:sldChg>
+      <pc:sldChg chg="modSp mod">
+        <pc:chgData name="Thad Schwebke" userId="8a3b078b179e4a90" providerId="LiveId" clId="{704E13B9-32D7-4A28-92D8-A92CE0D0E976}" dt="2020-02-28T21:38:41.253" v="4" actId="20577"/>
+        <pc:sldMkLst>
+          <pc:docMk/>
+          <pc:sldMk cId="832593484" sldId="271"/>
+        </pc:sldMkLst>
+        <pc:spChg chg="mod">
+          <ac:chgData name="Thad Schwebke" userId="8a3b078b179e4a90" providerId="LiveId" clId="{704E13B9-32D7-4A28-92D8-A92CE0D0E976}" dt="2020-02-28T21:38:41.253" v="4" actId="20577"/>
+          <ac:spMkLst>
+            <pc:docMk/>
+            <pc:sldMk cId="832593484" sldId="271"/>
+            <ac:spMk id="11" creationId="{A2387AF3-1DA3-4623-8B20-25111713E76F}"/>
+          </ac:spMkLst>
+        </pc:spChg>
+      </pc:sldChg>
+    </pc:docChg>
+  </pc:docChgLst>
+</pc:chgInfo>
+</file>
+
 <file path=ppt/handoutMasters/handoutMaster1.xml><?xml version="1.0" encoding="utf-8"?>
 <p:handoutMaster xmlns:a="http://schemas.openxmlformats.org/drawingml/2006/main" xmlns:r="http://schemas.openxmlformats.org/officeDocument/2006/relationships" xmlns:p="http://schemas.openxmlformats.org/presentationml/2006/main">
   <p:cSld>
@@ -236,7 +465,7 @@
           <a:p>
             <a:fld id="{4AECD13F-9E93-4C57-A5BD-336347054114}" type="datetimeFigureOut">
               <a:rPr lang="en-US" smtClean="0"/>
-              <a:t>2/23/2020</a:t>
+              <a:t>2/28/2020</a:t>
             </a:fld>
             <a:endParaRPr lang="en-US"/>
           </a:p>
@@ -401,7 +630,7 @@
           <a:p>
             <a:fld id="{621D9606-6FF7-49AF-A412-4D6AB767DFC4}" type="datetimeFigureOut">
               <a:rPr lang="en-US" smtClean="0"/>
-              <a:t>2/23/2020</a:t>
+              <a:t>2/28/2020</a:t>
             </a:fld>
             <a:endParaRPr lang="en-US"/>
           </a:p>
@@ -777,241 +1006,6 @@
 </p:notes>
 </file>
 
-<file path=ppt/notesSlides/notesSlide10.xml><?xml version="1.0" encoding="utf-8"?>
-<p:notes xmlns:a="http://schemas.openxmlformats.org/drawingml/2006/main" xmlns:r="http://schemas.openxmlformats.org/officeDocument/2006/relationships" xmlns:p="http://schemas.openxmlformats.org/presentationml/2006/main">
-  <p:cSld>
-    <p:spTree>
-      <p:nvGrpSpPr>
-        <p:cNvPr id="1" name=""/>
-        <p:cNvGrpSpPr/>
-        <p:nvPr/>
-      </p:nvGrpSpPr>
-      <p:grpSpPr>
-        <a:xfrm>
-          <a:off x="0" y="0"/>
-          <a:ext cx="0" cy="0"/>
-          <a:chOff x="0" y="0"/>
-          <a:chExt cx="0" cy="0"/>
-        </a:xfrm>
-      </p:grpSpPr>
-      <p:sp>
-        <p:nvSpPr>
-          <p:cNvPr id="2" name="Slide Image Placeholder 1"/>
-          <p:cNvSpPr>
-            <a:spLocks noGrp="1" noRot="1" noChangeAspect="1"/>
-          </p:cNvSpPr>
-          <p:nvPr>
-            <p:ph type="sldImg"/>
-          </p:nvPr>
-        </p:nvSpPr>
-        <p:spPr/>
-      </p:sp>
-      <p:sp>
-        <p:nvSpPr>
-          <p:cNvPr id="3" name="Notes Placeholder 2"/>
-          <p:cNvSpPr>
-            <a:spLocks noGrp="1"/>
-          </p:cNvSpPr>
-          <p:nvPr>
-            <p:ph type="body" idx="1"/>
-          </p:nvPr>
-        </p:nvSpPr>
-        <p:spPr/>
-        <p:txBody>
-          <a:bodyPr/>
-          <a:lstStyle/>
-          <a:p>
-            <a:pPr marL="0" marR="0" lvl="0" indent="0" algn="l" defTabSz="914400" rtl="0" eaLnBrk="1" fontAlgn="auto" latinLnBrk="0" hangingPunct="1">
-              <a:lnSpc>
-                <a:spcPct val="100000"/>
-              </a:lnSpc>
-              <a:spcBef>
-                <a:spcPts val="0"/>
-              </a:spcBef>
-              <a:spcAft>
-                <a:spcPts val="0"/>
-              </a:spcAft>
-              <a:buClrTx/>
-              <a:buSzTx/>
-              <a:buFontTx/>
-              <a:buNone/>
-              <a:tabLst/>
-              <a:defRPr/>
-            </a:pPr>
-            <a:r>
-              <a:rPr lang="en-US" dirty="0"/>
-              <a:t>Speaker: Thad Schwebke</a:t>
-            </a:r>
-          </a:p>
-          <a:p>
-            <a:endParaRPr lang="en-US" dirty="0"/>
-          </a:p>
-          <a:p>
-            <a:r>
-              <a:rPr lang="en-US" dirty="0"/>
-              <a:t>Notes: The histogram shows that the ABV data is normally distributed, but appears to have some small outliers on both ends. The two box plots illustrate that IPA has a higher overall median ABV at ~.8 ABV, however Other has several outliers that sit above the median (i.e. several greater than .12 ABV). 19.2 ounce beers tend to have the higher ABV, but the 16 ounces has a few outliers on the high side. One could also argue that 8.4 ounce beers has the highest median. The problem with this would be the number of observations that were 8.4 ounces. It appears to be a single observation.</a:t>
-            </a:r>
-          </a:p>
-          <a:p>
-            <a:endParaRPr lang="en-US" dirty="0"/>
-          </a:p>
-          <a:p>
-            <a:endParaRPr lang="en-US" dirty="0"/>
-          </a:p>
-        </p:txBody>
-      </p:sp>
-      <p:sp>
-        <p:nvSpPr>
-          <p:cNvPr id="4" name="Slide Number Placeholder 3"/>
-          <p:cNvSpPr>
-            <a:spLocks noGrp="1"/>
-          </p:cNvSpPr>
-          <p:nvPr>
-            <p:ph type="sldNum" sz="quarter" idx="5"/>
-          </p:nvPr>
-        </p:nvSpPr>
-        <p:spPr/>
-        <p:txBody>
-          <a:bodyPr/>
-          <a:lstStyle/>
-          <a:p>
-            <a:fld id="{274AE7AE-FCBF-419F-971E-04B351FA8EC0}" type="slidenum">
-              <a:rPr lang="en-US" smtClean="0"/>
-              <a:t>10</a:t>
-            </a:fld>
-            <a:endParaRPr lang="en-US"/>
-          </a:p>
-        </p:txBody>
-      </p:sp>
-    </p:spTree>
-    <p:extLst>
-      <p:ext uri="{BB962C8B-B14F-4D97-AF65-F5344CB8AC3E}">
-        <p14:creationId xmlns:p14="http://schemas.microsoft.com/office/powerpoint/2010/main" val="38672616"/>
-      </p:ext>
-    </p:extLst>
-  </p:cSld>
-  <p:clrMapOvr>
-    <a:masterClrMapping/>
-  </p:clrMapOvr>
-</p:notes>
-</file>
-
-<file path=ppt/notesSlides/notesSlide11.xml><?xml version="1.0" encoding="utf-8"?>
-<p:notes xmlns:a="http://schemas.openxmlformats.org/drawingml/2006/main" xmlns:r="http://schemas.openxmlformats.org/officeDocument/2006/relationships" xmlns:p="http://schemas.openxmlformats.org/presentationml/2006/main">
-  <p:cSld>
-    <p:spTree>
-      <p:nvGrpSpPr>
-        <p:cNvPr id="1" name=""/>
-        <p:cNvGrpSpPr/>
-        <p:nvPr/>
-      </p:nvGrpSpPr>
-      <p:grpSpPr>
-        <a:xfrm>
-          <a:off x="0" y="0"/>
-          <a:ext cx="0" cy="0"/>
-          <a:chOff x="0" y="0"/>
-          <a:chExt cx="0" cy="0"/>
-        </a:xfrm>
-      </p:grpSpPr>
-      <p:sp>
-        <p:nvSpPr>
-          <p:cNvPr id="2" name="Slide Image Placeholder 1"/>
-          <p:cNvSpPr>
-            <a:spLocks noGrp="1" noRot="1" noChangeAspect="1"/>
-          </p:cNvSpPr>
-          <p:nvPr>
-            <p:ph type="sldImg"/>
-          </p:nvPr>
-        </p:nvSpPr>
-        <p:spPr/>
-      </p:sp>
-      <p:sp>
-        <p:nvSpPr>
-          <p:cNvPr id="3" name="Notes Placeholder 2"/>
-          <p:cNvSpPr>
-            <a:spLocks noGrp="1"/>
-          </p:cNvSpPr>
-          <p:nvPr>
-            <p:ph type="body" idx="1"/>
-          </p:nvPr>
-        </p:nvSpPr>
-        <p:spPr/>
-        <p:txBody>
-          <a:bodyPr/>
-          <a:lstStyle/>
-          <a:p>
-            <a:pPr marL="0" marR="0" lvl="0" indent="0" algn="l" defTabSz="914400" rtl="0" eaLnBrk="1" fontAlgn="auto" latinLnBrk="0" hangingPunct="1">
-              <a:lnSpc>
-                <a:spcPct val="100000"/>
-              </a:lnSpc>
-              <a:spcBef>
-                <a:spcPts val="0"/>
-              </a:spcBef>
-              <a:spcAft>
-                <a:spcPts val="0"/>
-              </a:spcAft>
-              <a:buClrTx/>
-              <a:buSzTx/>
-              <a:buFontTx/>
-              <a:buNone/>
-              <a:tabLst/>
-              <a:defRPr/>
-            </a:pPr>
-            <a:r>
-              <a:rPr lang="en-US" dirty="0"/>
-              <a:t>Speaker: Thad Schwebke</a:t>
-            </a:r>
-          </a:p>
-          <a:p>
-            <a:endParaRPr lang="en-US" dirty="0"/>
-          </a:p>
-          <a:p>
-            <a:r>
-              <a:rPr lang="en-US" dirty="0"/>
-              <a:t>Notes: The dot plot illustrates what appears to  be a positive linear relationship between the ABB and IBU. The addition of the trend line somewhat confirms the presence of a positive linear relationship between the ABV and IBU. More analysis would be needed to confirm.</a:t>
-            </a:r>
-          </a:p>
-          <a:p>
-            <a:endParaRPr lang="en-US" dirty="0"/>
-          </a:p>
-        </p:txBody>
-      </p:sp>
-      <p:sp>
-        <p:nvSpPr>
-          <p:cNvPr id="4" name="Slide Number Placeholder 3"/>
-          <p:cNvSpPr>
-            <a:spLocks noGrp="1"/>
-          </p:cNvSpPr>
-          <p:nvPr>
-            <p:ph type="sldNum" sz="quarter" idx="5"/>
-          </p:nvPr>
-        </p:nvSpPr>
-        <p:spPr/>
-        <p:txBody>
-          <a:bodyPr/>
-          <a:lstStyle/>
-          <a:p>
-            <a:fld id="{274AE7AE-FCBF-419F-971E-04B351FA8EC0}" type="slidenum">
-              <a:rPr lang="en-US" smtClean="0"/>
-              <a:t>11</a:t>
-            </a:fld>
-            <a:endParaRPr lang="en-US"/>
-          </a:p>
-        </p:txBody>
-      </p:sp>
-    </p:spTree>
-    <p:extLst>
-      <p:ext uri="{BB962C8B-B14F-4D97-AF65-F5344CB8AC3E}">
-        <p14:creationId xmlns:p14="http://schemas.microsoft.com/office/powerpoint/2010/main" val="3427665525"/>
-      </p:ext>
-    </p:extLst>
-  </p:cSld>
-  <p:clrMapOvr>
-    <a:masterClrMapping/>
-  </p:clrMapOvr>
-</p:notes>
-</file>
-
 <file path=ppt/notesSlides/notesSlide2.xml><?xml version="1.0" encoding="utf-8"?>
 <p:notes xmlns:a="http://schemas.openxmlformats.org/drawingml/2006/main" xmlns:r="http://schemas.openxmlformats.org/officeDocument/2006/relationships" xmlns:p="http://schemas.openxmlformats.org/presentationml/2006/main">
   <p:cSld>
@@ -1216,6 +1210,62 @@
           <a:p>
             <a:endParaRPr lang="en-US" dirty="0"/>
           </a:p>
+          <a:p>
+            <a:r>
+              <a:rPr lang="en-US" sz="1200" b="0" i="1" kern="1200" dirty="0">
+                <a:solidFill>
+                  <a:schemeClr val="tx1"/>
+                </a:solidFill>
+                <a:effectLst/>
+                <a:latin typeface="+mn-lt"/>
+                <a:ea typeface="+mn-ea"/>
+                <a:cs typeface="+mn-cs"/>
+              </a:rPr>
+              <a:t>There are 62 (2.57%) observations where both ABV and IBU are empty, 943 (41.7%) observations where only IBU is empty. </a:t>
+            </a:r>
+          </a:p>
+          <a:p>
+            <a:r>
+              <a:rPr lang="en-US" sz="1200" b="0" i="1" kern="1200" dirty="0">
+                <a:solidFill>
+                  <a:schemeClr val="tx1"/>
+                </a:solidFill>
+                <a:effectLst/>
+                <a:latin typeface="+mn-lt"/>
+                <a:ea typeface="+mn-ea"/>
+                <a:cs typeface="+mn-cs"/>
+              </a:rPr>
+              <a:t>For all observations that had both only IBU empty, the NA value was changed to zero since having a non-bitter alcoholic beer is possible. Whereas we choose not to include any observations that had zero ABV. That just isn’t a real beer. This leaves us with only 2.57% of the observations not being used.</a:t>
+            </a:r>
+          </a:p>
+          <a:p>
+            <a:endParaRPr lang="en-US" sz="1200" b="0" i="1" kern="1200" dirty="0">
+              <a:solidFill>
+                <a:schemeClr val="tx1"/>
+              </a:solidFill>
+              <a:effectLst/>
+              <a:latin typeface="+mn-lt"/>
+              <a:ea typeface="+mn-ea"/>
+              <a:cs typeface="+mn-cs"/>
+            </a:endParaRPr>
+          </a:p>
+          <a:p>
+            <a:r>
+              <a:rPr lang="en-US" sz="1200" b="0" i="1" kern="1200" dirty="0">
+                <a:solidFill>
+                  <a:schemeClr val="tx1"/>
+                </a:solidFill>
+                <a:effectLst/>
+                <a:latin typeface="+mn-lt"/>
+                <a:ea typeface="+mn-ea"/>
+                <a:cs typeface="+mn-cs"/>
+              </a:rPr>
+              <a:t>This is how we addressed missing values, there are 2.6% of observations where both ABV and IBU are empty and 41.7% of total observations just IBU, which are empty. We made some realistic assumption that, a beer can exist without bitterness but probably not without alcohol. So, we have excluded all the ABV observations with NA’s and replaced IBU NA’s with zeros </a:t>
+            </a:r>
+          </a:p>
+          <a:p>
+            <a:endParaRPr lang="en-US" dirty="0"/>
+          </a:p>
         </p:txBody>
       </p:sp>
       <p:sp>
@@ -1300,7 +1350,7 @@
           <a:p>
             <a:r>
               <a:rPr lang="en-US" dirty="0"/>
-              <a:t>Speaker: Rajesh</a:t>
+              <a:t>Speaker: Kris</a:t>
             </a:r>
           </a:p>
           <a:p>
@@ -1308,59 +1358,54 @@
               <a:rPr lang="en-US" dirty="0"/>
               <a:t>Notes: </a:t>
             </a:r>
+          </a:p>
+          <a:p>
             <a:r>
-              <a:rPr lang="en-US" sz="1200" b="0" i="1" kern="1200" dirty="0">
-                <a:solidFill>
-                  <a:schemeClr val="tx1"/>
-                </a:solidFill>
-                <a:effectLst/>
-                <a:latin typeface="+mn-lt"/>
-                <a:ea typeface="+mn-ea"/>
-                <a:cs typeface="+mn-cs"/>
-              </a:rPr>
-              <a:t>There are 62 (2.57%) observations where both ABV and IBU are empty, 943 (41.7%) observations where only IBU is empty. </a:t>
+              <a:rPr lang="en-US" dirty="0"/>
+              <a:t>The top 5 breweries make up 31.3% of the breweries in the US.</a:t>
+            </a:r>
+          </a:p>
+          <a:p>
+            <a:endParaRPr lang="en-US" dirty="0"/>
+          </a:p>
+          <a:p>
+            <a:r>
+              <a:rPr lang="en-US" dirty="0"/>
+              <a:t>Colorado has 47 breweries which is 8 more than California which is second with 39 breweries. </a:t>
             </a:r>
           </a:p>
           <a:p>
             <a:r>
-              <a:rPr lang="en-US" sz="1200" b="0" i="1" kern="1200" dirty="0">
-                <a:solidFill>
-                  <a:schemeClr val="tx1"/>
-                </a:solidFill>
-                <a:effectLst/>
-                <a:latin typeface="+mn-lt"/>
-                <a:ea typeface="+mn-ea"/>
-                <a:cs typeface="+mn-cs"/>
-              </a:rPr>
-              <a:t>For all observations that had both only IBU empty, the NA value was changed to zero since having a non-bitter alcoholic beer is possible. Whereas we choose not to include any observations that had zero ABV. That just isn’t a real beer. This leaves us with only 2.57% of the observations not being used.</a:t>
+              <a:rPr lang="en-US" dirty="0"/>
+              <a:t>4 states (DC, N Dakota, S Dakota, and West Virginia) only had 1 brewery</a:t>
             </a:r>
           </a:p>
           <a:p>
-            <a:endParaRPr lang="en-US" sz="1200" b="0" i="1" kern="1200" dirty="0">
-              <a:solidFill>
-                <a:schemeClr val="tx1"/>
-              </a:solidFill>
-              <a:effectLst/>
-              <a:latin typeface="+mn-lt"/>
-              <a:ea typeface="+mn-ea"/>
-              <a:cs typeface="+mn-cs"/>
-            </a:endParaRPr>
+            <a:r>
+              <a:rPr lang="en-US" dirty="0"/>
+              <a:t> and 4 more states (Arkansas, Delaware, Mississippi, and Nevada) only have two breweries. </a:t>
+            </a:r>
           </a:p>
           <a:p>
             <a:r>
-              <a:rPr lang="en-US" sz="1200" b="0" i="1" kern="1200" dirty="0">
-                <a:solidFill>
-                  <a:schemeClr val="tx1"/>
-                </a:solidFill>
-                <a:effectLst/>
-                <a:latin typeface="+mn-lt"/>
-                <a:ea typeface="+mn-ea"/>
-                <a:cs typeface="+mn-cs"/>
-              </a:rPr>
-              <a:t>This is how we addressed missing values, there are 2.6% of observations where both ABV and IBU are empty and 41.7% of total observations just IBU, which are empty. We made some realistic assumption that, a beer can exist without bitterness but probably not without alcohol. So, we have excluded all the ABV observations with NA’s and replaced IBU NA’s with zeros </a:t>
+              <a:rPr lang="en-US" dirty="0"/>
+              <a:t>Nevada was a shock due to it being the home of Las Vegas. The highest number of breweries appears to be west of the Mississippi river. However, the northeast united states has its fair share.</a:t>
             </a:r>
           </a:p>
           <a:p>
+            <a:endParaRPr lang="en-US" dirty="0"/>
+          </a:p>
+          <a:p>
+            <a:r>
+              <a:rPr lang="en-US" dirty="0"/>
+              <a:t>Beer Consumption Per Capita comes from </a:t>
+            </a:r>
+            <a:r>
+              <a:rPr lang="en-US" dirty="0">
+                <a:hlinkClick r:id="rId3"/>
+              </a:rPr>
+              <a:t>https://www.visualcapitalist.com/united-states-of-beer/</a:t>
+            </a:r>
             <a:endParaRPr lang="en-US" dirty="0"/>
           </a:p>
           <a:p>
@@ -1394,7 +1439,7 @@
     </p:spTree>
     <p:extLst>
       <p:ext uri="{BB962C8B-B14F-4D97-AF65-F5344CB8AC3E}">
-        <p14:creationId xmlns:p14="http://schemas.microsoft.com/office/powerpoint/2010/main" val="550434963"/>
+        <p14:creationId xmlns:p14="http://schemas.microsoft.com/office/powerpoint/2010/main" val="1537315401"/>
       </p:ext>
     </p:extLst>
   </p:cSld>
@@ -1449,128 +1494,22 @@
           <a:lstStyle/>
           <a:p>
             <a:r>
-              <a:rPr lang="en-US" dirty="0"/>
-              <a:t>Speaker: Kris</a:t>
+              <a:rPr lang="en-US" sz="1200" kern="1200" dirty="0">
+                <a:solidFill>
+                  <a:schemeClr val="tx1"/>
+                </a:solidFill>
+                <a:effectLst/>
+                <a:latin typeface="+mn-lt"/>
+                <a:ea typeface="+mn-ea"/>
+                <a:cs typeface="+mn-cs"/>
+              </a:rPr>
+              <a:t>The average ABV is 6%. The middle 50% of the data fall between 5% and 6.7%. You may want to target this range during production. </a:t>
             </a:r>
-          </a:p>
-          <a:p>
-            <a:r>
-              <a:rPr lang="en-US" dirty="0"/>
-              <a:t>Notes: The two </a:t>
-            </a:r>
-            <a:r>
-              <a:rPr lang="en-US" dirty="0" err="1"/>
-              <a:t>dataframes</a:t>
-            </a:r>
-            <a:r>
-              <a:rPr lang="en-US" dirty="0"/>
-              <a:t> were merged by </a:t>
-            </a:r>
-            <a:r>
-              <a:rPr lang="en-US" dirty="0" err="1"/>
-              <a:t>Brewery_id</a:t>
-            </a:r>
-            <a:r>
-              <a:rPr lang="en-US" dirty="0"/>
-              <a:t>, which is common field for joining. </a:t>
-            </a:r>
-          </a:p>
-          <a:p>
-            <a:r>
-              <a:rPr lang="en-US" dirty="0"/>
-              <a:t>Prior to the merge, changing the column names was required to perform the merge. </a:t>
-            </a:r>
-          </a:p>
-          <a:p>
-            <a:r>
-              <a:rPr lang="en-US" dirty="0"/>
-              <a:t>Two records in the merged dataset had cities that were the same but misspelled. Both of those records were cleaned up so the city names were consistent.</a:t>
-            </a:r>
+            <a:endParaRPr lang="en-US" dirty="0"/>
           </a:p>
           <a:p>
             <a:endParaRPr lang="en-US" dirty="0"/>
           </a:p>
-        </p:txBody>
-      </p:sp>
-      <p:sp>
-        <p:nvSpPr>
-          <p:cNvPr id="4" name="Slide Number Placeholder 3"/>
-          <p:cNvSpPr>
-            <a:spLocks noGrp="1"/>
-          </p:cNvSpPr>
-          <p:nvPr>
-            <p:ph type="sldNum" sz="quarter" idx="5"/>
-          </p:nvPr>
-        </p:nvSpPr>
-        <p:spPr/>
-        <p:txBody>
-          <a:bodyPr/>
-          <a:lstStyle/>
-          <a:p>
-            <a:fld id="{274AE7AE-FCBF-419F-971E-04B351FA8EC0}" type="slidenum">
-              <a:rPr lang="en-US" smtClean="0"/>
-              <a:t>5</a:t>
-            </a:fld>
-            <a:endParaRPr lang="en-US"/>
-          </a:p>
-        </p:txBody>
-      </p:sp>
-    </p:spTree>
-    <p:extLst>
-      <p:ext uri="{BB962C8B-B14F-4D97-AF65-F5344CB8AC3E}">
-        <p14:creationId xmlns:p14="http://schemas.microsoft.com/office/powerpoint/2010/main" val="3025096371"/>
-      </p:ext>
-    </p:extLst>
-  </p:cSld>
-  <p:clrMapOvr>
-    <a:masterClrMapping/>
-  </p:clrMapOvr>
-</p:notes>
-</file>
-
-<file path=ppt/notesSlides/notesSlide6.xml><?xml version="1.0" encoding="utf-8"?>
-<p:notes xmlns:a="http://schemas.openxmlformats.org/drawingml/2006/main" xmlns:r="http://schemas.openxmlformats.org/officeDocument/2006/relationships" xmlns:p="http://schemas.openxmlformats.org/presentationml/2006/main">
-  <p:cSld>
-    <p:spTree>
-      <p:nvGrpSpPr>
-        <p:cNvPr id="1" name=""/>
-        <p:cNvGrpSpPr/>
-        <p:nvPr/>
-      </p:nvGrpSpPr>
-      <p:grpSpPr>
-        <a:xfrm>
-          <a:off x="0" y="0"/>
-          <a:ext cx="0" cy="0"/>
-          <a:chOff x="0" y="0"/>
-          <a:chExt cx="0" cy="0"/>
-        </a:xfrm>
-      </p:grpSpPr>
-      <p:sp>
-        <p:nvSpPr>
-          <p:cNvPr id="2" name="Slide Image Placeholder 1"/>
-          <p:cNvSpPr>
-            <a:spLocks noGrp="1" noRot="1" noChangeAspect="1"/>
-          </p:cNvSpPr>
-          <p:nvPr>
-            <p:ph type="sldImg"/>
-          </p:nvPr>
-        </p:nvSpPr>
-        <p:spPr/>
-      </p:sp>
-      <p:sp>
-        <p:nvSpPr>
-          <p:cNvPr id="3" name="Notes Placeholder 2"/>
-          <p:cNvSpPr>
-            <a:spLocks noGrp="1"/>
-          </p:cNvSpPr>
-          <p:nvPr>
-            <p:ph type="body" idx="1"/>
-          </p:nvPr>
-        </p:nvSpPr>
-        <p:spPr/>
-        <p:txBody>
-          <a:bodyPr/>
-          <a:lstStyle/>
           <a:p>
             <a:r>
               <a:rPr lang="en-US" dirty="0"/>
@@ -1578,120 +1517,23 @@
             </a:r>
           </a:p>
           <a:p>
-            <a:r>
-              <a:rPr lang="en-US" dirty="0"/>
-              <a:t>Notes: Colorado has 47 breweries which is 8 more than California which is second with 39 breweries. </a:t>
-            </a:r>
-          </a:p>
-          <a:p>
-            <a:r>
-              <a:rPr lang="en-US" dirty="0"/>
-              <a:t>4 states (DC, N Dakota, S Dakota, and West Virginia) only had 1 brewery</a:t>
-            </a:r>
-          </a:p>
-          <a:p>
-            <a:r>
-              <a:rPr lang="en-US" dirty="0"/>
-              <a:t> and 4 more states (Arkansas, Delaware, Mississippi, and Nevada) only have two breweries. </a:t>
-            </a:r>
-          </a:p>
-          <a:p>
-            <a:r>
-              <a:rPr lang="en-US" dirty="0"/>
-              <a:t>Nevada was a shock due to it being the home of Las Vegas. The highest number of breweries appears to be west of the Mississippi river. However, the northeast united states has its fair share.</a:t>
-            </a:r>
-          </a:p>
-          <a:p>
-            <a:endParaRPr lang="en-US" dirty="0"/>
-          </a:p>
-        </p:txBody>
-      </p:sp>
-      <p:sp>
-        <p:nvSpPr>
-          <p:cNvPr id="4" name="Slide Number Placeholder 3"/>
-          <p:cNvSpPr>
-            <a:spLocks noGrp="1"/>
-          </p:cNvSpPr>
-          <p:nvPr>
-            <p:ph type="sldNum" sz="quarter" idx="5"/>
-          </p:nvPr>
-        </p:nvSpPr>
-        <p:spPr/>
-        <p:txBody>
-          <a:bodyPr/>
-          <a:lstStyle/>
-          <a:p>
-            <a:fld id="{274AE7AE-FCBF-419F-971E-04B351FA8EC0}" type="slidenum">
-              <a:rPr lang="en-US" smtClean="0"/>
-              <a:t>6</a:t>
-            </a:fld>
-            <a:endParaRPr lang="en-US"/>
-          </a:p>
-        </p:txBody>
-      </p:sp>
-    </p:spTree>
-    <p:extLst>
-      <p:ext uri="{BB962C8B-B14F-4D97-AF65-F5344CB8AC3E}">
-        <p14:creationId xmlns:p14="http://schemas.microsoft.com/office/powerpoint/2010/main" val="1537315401"/>
-      </p:ext>
-    </p:extLst>
-  </p:cSld>
-  <p:clrMapOvr>
-    <a:masterClrMapping/>
-  </p:clrMapOvr>
-</p:notes>
-</file>
-
-<file path=ppt/notesSlides/notesSlide7.xml><?xml version="1.0" encoding="utf-8"?>
-<p:notes xmlns:a="http://schemas.openxmlformats.org/drawingml/2006/main" xmlns:r="http://schemas.openxmlformats.org/officeDocument/2006/relationships" xmlns:p="http://schemas.openxmlformats.org/presentationml/2006/main">
-  <p:cSld>
-    <p:spTree>
-      <p:nvGrpSpPr>
-        <p:cNvPr id="1" name=""/>
-        <p:cNvGrpSpPr/>
-        <p:nvPr/>
-      </p:nvGrpSpPr>
-      <p:grpSpPr>
-        <a:xfrm>
-          <a:off x="0" y="0"/>
-          <a:ext cx="0" cy="0"/>
-          <a:chOff x="0" y="0"/>
-          <a:chExt cx="0" cy="0"/>
-        </a:xfrm>
-      </p:grpSpPr>
-      <p:sp>
-        <p:nvSpPr>
-          <p:cNvPr id="2" name="Slide Image Placeholder 1"/>
-          <p:cNvSpPr>
-            <a:spLocks noGrp="1" noRot="1" noChangeAspect="1"/>
-          </p:cNvSpPr>
-          <p:nvPr>
-            <p:ph type="sldImg"/>
-          </p:nvPr>
-        </p:nvSpPr>
-        <p:spPr/>
-      </p:sp>
-      <p:sp>
-        <p:nvSpPr>
-          <p:cNvPr id="3" name="Notes Placeholder 2"/>
-          <p:cNvSpPr>
-            <a:spLocks noGrp="1"/>
-          </p:cNvSpPr>
-          <p:nvPr>
-            <p:ph type="body" idx="1"/>
-          </p:nvPr>
-        </p:nvSpPr>
-        <p:spPr/>
-        <p:txBody>
-          <a:bodyPr/>
-          <a:lstStyle/>
-          <a:p>
-            <a:r>
-              <a:rPr lang="en-US" dirty="0"/>
-              <a:t>Speaker: Kris</a:t>
-            </a:r>
-          </a:p>
-          <a:p>
+            <a:pPr marL="0" marR="0" lvl="0" indent="0" algn="l" defTabSz="914400" rtl="0" eaLnBrk="1" fontAlgn="auto" latinLnBrk="0" hangingPunct="1">
+              <a:lnSpc>
+                <a:spcPct val="100000"/>
+              </a:lnSpc>
+              <a:spcBef>
+                <a:spcPts val="0"/>
+              </a:spcBef>
+              <a:spcAft>
+                <a:spcPts val="0"/>
+              </a:spcAft>
+              <a:buClrTx/>
+              <a:buSzTx/>
+              <a:buFontTx/>
+              <a:buNone/>
+              <a:tabLst/>
+              <a:defRPr/>
+            </a:pPr>
             <a:r>
               <a:rPr lang="en-US" dirty="0"/>
               <a:t>Notes: </a:t>
@@ -1706,8 +1548,17 @@
                 <a:ea typeface="+mn-ea"/>
                 <a:cs typeface="+mn-cs"/>
               </a:rPr>
-              <a:t>The median ABV per state appears somewhat consistent with an overall ABV median of 0.056. </a:t>
+              <a:t>The median ABV per state appears somewhat consistent with an overall ABV median of 0.056, if you exclude the states with zero ABV.</a:t>
             </a:r>
+            <a:endParaRPr lang="en-US" sz="1200" b="0" i="0" kern="1200" dirty="0">
+              <a:solidFill>
+                <a:schemeClr val="tx1"/>
+              </a:solidFill>
+              <a:effectLst/>
+              <a:latin typeface="+mn-lt"/>
+              <a:ea typeface="+mn-ea"/>
+              <a:cs typeface="+mn-cs"/>
+            </a:endParaRPr>
           </a:p>
           <a:p>
             <a:r>
@@ -1720,8 +1571,19 @@
                 <a:ea typeface="+mn-ea"/>
                 <a:cs typeface="+mn-cs"/>
               </a:rPr>
-              <a:t>Kentucky has the highest median at 0.062 ABV and Utah has the lowest at 0.04 ABV. </a:t>
+              <a:t>Nevada has the highest median at 0.0669 ABV and Utah has the lowest at 0.051 ABV. </a:t>
             </a:r>
+          </a:p>
+          <a:p>
+            <a:endParaRPr lang="en-US" sz="1200" b="0" i="1" kern="1200" dirty="0">
+              <a:solidFill>
+                <a:schemeClr val="tx1"/>
+              </a:solidFill>
+              <a:effectLst/>
+              <a:latin typeface="+mn-lt"/>
+              <a:ea typeface="+mn-ea"/>
+              <a:cs typeface="+mn-cs"/>
+            </a:endParaRPr>
           </a:p>
           <a:p>
             <a:r>
@@ -1748,7 +1610,7 @@
                 <a:ea typeface="+mn-ea"/>
                 <a:cs typeface="+mn-cs"/>
               </a:rPr>
-              <a:t>West Virginia has the highest median at 57.5 IBU and Utah has the lowest at 6 IBU if you exclude the states with zero IBU.</a:t>
+              <a:t>West Virginia has the highest median at 57.5 IBU and Arkansas has the lowest at 7.8 IBU if you exclude the states with zero IBU.</a:t>
             </a:r>
             <a:endParaRPr lang="en-US" sz="1200" b="0" i="0" kern="1200" dirty="0">
               <a:solidFill>
@@ -1785,7 +1647,7 @@
           <a:p>
             <a:fld id="{274AE7AE-FCBF-419F-971E-04B351FA8EC0}" type="slidenum">
               <a:rPr lang="en-US" smtClean="0"/>
-              <a:t>7</a:t>
+              <a:t>5</a:t>
             </a:fld>
             <a:endParaRPr lang="en-US"/>
           </a:p>
@@ -1804,7 +1666,7 @@
 </p:notes>
 </file>
 
-<file path=ppt/notesSlides/notesSlide8.xml><?xml version="1.0" encoding="utf-8"?>
+<file path=ppt/notesSlides/notesSlide6.xml><?xml version="1.0" encoding="utf-8"?>
 <p:notes xmlns:a="http://schemas.openxmlformats.org/drawingml/2006/main" xmlns:r="http://schemas.openxmlformats.org/officeDocument/2006/relationships" xmlns:p="http://schemas.openxmlformats.org/presentationml/2006/main">
   <p:cSld>
     <p:spTree>
@@ -1908,7 +1770,7 @@
           <a:p>
             <a:fld id="{274AE7AE-FCBF-419F-971E-04B351FA8EC0}" type="slidenum">
               <a:rPr lang="en-US" smtClean="0"/>
-              <a:t>8</a:t>
+              <a:t>6</a:t>
             </a:fld>
             <a:endParaRPr lang="en-US"/>
           </a:p>
@@ -1927,7 +1789,7 @@
 </p:notes>
 </file>
 
-<file path=ppt/notesSlides/notesSlide9.xml><?xml version="1.0" encoding="utf-8"?>
+<file path=ppt/notesSlides/notesSlide7.xml><?xml version="1.0" encoding="utf-8"?>
 <p:notes xmlns:a="http://schemas.openxmlformats.org/drawingml/2006/main" xmlns:r="http://schemas.openxmlformats.org/officeDocument/2006/relationships" xmlns:p="http://schemas.openxmlformats.org/presentationml/2006/main">
   <p:cSld>
     <p:spTree>
@@ -2017,6 +1879,367 @@
           <a:p>
             <a:fld id="{274AE7AE-FCBF-419F-971E-04B351FA8EC0}" type="slidenum">
               <a:rPr lang="en-US" smtClean="0"/>
+              <a:t>7</a:t>
+            </a:fld>
+            <a:endParaRPr lang="en-US"/>
+          </a:p>
+        </p:txBody>
+      </p:sp>
+    </p:spTree>
+    <p:extLst>
+      <p:ext uri="{BB962C8B-B14F-4D97-AF65-F5344CB8AC3E}">
+        <p14:creationId xmlns:p14="http://schemas.microsoft.com/office/powerpoint/2010/main" val="639101511"/>
+      </p:ext>
+    </p:extLst>
+  </p:cSld>
+  <p:clrMapOvr>
+    <a:masterClrMapping/>
+  </p:clrMapOvr>
+</p:notes>
+</file>
+
+<file path=ppt/notesSlides/notesSlide8.xml><?xml version="1.0" encoding="utf-8"?>
+<p:notes xmlns:a="http://schemas.openxmlformats.org/drawingml/2006/main" xmlns:r="http://schemas.openxmlformats.org/officeDocument/2006/relationships" xmlns:p="http://schemas.openxmlformats.org/presentationml/2006/main">
+  <p:cSld>
+    <p:spTree>
+      <p:nvGrpSpPr>
+        <p:cNvPr id="1" name=""/>
+        <p:cNvGrpSpPr/>
+        <p:nvPr/>
+      </p:nvGrpSpPr>
+      <p:grpSpPr>
+        <a:xfrm>
+          <a:off x="0" y="0"/>
+          <a:ext cx="0" cy="0"/>
+          <a:chOff x="0" y="0"/>
+          <a:chExt cx="0" cy="0"/>
+        </a:xfrm>
+      </p:grpSpPr>
+      <p:sp>
+        <p:nvSpPr>
+          <p:cNvPr id="2" name="Slide Image Placeholder 1"/>
+          <p:cNvSpPr>
+            <a:spLocks noGrp="1" noRot="1" noChangeAspect="1"/>
+          </p:cNvSpPr>
+          <p:nvPr>
+            <p:ph type="sldImg"/>
+          </p:nvPr>
+        </p:nvSpPr>
+        <p:spPr/>
+      </p:sp>
+      <p:sp>
+        <p:nvSpPr>
+          <p:cNvPr id="3" name="Notes Placeholder 2"/>
+          <p:cNvSpPr>
+            <a:spLocks noGrp="1"/>
+          </p:cNvSpPr>
+          <p:nvPr>
+            <p:ph type="body" idx="1"/>
+          </p:nvPr>
+        </p:nvSpPr>
+        <p:spPr/>
+        <p:txBody>
+          <a:bodyPr/>
+          <a:lstStyle/>
+          <a:p>
+            <a:pPr marL="0" marR="0" lvl="0" indent="0" algn="l" defTabSz="914400" rtl="0" eaLnBrk="1" fontAlgn="auto" latinLnBrk="0" hangingPunct="1">
+              <a:lnSpc>
+                <a:spcPct val="100000"/>
+              </a:lnSpc>
+              <a:spcBef>
+                <a:spcPts val="0"/>
+              </a:spcBef>
+              <a:spcAft>
+                <a:spcPts val="0"/>
+              </a:spcAft>
+              <a:buClrTx/>
+              <a:buSzTx/>
+              <a:buFontTx/>
+              <a:buNone/>
+              <a:tabLst/>
+              <a:defRPr/>
+            </a:pPr>
+            <a:r>
+              <a:rPr lang="en-US" dirty="0"/>
+              <a:t>Ask the question why for each chart</a:t>
+            </a:r>
+          </a:p>
+          <a:p>
+            <a:pPr marL="0" marR="0" lvl="0" indent="0" algn="l" defTabSz="914400" rtl="0" eaLnBrk="1" fontAlgn="auto" latinLnBrk="0" hangingPunct="1">
+              <a:lnSpc>
+                <a:spcPct val="100000"/>
+              </a:lnSpc>
+              <a:spcBef>
+                <a:spcPts val="0"/>
+              </a:spcBef>
+              <a:spcAft>
+                <a:spcPts val="0"/>
+              </a:spcAft>
+              <a:buClrTx/>
+              <a:buSzTx/>
+              <a:buFontTx/>
+              <a:buNone/>
+              <a:tabLst/>
+              <a:defRPr/>
+            </a:pPr>
+            <a:endParaRPr lang="en-US" dirty="0"/>
+          </a:p>
+          <a:p>
+            <a:pPr marL="0" marR="0" lvl="0" indent="0" algn="l" defTabSz="914400" rtl="0" eaLnBrk="1" fontAlgn="auto" latinLnBrk="0" hangingPunct="1">
+              <a:lnSpc>
+                <a:spcPct val="100000"/>
+              </a:lnSpc>
+              <a:spcBef>
+                <a:spcPts val="0"/>
+              </a:spcBef>
+              <a:spcAft>
+                <a:spcPts val="0"/>
+              </a:spcAft>
+              <a:buClrTx/>
+              <a:buSzTx/>
+              <a:buFontTx/>
+              <a:buNone/>
+              <a:tabLst/>
+              <a:defRPr/>
+            </a:pPr>
+            <a:endParaRPr lang="en-US" dirty="0"/>
+          </a:p>
+          <a:p>
+            <a:pPr marL="0" marR="0" lvl="0" indent="0" algn="l" defTabSz="914400" rtl="0" eaLnBrk="1" fontAlgn="auto" latinLnBrk="0" hangingPunct="1">
+              <a:lnSpc>
+                <a:spcPct val="100000"/>
+              </a:lnSpc>
+              <a:spcBef>
+                <a:spcPts val="0"/>
+              </a:spcBef>
+              <a:spcAft>
+                <a:spcPts val="0"/>
+              </a:spcAft>
+              <a:buClrTx/>
+              <a:buSzTx/>
+              <a:buFontTx/>
+              <a:buNone/>
+              <a:tabLst/>
+              <a:defRPr/>
+            </a:pPr>
+            <a:r>
+              <a:rPr lang="en-US" dirty="0"/>
+              <a:t>Speaker: Thad Schwebke</a:t>
+            </a:r>
+          </a:p>
+          <a:p>
+            <a:endParaRPr lang="en-US" dirty="0"/>
+          </a:p>
+          <a:p>
+            <a:r>
+              <a:rPr lang="en-US" dirty="0"/>
+              <a:t>Notes: The histogram shows that the ABV data is normally distributed, but appears to have some small outliers on both ends. The two box plots illustrate that IPA has a higher overall median ABV at ~.8 ABV, however Other has several outliers that sit above the median (i.e. several greater than .12 ABV). 19.2 ounce beers tend to have the higher ABV, but the 16 ounces has a few outliers on the high side. One could also argue that 8.4 ounce beers has the highest median. The problem with this would be the number of observations that were 8.4 ounces. It appears to be a single observation.</a:t>
+            </a:r>
+          </a:p>
+          <a:p>
+            <a:endParaRPr lang="en-US" dirty="0"/>
+          </a:p>
+          <a:p>
+            <a:endParaRPr lang="en-US" dirty="0"/>
+          </a:p>
+        </p:txBody>
+      </p:sp>
+      <p:sp>
+        <p:nvSpPr>
+          <p:cNvPr id="4" name="Slide Number Placeholder 3"/>
+          <p:cNvSpPr>
+            <a:spLocks noGrp="1"/>
+          </p:cNvSpPr>
+          <p:nvPr>
+            <p:ph type="sldNum" sz="quarter" idx="5"/>
+          </p:nvPr>
+        </p:nvSpPr>
+        <p:spPr/>
+        <p:txBody>
+          <a:bodyPr/>
+          <a:lstStyle/>
+          <a:p>
+            <a:fld id="{274AE7AE-FCBF-419F-971E-04B351FA8EC0}" type="slidenum">
+              <a:rPr lang="en-US" smtClean="0"/>
+              <a:t>8</a:t>
+            </a:fld>
+            <a:endParaRPr lang="en-US"/>
+          </a:p>
+        </p:txBody>
+      </p:sp>
+    </p:spTree>
+    <p:extLst>
+      <p:ext uri="{BB962C8B-B14F-4D97-AF65-F5344CB8AC3E}">
+        <p14:creationId xmlns:p14="http://schemas.microsoft.com/office/powerpoint/2010/main" val="38672616"/>
+      </p:ext>
+    </p:extLst>
+  </p:cSld>
+  <p:clrMapOvr>
+    <a:masterClrMapping/>
+  </p:clrMapOvr>
+</p:notes>
+</file>
+
+<file path=ppt/notesSlides/notesSlide9.xml><?xml version="1.0" encoding="utf-8"?>
+<p:notes xmlns:a="http://schemas.openxmlformats.org/drawingml/2006/main" xmlns:r="http://schemas.openxmlformats.org/officeDocument/2006/relationships" xmlns:p="http://schemas.openxmlformats.org/presentationml/2006/main">
+  <p:cSld>
+    <p:spTree>
+      <p:nvGrpSpPr>
+        <p:cNvPr id="1" name=""/>
+        <p:cNvGrpSpPr/>
+        <p:nvPr/>
+      </p:nvGrpSpPr>
+      <p:grpSpPr>
+        <a:xfrm>
+          <a:off x="0" y="0"/>
+          <a:ext cx="0" cy="0"/>
+          <a:chOff x="0" y="0"/>
+          <a:chExt cx="0" cy="0"/>
+        </a:xfrm>
+      </p:grpSpPr>
+      <p:sp>
+        <p:nvSpPr>
+          <p:cNvPr id="2" name="Slide Image Placeholder 1"/>
+          <p:cNvSpPr>
+            <a:spLocks noGrp="1" noRot="1" noChangeAspect="1"/>
+          </p:cNvSpPr>
+          <p:nvPr>
+            <p:ph type="sldImg"/>
+          </p:nvPr>
+        </p:nvSpPr>
+        <p:spPr/>
+      </p:sp>
+      <p:sp>
+        <p:nvSpPr>
+          <p:cNvPr id="3" name="Notes Placeholder 2"/>
+          <p:cNvSpPr>
+            <a:spLocks noGrp="1"/>
+          </p:cNvSpPr>
+          <p:nvPr>
+            <p:ph type="body" idx="1"/>
+          </p:nvPr>
+        </p:nvSpPr>
+        <p:spPr/>
+        <p:txBody>
+          <a:bodyPr/>
+          <a:lstStyle/>
+          <a:p>
+            <a:pPr marL="0" marR="0" lvl="0" indent="0" algn="l" defTabSz="914400" rtl="0" eaLnBrk="1" fontAlgn="auto" latinLnBrk="0" hangingPunct="1">
+              <a:lnSpc>
+                <a:spcPct val="100000"/>
+              </a:lnSpc>
+              <a:spcBef>
+                <a:spcPts val="0"/>
+              </a:spcBef>
+              <a:spcAft>
+                <a:spcPts val="0"/>
+              </a:spcAft>
+              <a:buClrTx/>
+              <a:buSzTx/>
+              <a:buFontTx/>
+              <a:buNone/>
+              <a:tabLst/>
+              <a:defRPr/>
+            </a:pPr>
+            <a:r>
+              <a:rPr lang="en-US" dirty="0"/>
+              <a:t>Ask the question why for each chart</a:t>
+            </a:r>
+          </a:p>
+          <a:p>
+            <a:pPr marL="0" marR="0" lvl="0" indent="0" algn="l" defTabSz="914400" rtl="0" eaLnBrk="1" fontAlgn="auto" latinLnBrk="0" hangingPunct="1">
+              <a:lnSpc>
+                <a:spcPct val="100000"/>
+              </a:lnSpc>
+              <a:spcBef>
+                <a:spcPts val="0"/>
+              </a:spcBef>
+              <a:spcAft>
+                <a:spcPts val="0"/>
+              </a:spcAft>
+              <a:buClrTx/>
+              <a:buSzTx/>
+              <a:buFontTx/>
+              <a:buNone/>
+              <a:tabLst/>
+              <a:defRPr/>
+            </a:pPr>
+            <a:endParaRPr lang="en-US" dirty="0"/>
+          </a:p>
+          <a:p>
+            <a:pPr marL="0" marR="0" lvl="0" indent="0" algn="l" defTabSz="914400" rtl="0" eaLnBrk="1" fontAlgn="auto" latinLnBrk="0" hangingPunct="1">
+              <a:lnSpc>
+                <a:spcPct val="100000"/>
+              </a:lnSpc>
+              <a:spcBef>
+                <a:spcPts val="0"/>
+              </a:spcBef>
+              <a:spcAft>
+                <a:spcPts val="0"/>
+              </a:spcAft>
+              <a:buClrTx/>
+              <a:buSzTx/>
+              <a:buFontTx/>
+              <a:buNone/>
+              <a:tabLst/>
+              <a:defRPr/>
+            </a:pPr>
+            <a:endParaRPr lang="en-US" dirty="0"/>
+          </a:p>
+          <a:p>
+            <a:pPr marL="0" marR="0" lvl="0" indent="0" algn="l" defTabSz="914400" rtl="0" eaLnBrk="1" fontAlgn="auto" latinLnBrk="0" hangingPunct="1">
+              <a:lnSpc>
+                <a:spcPct val="100000"/>
+              </a:lnSpc>
+              <a:spcBef>
+                <a:spcPts val="0"/>
+              </a:spcBef>
+              <a:spcAft>
+                <a:spcPts val="0"/>
+              </a:spcAft>
+              <a:buClrTx/>
+              <a:buSzTx/>
+              <a:buFontTx/>
+              <a:buNone/>
+              <a:tabLst/>
+              <a:defRPr/>
+            </a:pPr>
+            <a:r>
+              <a:rPr lang="en-US" dirty="0"/>
+              <a:t>Speaker: Thad Schwebke</a:t>
+            </a:r>
+          </a:p>
+          <a:p>
+            <a:endParaRPr lang="en-US" dirty="0"/>
+          </a:p>
+          <a:p>
+            <a:r>
+              <a:rPr lang="en-US" dirty="0"/>
+              <a:t>Notes: The dot plot illustrates what appears to  be a positive linear relationship between the ABB and IBU. The addition of the trend line somewhat confirms the presence of a positive linear relationship between the ABV and IBU. More analysis would be needed to confirm.</a:t>
+            </a:r>
+          </a:p>
+          <a:p>
+            <a:endParaRPr lang="en-US" dirty="0"/>
+          </a:p>
+        </p:txBody>
+      </p:sp>
+      <p:sp>
+        <p:nvSpPr>
+          <p:cNvPr id="4" name="Slide Number Placeholder 3"/>
+          <p:cNvSpPr>
+            <a:spLocks noGrp="1"/>
+          </p:cNvSpPr>
+          <p:nvPr>
+            <p:ph type="sldNum" sz="quarter" idx="5"/>
+          </p:nvPr>
+        </p:nvSpPr>
+        <p:spPr/>
+        <p:txBody>
+          <a:bodyPr/>
+          <a:lstStyle/>
+          <a:p>
+            <a:fld id="{274AE7AE-FCBF-419F-971E-04B351FA8EC0}" type="slidenum">
+              <a:rPr lang="en-US" smtClean="0"/>
               <a:t>9</a:t>
             </a:fld>
             <a:endParaRPr lang="en-US"/>
@@ -2026,7 +2249,7 @@
     </p:spTree>
     <p:extLst>
       <p:ext uri="{BB962C8B-B14F-4D97-AF65-F5344CB8AC3E}">
-        <p14:creationId xmlns:p14="http://schemas.microsoft.com/office/powerpoint/2010/main" val="639101511"/>
+        <p14:creationId xmlns:p14="http://schemas.microsoft.com/office/powerpoint/2010/main" val="3427665525"/>
       </p:ext>
     </p:extLst>
   </p:cSld>
@@ -2267,7 +2490,7 @@
             <a:fld id="{FFF30096-E2FA-4C53-8FFA-C198FACBBC31}" type="datetimeFigureOut">
               <a:rPr lang="en-US" smtClean="0"/>
               <a:pPr/>
-              <a:t>2/23/2020</a:t>
+              <a:t>2/28/2020</a:t>
             </a:fld>
             <a:endParaRPr lang="en-US" dirty="0"/>
           </a:p>
@@ -9526,7 +9749,7 @@
             <a:fld id="{FFF30096-E2FA-4C53-8FFA-C198FACBBC31}" type="datetimeFigureOut">
               <a:rPr lang="en-US" smtClean="0"/>
               <a:pPr/>
-              <a:t>2/23/2020</a:t>
+              <a:t>2/28/2020</a:t>
             </a:fld>
             <a:endParaRPr lang="en-US" dirty="0"/>
           </a:p>
@@ -17200,7 +17423,7 @@
             <a:fld id="{FFF30096-E2FA-4C53-8FFA-C198FACBBC31}" type="datetimeFigureOut">
               <a:rPr lang="en-US" smtClean="0"/>
               <a:pPr/>
-              <a:t>2/23/2020</a:t>
+              <a:t>2/28/2020</a:t>
             </a:fld>
             <a:endParaRPr lang="en-US" dirty="0"/>
           </a:p>
@@ -17456,7 +17679,7 @@
             <a:fld id="{FFF30096-E2FA-4C53-8FFA-C198FACBBC31}" type="datetimeFigureOut">
               <a:rPr lang="en-US" smtClean="0"/>
               <a:pPr/>
-              <a:t>2/23/2020</a:t>
+              <a:t>2/28/2020</a:t>
             </a:fld>
             <a:endParaRPr lang="en-US" dirty="0"/>
           </a:p>
@@ -19230,7 +19453,7 @@
             <a:fld id="{FFF30096-E2FA-4C53-8FFA-C198FACBBC31}" type="datetimeFigureOut">
               <a:rPr lang="en-US" smtClean="0"/>
               <a:pPr/>
-              <a:t>2/23/2020</a:t>
+              <a:t>2/28/2020</a:t>
             </a:fld>
             <a:endParaRPr lang="en-US" dirty="0"/>
           </a:p>
@@ -19605,7 +19828,7 @@
             <a:fld id="{FFF30096-E2FA-4C53-8FFA-C198FACBBC31}" type="datetimeFigureOut">
               <a:rPr lang="en-US" smtClean="0"/>
               <a:pPr/>
-              <a:t>2/23/2020</a:t>
+              <a:t>2/28/2020</a:t>
             </a:fld>
             <a:endParaRPr lang="en-US"/>
           </a:p>
@@ -20100,321 +20323,6 @@
       </p:grpSpPr>
       <p:sp>
         <p:nvSpPr>
-          <p:cNvPr id="2" name="Title 1">
-            <a:extLst>
-              <a:ext uri="{FF2B5EF4-FFF2-40B4-BE49-F238E27FC236}">
-                <a16:creationId xmlns:a16="http://schemas.microsoft.com/office/drawing/2014/main" id="{C06565CC-4BFD-4A68-874A-74D0DB174AB6}"/>
-              </a:ext>
-            </a:extLst>
-          </p:cNvPr>
-          <p:cNvSpPr>
-            <a:spLocks noGrp="1"/>
-          </p:cNvSpPr>
-          <p:nvPr>
-            <p:ph type="title"/>
-          </p:nvPr>
-        </p:nvSpPr>
-        <p:spPr/>
-        <p:txBody>
-          <a:bodyPr/>
-          <a:lstStyle/>
-          <a:p>
-            <a:r>
-              <a:rPr lang="en-US" dirty="0"/>
-              <a:t>ABV Stats and Distribution</a:t>
-            </a:r>
-          </a:p>
-        </p:txBody>
-      </p:sp>
-      <p:pic>
-        <p:nvPicPr>
-          <p:cNvPr id="3" name="Picture 2">
-            <a:extLst>
-              <a:ext uri="{FF2B5EF4-FFF2-40B4-BE49-F238E27FC236}">
-                <a16:creationId xmlns:a16="http://schemas.microsoft.com/office/drawing/2014/main" id="{97515110-706C-47E2-88B3-AC0B994668BC}"/>
-              </a:ext>
-            </a:extLst>
-          </p:cNvPr>
-          <p:cNvPicPr>
-            <a:picLocks noChangeAspect="1" noChangeArrowheads="1"/>
-          </p:cNvPicPr>
-          <p:nvPr/>
-        </p:nvPicPr>
-        <p:blipFill>
-          <a:blip r:embed="rId3" cstate="print">
-            <a:extLst>
-              <a:ext uri="{28A0092B-C50C-407E-A947-70E740481C1C}">
-                <a14:useLocalDpi xmlns:a14="http://schemas.microsoft.com/office/drawing/2010/main" val="0"/>
-              </a:ext>
-            </a:extLst>
-          </a:blip>
-          <a:srcRect/>
-          <a:stretch>
-            <a:fillRect/>
-          </a:stretch>
-        </p:blipFill>
-        <p:spPr bwMode="auto">
-          <a:xfrm>
-            <a:off x="0" y="1330779"/>
-            <a:ext cx="3017520" cy="2155371"/>
-          </a:xfrm>
-          <a:prstGeom prst="rect">
-            <a:avLst/>
-          </a:prstGeom>
-          <a:noFill/>
-          <a:extLst>
-            <a:ext uri="{909E8E84-426E-40DD-AFC4-6F175D3DCCD1}">
-              <a14:hiddenFill xmlns:a14="http://schemas.microsoft.com/office/drawing/2010/main">
-                <a:solidFill>
-                  <a:srgbClr val="FFFFFF"/>
-                </a:solidFill>
-              </a14:hiddenFill>
-            </a:ext>
-          </a:extLst>
-        </p:spPr>
-      </p:pic>
-      <p:pic>
-        <p:nvPicPr>
-          <p:cNvPr id="8" name="Picture 7">
-            <a:extLst>
-              <a:ext uri="{FF2B5EF4-FFF2-40B4-BE49-F238E27FC236}">
-                <a16:creationId xmlns:a16="http://schemas.microsoft.com/office/drawing/2014/main" id="{A2050579-567E-467D-BA78-666F5E6A2BCC}"/>
-              </a:ext>
-            </a:extLst>
-          </p:cNvPr>
-          <p:cNvPicPr>
-            <a:picLocks noChangeAspect="1"/>
-          </p:cNvPicPr>
-          <p:nvPr/>
-        </p:nvPicPr>
-        <p:blipFill rotWithShape="1">
-          <a:blip r:embed="rId4"/>
-          <a:srcRect l="2428"/>
-          <a:stretch/>
-        </p:blipFill>
-        <p:spPr>
-          <a:xfrm>
-            <a:off x="3048000" y="1330778"/>
-            <a:ext cx="3017520" cy="1908674"/>
-          </a:xfrm>
-          <a:prstGeom prst="rect">
-            <a:avLst/>
-          </a:prstGeom>
-        </p:spPr>
-      </p:pic>
-      <p:pic>
-        <p:nvPicPr>
-          <p:cNvPr id="9" name="Picture 8">
-            <a:extLst>
-              <a:ext uri="{FF2B5EF4-FFF2-40B4-BE49-F238E27FC236}">
-                <a16:creationId xmlns:a16="http://schemas.microsoft.com/office/drawing/2014/main" id="{CEF6DE8A-D187-45D0-B3BA-CA964FA58107}"/>
-              </a:ext>
-            </a:extLst>
-          </p:cNvPr>
-          <p:cNvPicPr>
-            <a:picLocks noChangeAspect="1"/>
-          </p:cNvPicPr>
-          <p:nvPr/>
-        </p:nvPicPr>
-        <p:blipFill rotWithShape="1">
-          <a:blip r:embed="rId5"/>
-          <a:srcRect l="2428"/>
-          <a:stretch/>
-        </p:blipFill>
-        <p:spPr>
-          <a:xfrm>
-            <a:off x="6123530" y="1330778"/>
-            <a:ext cx="3017520" cy="1925576"/>
-          </a:xfrm>
-          <a:prstGeom prst="rect">
-            <a:avLst/>
-          </a:prstGeom>
-        </p:spPr>
-      </p:pic>
-    </p:spTree>
-    <p:extLst>
-      <p:ext uri="{BB962C8B-B14F-4D97-AF65-F5344CB8AC3E}">
-        <p14:creationId xmlns:p14="http://schemas.microsoft.com/office/powerpoint/2010/main" val="1387322310"/>
-      </p:ext>
-    </p:extLst>
-  </p:cSld>
-  <p:clrMapOvr>
-    <a:masterClrMapping/>
-  </p:clrMapOvr>
-</p:sld>
-</file>
-
-<file path=ppt/slides/slide11.xml><?xml version="1.0" encoding="utf-8"?>
-<p:sld xmlns:a="http://schemas.openxmlformats.org/drawingml/2006/main" xmlns:r="http://schemas.openxmlformats.org/officeDocument/2006/relationships" xmlns:p="http://schemas.openxmlformats.org/presentationml/2006/main">
-  <p:cSld>
-    <p:spTree>
-      <p:nvGrpSpPr>
-        <p:cNvPr id="1" name=""/>
-        <p:cNvGrpSpPr/>
-        <p:nvPr/>
-      </p:nvGrpSpPr>
-      <p:grpSpPr>
-        <a:xfrm>
-          <a:off x="0" y="0"/>
-          <a:ext cx="0" cy="0"/>
-          <a:chOff x="0" y="0"/>
-          <a:chExt cx="0" cy="0"/>
-        </a:xfrm>
-      </p:grpSpPr>
-      <p:sp>
-        <p:nvSpPr>
-          <p:cNvPr id="2" name="Title 1">
-            <a:extLst>
-              <a:ext uri="{FF2B5EF4-FFF2-40B4-BE49-F238E27FC236}">
-                <a16:creationId xmlns:a16="http://schemas.microsoft.com/office/drawing/2014/main" id="{48B828A6-A73B-4DEA-BD33-B6CEB6EA43D6}"/>
-              </a:ext>
-            </a:extLst>
-          </p:cNvPr>
-          <p:cNvSpPr>
-            <a:spLocks noGrp="1"/>
-          </p:cNvSpPr>
-          <p:nvPr>
-            <p:ph type="title"/>
-          </p:nvPr>
-        </p:nvSpPr>
-        <p:spPr/>
-        <p:txBody>
-          <a:bodyPr/>
-          <a:lstStyle/>
-          <a:p>
-            <a:r>
-              <a:rPr lang="en-US" dirty="0"/>
-              <a:t>Relationship Between IBU and ABV</a:t>
-            </a:r>
-          </a:p>
-        </p:txBody>
-      </p:sp>
-      <p:pic>
-        <p:nvPicPr>
-          <p:cNvPr id="7170" name="Picture 2">
-            <a:extLst>
-              <a:ext uri="{FF2B5EF4-FFF2-40B4-BE49-F238E27FC236}">
-                <a16:creationId xmlns:a16="http://schemas.microsoft.com/office/drawing/2014/main" id="{D6BF28F4-4E5D-4BBC-8668-5BC49F61C8C6}"/>
-              </a:ext>
-            </a:extLst>
-          </p:cNvPr>
-          <p:cNvPicPr>
-            <a:picLocks noChangeAspect="1" noChangeArrowheads="1"/>
-          </p:cNvPicPr>
-          <p:nvPr/>
-        </p:nvPicPr>
-        <p:blipFill>
-          <a:blip r:embed="rId3" cstate="print">
-            <a:extLst>
-              <a:ext uri="{28A0092B-C50C-407E-A947-70E740481C1C}">
-                <a14:useLocalDpi xmlns:a14="http://schemas.microsoft.com/office/drawing/2010/main" val="0"/>
-              </a:ext>
-            </a:extLst>
-          </a:blip>
-          <a:srcRect/>
-          <a:stretch>
-            <a:fillRect/>
-          </a:stretch>
-        </p:blipFill>
-        <p:spPr bwMode="auto">
-          <a:xfrm>
-            <a:off x="152400" y="1167493"/>
-            <a:ext cx="4206240" cy="3004457"/>
-          </a:xfrm>
-          <a:prstGeom prst="rect">
-            <a:avLst/>
-          </a:prstGeom>
-          <a:noFill/>
-          <a:extLst>
-            <a:ext uri="{909E8E84-426E-40DD-AFC4-6F175D3DCCD1}">
-              <a14:hiddenFill xmlns:a14="http://schemas.microsoft.com/office/drawing/2010/main">
-                <a:solidFill>
-                  <a:srgbClr val="FFFFFF"/>
-                </a:solidFill>
-              </a14:hiddenFill>
-            </a:ext>
-          </a:extLst>
-        </p:spPr>
-      </p:pic>
-      <p:pic>
-        <p:nvPicPr>
-          <p:cNvPr id="3" name="Picture 4">
-            <a:extLst>
-              <a:ext uri="{FF2B5EF4-FFF2-40B4-BE49-F238E27FC236}">
-                <a16:creationId xmlns:a16="http://schemas.microsoft.com/office/drawing/2014/main" id="{426D0047-F4A1-4D2A-A497-54A8F7000D42}"/>
-              </a:ext>
-            </a:extLst>
-          </p:cNvPr>
-          <p:cNvPicPr>
-            <a:picLocks noChangeAspect="1" noChangeArrowheads="1"/>
-          </p:cNvPicPr>
-          <p:nvPr/>
-        </p:nvPicPr>
-        <p:blipFill>
-          <a:blip r:embed="rId4" cstate="print">
-            <a:extLst>
-              <a:ext uri="{28A0092B-C50C-407E-A947-70E740481C1C}">
-                <a14:useLocalDpi xmlns:a14="http://schemas.microsoft.com/office/drawing/2010/main" val="0"/>
-              </a:ext>
-            </a:extLst>
-          </a:blip>
-          <a:srcRect/>
-          <a:stretch>
-            <a:fillRect/>
-          </a:stretch>
-        </p:blipFill>
-        <p:spPr bwMode="auto">
-          <a:xfrm>
-            <a:off x="4785360" y="1167493"/>
-            <a:ext cx="4206240" cy="3004457"/>
-          </a:xfrm>
-          <a:prstGeom prst="rect">
-            <a:avLst/>
-          </a:prstGeom>
-          <a:noFill/>
-          <a:extLst>
-            <a:ext uri="{909E8E84-426E-40DD-AFC4-6F175D3DCCD1}">
-              <a14:hiddenFill xmlns:a14="http://schemas.microsoft.com/office/drawing/2010/main">
-                <a:solidFill>
-                  <a:srgbClr val="FFFFFF"/>
-                </a:solidFill>
-              </a14:hiddenFill>
-            </a:ext>
-          </a:extLst>
-        </p:spPr>
-      </p:pic>
-    </p:spTree>
-    <p:extLst>
-      <p:ext uri="{BB962C8B-B14F-4D97-AF65-F5344CB8AC3E}">
-        <p14:creationId xmlns:p14="http://schemas.microsoft.com/office/powerpoint/2010/main" val="4003640020"/>
-      </p:ext>
-    </p:extLst>
-  </p:cSld>
-  <p:clrMapOvr>
-    <a:masterClrMapping/>
-  </p:clrMapOvr>
-</p:sld>
-</file>
-
-<file path=ppt/slides/slide12.xml><?xml version="1.0" encoding="utf-8"?>
-<p:sld xmlns:a="http://schemas.openxmlformats.org/drawingml/2006/main" xmlns:r="http://schemas.openxmlformats.org/officeDocument/2006/relationships" xmlns:p="http://schemas.openxmlformats.org/presentationml/2006/main">
-  <p:cSld>
-    <p:spTree>
-      <p:nvGrpSpPr>
-        <p:cNvPr id="1" name=""/>
-        <p:cNvGrpSpPr/>
-        <p:nvPr/>
-      </p:nvGrpSpPr>
-      <p:grpSpPr>
-        <a:xfrm>
-          <a:off x="0" y="0"/>
-          <a:ext cx="0" cy="0"/>
-          <a:chOff x="0" y="0"/>
-          <a:chExt cx="0" cy="0"/>
-        </a:xfrm>
-      </p:grpSpPr>
-      <p:sp>
-        <p:nvSpPr>
           <p:cNvPr id="4" name="Title 3">
             <a:extLst>
               <a:ext uri="{FF2B5EF4-FFF2-40B4-BE49-F238E27FC236}">
@@ -20437,34 +20345,6 @@
             <a:r>
               <a:rPr lang="en-US" dirty="0"/>
               <a:t>Thank You!</a:t>
-            </a:r>
-          </a:p>
-        </p:txBody>
-      </p:sp>
-      <p:sp>
-        <p:nvSpPr>
-          <p:cNvPr id="5" name="Text Placeholder 4">
-            <a:extLst>
-              <a:ext uri="{FF2B5EF4-FFF2-40B4-BE49-F238E27FC236}">
-                <a16:creationId xmlns:a16="http://schemas.microsoft.com/office/drawing/2014/main" id="{B7032DA9-3084-428D-B16D-24511F6F7009}"/>
-              </a:ext>
-            </a:extLst>
-          </p:cNvPr>
-          <p:cNvSpPr>
-            <a:spLocks noGrp="1"/>
-          </p:cNvSpPr>
-          <p:nvPr>
-            <p:ph type="body" sz="quarter" idx="35"/>
-          </p:nvPr>
-        </p:nvSpPr>
-        <p:spPr/>
-        <p:txBody>
-          <a:bodyPr/>
-          <a:lstStyle/>
-          <a:p>
-            <a:r>
-              <a:rPr lang="en-US" dirty="0"/>
-              <a:t>&lt;SUMMARY&gt;</a:t>
             </a:r>
           </a:p>
         </p:txBody>
@@ -20554,9 +20434,13 @@
             </a:r>
           </a:p>
           <a:p>
+            <a:pPr marL="342900" indent="-342900">
+              <a:buFont typeface="Arial" panose="020B0604020202020204" pitchFamily="34" charset="0"/>
+              <a:buChar char="•"/>
+            </a:pPr>
             <a:r>
               <a:rPr lang="en-US" dirty="0"/>
-              <a:t>Questions:</a:t>
+              <a:t>Brewery summary</a:t>
             </a:r>
           </a:p>
           <a:p>
@@ -20566,7 +20450,7 @@
             </a:pPr>
             <a:r>
               <a:rPr lang="en-US" dirty="0"/>
-              <a:t>Breweries by state</a:t>
+              <a:t>Facts about ABV and IBU</a:t>
             </a:r>
           </a:p>
           <a:p>
@@ -20576,37 +20460,7 @@
             </a:pPr>
             <a:r>
               <a:rPr lang="en-US" dirty="0"/>
-              <a:t>Median ABV and IBU by state</a:t>
-            </a:r>
-          </a:p>
-          <a:p>
-            <a:pPr marL="342900" indent="-342900">
-              <a:buFont typeface="Arial" panose="020B0604020202020204" pitchFamily="34" charset="0"/>
-              <a:buChar char="•"/>
-            </a:pPr>
-            <a:r>
-              <a:rPr lang="en-US" dirty="0"/>
-              <a:t>Highest level of ABV and IBU by state</a:t>
-            </a:r>
-          </a:p>
-          <a:p>
-            <a:pPr marL="342900" indent="-342900">
-              <a:buFont typeface="Arial" panose="020B0604020202020204" pitchFamily="34" charset="0"/>
-              <a:buChar char="•"/>
-            </a:pPr>
-            <a:r>
-              <a:rPr lang="en-US" dirty="0"/>
-              <a:t>Understand detailed information related to ABV</a:t>
-            </a:r>
-          </a:p>
-          <a:p>
-            <a:pPr marL="342900" indent="-342900">
-              <a:buFont typeface="Arial" panose="020B0604020202020204" pitchFamily="34" charset="0"/>
-              <a:buChar char="•"/>
-            </a:pPr>
-            <a:r>
-              <a:rPr lang="en-US" dirty="0"/>
-              <a:t>Explain relationship between ABV and IBU</a:t>
+              <a:t>Relationship between ABV and IBU</a:t>
             </a:r>
           </a:p>
         </p:txBody>
@@ -20709,40 +20563,7 @@
           <a:p>
             <a:r>
               <a:rPr lang="en-US" dirty="0"/>
-              <a:t>Case Study Data</a:t>
-            </a:r>
-          </a:p>
-        </p:txBody>
-      </p:sp>
-      <p:sp>
-        <p:nvSpPr>
-          <p:cNvPr id="3" name="Text Placeholder 2">
-            <a:extLst>
-              <a:ext uri="{FF2B5EF4-FFF2-40B4-BE49-F238E27FC236}">
-                <a16:creationId xmlns:a16="http://schemas.microsoft.com/office/drawing/2014/main" id="{B58960E6-62F2-4CE8-A634-98F979CAD2EC}"/>
-              </a:ext>
-            </a:extLst>
-          </p:cNvPr>
-          <p:cNvSpPr>
-            <a:spLocks noGrp="1"/>
-          </p:cNvSpPr>
-          <p:nvPr>
-            <p:ph type="body" sz="quarter" idx="39"/>
-          </p:nvPr>
-        </p:nvSpPr>
-        <p:spPr>
-          <a:xfrm>
-            <a:off x="4067944" y="1746440"/>
-            <a:ext cx="2258568" cy="505509"/>
-          </a:xfrm>
-        </p:spPr>
-        <p:txBody>
-          <a:bodyPr/>
-          <a:lstStyle/>
-          <a:p>
-            <a:r>
-              <a:rPr lang="en-US" dirty="0"/>
-              <a:t>Beers</a:t>
+              <a:t>Beers and Brewery Data</a:t>
             </a:r>
           </a:p>
         </p:txBody>
@@ -20765,15 +20586,25 @@
         </p:nvSpPr>
         <p:spPr>
           <a:xfrm>
-            <a:off x="4067944" y="2459046"/>
-            <a:ext cx="2256656" cy="2003544"/>
+            <a:off x="4038600" y="1132046"/>
+            <a:ext cx="3886200" cy="2003544"/>
           </a:xfrm>
         </p:spPr>
         <p:txBody>
           <a:bodyPr/>
           <a:lstStyle/>
           <a:p>
-            <a:pPr marL="342900" indent="-342900">
+            <a:pPr marL="342900" indent="-182880">
+              <a:buFont typeface="Arial" panose="020B0604020202020204" pitchFamily="34" charset="0"/>
+              <a:buChar char="•"/>
+            </a:pPr>
+            <a:r>
+              <a:rPr lang="en-US" sz="1200" dirty="0"/>
+              <a:t>Two sources of data (beers and breweries)</a:t>
+            </a:r>
+          </a:p>
+          <a:p>
+            <a:pPr marL="342900" indent="-182880">
               <a:buFont typeface="Arial" panose="020B0604020202020204" pitchFamily="34" charset="0"/>
               <a:buChar char="•"/>
             </a:pPr>
@@ -20783,17 +20614,7 @@
             </a:r>
           </a:p>
           <a:p>
-            <a:pPr marL="342900" indent="-342900">
-              <a:buFont typeface="Arial" panose="020B0604020202020204" pitchFamily="34" charset="0"/>
-              <a:buChar char="•"/>
-            </a:pPr>
-            <a:r>
-              <a:rPr lang="en-US" sz="1200" dirty="0"/>
-              <a:t>Beer ID</a:t>
-            </a:r>
-          </a:p>
-          <a:p>
-            <a:pPr marL="342900" indent="-342900">
+            <a:pPr marL="731520" lvl="1" indent="-182880">
               <a:buFont typeface="Arial" panose="020B0604020202020204" pitchFamily="34" charset="0"/>
               <a:buChar char="•"/>
             </a:pPr>
@@ -20803,7 +20624,27 @@
             </a:r>
           </a:p>
           <a:p>
-            <a:pPr marL="342900" indent="-342900">
+            <a:pPr marL="731520" lvl="1" indent="-182880">
+              <a:buFont typeface="Arial" panose="020B0604020202020204" pitchFamily="34" charset="0"/>
+              <a:buChar char="•"/>
+            </a:pPr>
+            <a:r>
+              <a:rPr lang="en-US" sz="1200" dirty="0"/>
+              <a:t>Style</a:t>
+            </a:r>
+          </a:p>
+          <a:p>
+            <a:pPr marL="731520" lvl="1" indent="-182880">
+              <a:buFont typeface="Arial" panose="020B0604020202020204" pitchFamily="34" charset="0"/>
+              <a:buChar char="•"/>
+            </a:pPr>
+            <a:r>
+              <a:rPr lang="en-US" sz="1200" dirty="0"/>
+              <a:t>Sizes (Ounces)</a:t>
+            </a:r>
+          </a:p>
+          <a:p>
+            <a:pPr marL="731520" lvl="1" indent="-182880">
               <a:buFont typeface="Arial" panose="020B0604020202020204" pitchFamily="34" charset="0"/>
               <a:buChar char="•"/>
             </a:pPr>
@@ -20813,7 +20654,7 @@
             </a:r>
           </a:p>
           <a:p>
-            <a:pPr marL="342900" indent="-342900">
+            <a:pPr marL="731520" lvl="1" indent="-182880">
               <a:buFont typeface="Arial" panose="020B0604020202020204" pitchFamily="34" charset="0"/>
               <a:buChar char="•"/>
             </a:pPr>
@@ -20823,375 +20664,7 @@
             </a:r>
           </a:p>
           <a:p>
-            <a:pPr marL="342900" indent="-342900">
-              <a:buFont typeface="Arial" panose="020B0604020202020204" pitchFamily="34" charset="0"/>
-              <a:buChar char="•"/>
-            </a:pPr>
-            <a:r>
-              <a:rPr lang="en-US" sz="1200" dirty="0"/>
-              <a:t>Brewery ID</a:t>
-            </a:r>
-          </a:p>
-          <a:p>
-            <a:pPr marL="342900" indent="-342900">
-              <a:buFont typeface="Arial" panose="020B0604020202020204" pitchFamily="34" charset="0"/>
-              <a:buChar char="•"/>
-            </a:pPr>
-            <a:r>
-              <a:rPr lang="en-US" sz="1200" dirty="0"/>
-              <a:t>Style</a:t>
-            </a:r>
-          </a:p>
-          <a:p>
-            <a:pPr marL="342900" indent="-342900">
-              <a:buFont typeface="Arial" panose="020B0604020202020204" pitchFamily="34" charset="0"/>
-              <a:buChar char="•"/>
-            </a:pPr>
-            <a:r>
-              <a:rPr lang="en-US" sz="1200" dirty="0"/>
-              <a:t>Ounces</a:t>
-            </a:r>
-          </a:p>
-        </p:txBody>
-      </p:sp>
-      <p:sp>
-        <p:nvSpPr>
-          <p:cNvPr id="5" name="Text Placeholder 2">
-            <a:extLst>
-              <a:ext uri="{FF2B5EF4-FFF2-40B4-BE49-F238E27FC236}">
-                <a16:creationId xmlns:a16="http://schemas.microsoft.com/office/drawing/2014/main" id="{5915C85E-29AE-47CD-89A4-B1323DFF0C60}"/>
-              </a:ext>
-            </a:extLst>
-          </p:cNvPr>
-          <p:cNvSpPr txBox="1">
-            <a:spLocks/>
-          </p:cNvSpPr>
-          <p:nvPr/>
-        </p:nvSpPr>
-        <p:spPr>
-          <a:xfrm>
-            <a:off x="6629400" y="1759860"/>
-            <a:ext cx="2258568" cy="505509"/>
-          </a:xfrm>
-          <a:prstGeom prst="rect">
-            <a:avLst/>
-          </a:prstGeom>
-        </p:spPr>
-        <p:txBody>
-          <a:bodyPr vert="horz" lIns="91440" tIns="45720" rIns="91440" bIns="45720" rtlCol="0" anchor="ctr">
-            <a:noAutofit/>
-          </a:bodyPr>
-          <a:lstStyle>
-            <a:lvl1pPr marL="0" indent="0" algn="l" defTabSz="914400" rtl="0" eaLnBrk="1" latinLnBrk="0" hangingPunct="1">
-              <a:spcBef>
-                <a:spcPct val="20000"/>
-              </a:spcBef>
-              <a:buFont typeface="Arial" panose="020B0604020202020204" pitchFamily="34" charset="0"/>
-              <a:buNone/>
-              <a:defRPr sz="2800" kern="1200">
-                <a:solidFill>
-                  <a:schemeClr val="accent3"/>
-                </a:solidFill>
-                <a:latin typeface="+mn-lt"/>
-                <a:ea typeface="+mn-ea"/>
-                <a:cs typeface="+mn-cs"/>
-              </a:defRPr>
-            </a:lvl1pPr>
-            <a:lvl2pPr marL="742950" indent="-285750" algn="l" defTabSz="914400" rtl="0" eaLnBrk="1" latinLnBrk="0" hangingPunct="1">
-              <a:spcBef>
-                <a:spcPct val="20000"/>
-              </a:spcBef>
-              <a:buFont typeface="Arial" panose="020B0604020202020204" pitchFamily="34" charset="0"/>
-              <a:buChar char="–"/>
-              <a:defRPr sz="2800" kern="1200">
-                <a:solidFill>
-                  <a:schemeClr val="tx1"/>
-                </a:solidFill>
-                <a:latin typeface="+mn-lt"/>
-                <a:ea typeface="+mn-ea"/>
-                <a:cs typeface="+mn-cs"/>
-              </a:defRPr>
-            </a:lvl2pPr>
-            <a:lvl3pPr marL="1143000" indent="-228600" algn="l" defTabSz="914400" rtl="0" eaLnBrk="1" latinLnBrk="0" hangingPunct="1">
-              <a:spcBef>
-                <a:spcPct val="20000"/>
-              </a:spcBef>
-              <a:buFont typeface="Arial" panose="020B0604020202020204" pitchFamily="34" charset="0"/>
-              <a:buChar char="•"/>
-              <a:defRPr sz="2400" kern="1200">
-                <a:solidFill>
-                  <a:schemeClr val="tx1"/>
-                </a:solidFill>
-                <a:latin typeface="+mn-lt"/>
-                <a:ea typeface="+mn-ea"/>
-                <a:cs typeface="+mn-cs"/>
-              </a:defRPr>
-            </a:lvl3pPr>
-            <a:lvl4pPr marL="1600200" indent="-228600" algn="l" defTabSz="914400" rtl="0" eaLnBrk="1" latinLnBrk="0" hangingPunct="1">
-              <a:spcBef>
-                <a:spcPct val="20000"/>
-              </a:spcBef>
-              <a:buFont typeface="Arial" panose="020B0604020202020204" pitchFamily="34" charset="0"/>
-              <a:buChar char="–"/>
-              <a:defRPr sz="2000" kern="1200">
-                <a:solidFill>
-                  <a:schemeClr val="tx1"/>
-                </a:solidFill>
-                <a:latin typeface="+mn-lt"/>
-                <a:ea typeface="+mn-ea"/>
-                <a:cs typeface="+mn-cs"/>
-              </a:defRPr>
-            </a:lvl4pPr>
-            <a:lvl5pPr marL="2057400" indent="-228600" algn="l" defTabSz="914400" rtl="0" eaLnBrk="1" latinLnBrk="0" hangingPunct="1">
-              <a:spcBef>
-                <a:spcPct val="20000"/>
-              </a:spcBef>
-              <a:buFont typeface="Arial" panose="020B0604020202020204" pitchFamily="34" charset="0"/>
-              <a:buChar char="»"/>
-              <a:defRPr sz="2000" kern="1200">
-                <a:solidFill>
-                  <a:schemeClr val="tx1"/>
-                </a:solidFill>
-                <a:latin typeface="+mn-lt"/>
-                <a:ea typeface="+mn-ea"/>
-                <a:cs typeface="+mn-cs"/>
-              </a:defRPr>
-            </a:lvl5pPr>
-            <a:lvl6pPr marL="2514600" indent="-228600" algn="l" defTabSz="914400" rtl="0" eaLnBrk="1" latinLnBrk="0" hangingPunct="1">
-              <a:spcBef>
-                <a:spcPct val="20000"/>
-              </a:spcBef>
-              <a:buFont typeface="Arial" panose="020B0604020202020204" pitchFamily="34" charset="0"/>
-              <a:buChar char="•"/>
-              <a:defRPr sz="2000" kern="1200">
-                <a:solidFill>
-                  <a:schemeClr val="tx1"/>
-                </a:solidFill>
-                <a:latin typeface="+mn-lt"/>
-                <a:ea typeface="+mn-ea"/>
-                <a:cs typeface="+mn-cs"/>
-              </a:defRPr>
-            </a:lvl6pPr>
-            <a:lvl7pPr marL="2971800" indent="-228600" algn="l" defTabSz="914400" rtl="0" eaLnBrk="1" latinLnBrk="0" hangingPunct="1">
-              <a:spcBef>
-                <a:spcPct val="20000"/>
-              </a:spcBef>
-              <a:buFont typeface="Arial" panose="020B0604020202020204" pitchFamily="34" charset="0"/>
-              <a:buChar char="•"/>
-              <a:defRPr sz="2000" kern="1200">
-                <a:solidFill>
-                  <a:schemeClr val="tx1"/>
-                </a:solidFill>
-                <a:latin typeface="+mn-lt"/>
-                <a:ea typeface="+mn-ea"/>
-                <a:cs typeface="+mn-cs"/>
-              </a:defRPr>
-            </a:lvl7pPr>
-            <a:lvl8pPr marL="3429000" indent="-228600" algn="l" defTabSz="914400" rtl="0" eaLnBrk="1" latinLnBrk="0" hangingPunct="1">
-              <a:spcBef>
-                <a:spcPct val="20000"/>
-              </a:spcBef>
-              <a:buFont typeface="Arial" panose="020B0604020202020204" pitchFamily="34" charset="0"/>
-              <a:buChar char="•"/>
-              <a:defRPr sz="2000" kern="1200">
-                <a:solidFill>
-                  <a:schemeClr val="tx1"/>
-                </a:solidFill>
-                <a:latin typeface="+mn-lt"/>
-                <a:ea typeface="+mn-ea"/>
-                <a:cs typeface="+mn-cs"/>
-              </a:defRPr>
-            </a:lvl8pPr>
-            <a:lvl9pPr marL="3886200" indent="-228600" algn="l" defTabSz="914400" rtl="0" eaLnBrk="1" latinLnBrk="0" hangingPunct="1">
-              <a:spcBef>
-                <a:spcPct val="20000"/>
-              </a:spcBef>
-              <a:buFont typeface="Arial" panose="020B0604020202020204" pitchFamily="34" charset="0"/>
-              <a:buChar char="•"/>
-              <a:defRPr sz="2000" kern="1200">
-                <a:solidFill>
-                  <a:schemeClr val="tx1"/>
-                </a:solidFill>
-                <a:latin typeface="+mn-lt"/>
-                <a:ea typeface="+mn-ea"/>
-                <a:cs typeface="+mn-cs"/>
-              </a:defRPr>
-            </a:lvl9pPr>
-          </a:lstStyle>
-          <a:p>
-            <a:r>
-              <a:rPr lang="en-US" dirty="0"/>
-              <a:t>Breweries</a:t>
-            </a:r>
-          </a:p>
-        </p:txBody>
-      </p:sp>
-      <p:sp>
-        <p:nvSpPr>
-          <p:cNvPr id="6" name="Text Placeholder 3">
-            <a:extLst>
-              <a:ext uri="{FF2B5EF4-FFF2-40B4-BE49-F238E27FC236}">
-                <a16:creationId xmlns:a16="http://schemas.microsoft.com/office/drawing/2014/main" id="{F4756E6D-8370-4FE1-BB7E-D014C95F1E33}"/>
-              </a:ext>
-            </a:extLst>
-          </p:cNvPr>
-          <p:cNvSpPr txBox="1">
-            <a:spLocks/>
-          </p:cNvSpPr>
-          <p:nvPr/>
-        </p:nvSpPr>
-        <p:spPr>
-          <a:xfrm>
-            <a:off x="6629400" y="2472466"/>
-            <a:ext cx="2258568" cy="2003544"/>
-          </a:xfrm>
-          <a:prstGeom prst="rect">
-            <a:avLst/>
-          </a:prstGeom>
-        </p:spPr>
-        <p:txBody>
-          <a:bodyPr vert="horz" lIns="91440" tIns="45720" rIns="91440" bIns="45720" rtlCol="0" anchor="t">
-            <a:noAutofit/>
-          </a:bodyPr>
-          <a:lstStyle>
-            <a:lvl1pPr marL="0" indent="0" algn="l" defTabSz="914400" rtl="0" eaLnBrk="1" latinLnBrk="0" hangingPunct="1">
-              <a:spcBef>
-                <a:spcPct val="20000"/>
-              </a:spcBef>
-              <a:buFont typeface="Arial" panose="020B0604020202020204" pitchFamily="34" charset="0"/>
-              <a:buNone/>
-              <a:defRPr sz="2000" kern="1200">
-                <a:solidFill>
-                  <a:schemeClr val="tx1"/>
-                </a:solidFill>
-                <a:latin typeface="+mn-lt"/>
-                <a:ea typeface="+mn-ea"/>
-                <a:cs typeface="+mn-cs"/>
-              </a:defRPr>
-            </a:lvl1pPr>
-            <a:lvl2pPr marL="742950" indent="-285750" algn="l" defTabSz="914400" rtl="0" eaLnBrk="1" latinLnBrk="0" hangingPunct="1">
-              <a:spcBef>
-                <a:spcPct val="20000"/>
-              </a:spcBef>
-              <a:buFont typeface="Arial" panose="020B0604020202020204" pitchFamily="34" charset="0"/>
-              <a:buChar char="–"/>
-              <a:defRPr sz="2800" kern="1200">
-                <a:solidFill>
-                  <a:schemeClr val="tx1"/>
-                </a:solidFill>
-                <a:latin typeface="+mn-lt"/>
-                <a:ea typeface="+mn-ea"/>
-                <a:cs typeface="+mn-cs"/>
-              </a:defRPr>
-            </a:lvl2pPr>
-            <a:lvl3pPr marL="1143000" indent="-228600" algn="l" defTabSz="914400" rtl="0" eaLnBrk="1" latinLnBrk="0" hangingPunct="1">
-              <a:spcBef>
-                <a:spcPct val="20000"/>
-              </a:spcBef>
-              <a:buFont typeface="Arial" panose="020B0604020202020204" pitchFamily="34" charset="0"/>
-              <a:buChar char="•"/>
-              <a:defRPr sz="2400" kern="1200">
-                <a:solidFill>
-                  <a:schemeClr val="tx1"/>
-                </a:solidFill>
-                <a:latin typeface="+mn-lt"/>
-                <a:ea typeface="+mn-ea"/>
-                <a:cs typeface="+mn-cs"/>
-              </a:defRPr>
-            </a:lvl3pPr>
-            <a:lvl4pPr marL="1600200" indent="-228600" algn="l" defTabSz="914400" rtl="0" eaLnBrk="1" latinLnBrk="0" hangingPunct="1">
-              <a:spcBef>
-                <a:spcPct val="20000"/>
-              </a:spcBef>
-              <a:buFont typeface="Arial" panose="020B0604020202020204" pitchFamily="34" charset="0"/>
-              <a:buChar char="–"/>
-              <a:defRPr sz="2000" kern="1200">
-                <a:solidFill>
-                  <a:schemeClr val="tx1"/>
-                </a:solidFill>
-                <a:latin typeface="+mn-lt"/>
-                <a:ea typeface="+mn-ea"/>
-                <a:cs typeface="+mn-cs"/>
-              </a:defRPr>
-            </a:lvl4pPr>
-            <a:lvl5pPr marL="2057400" indent="-228600" algn="l" defTabSz="914400" rtl="0" eaLnBrk="1" latinLnBrk="0" hangingPunct="1">
-              <a:spcBef>
-                <a:spcPct val="20000"/>
-              </a:spcBef>
-              <a:buFont typeface="Arial" panose="020B0604020202020204" pitchFamily="34" charset="0"/>
-              <a:buChar char="»"/>
-              <a:defRPr sz="2000" kern="1200">
-                <a:solidFill>
-                  <a:schemeClr val="tx1"/>
-                </a:solidFill>
-                <a:latin typeface="+mn-lt"/>
-                <a:ea typeface="+mn-ea"/>
-                <a:cs typeface="+mn-cs"/>
-              </a:defRPr>
-            </a:lvl5pPr>
-            <a:lvl6pPr marL="2514600" indent="-228600" algn="l" defTabSz="914400" rtl="0" eaLnBrk="1" latinLnBrk="0" hangingPunct="1">
-              <a:spcBef>
-                <a:spcPct val="20000"/>
-              </a:spcBef>
-              <a:buFont typeface="Arial" panose="020B0604020202020204" pitchFamily="34" charset="0"/>
-              <a:buChar char="•"/>
-              <a:defRPr sz="2000" kern="1200">
-                <a:solidFill>
-                  <a:schemeClr val="tx1"/>
-                </a:solidFill>
-                <a:latin typeface="+mn-lt"/>
-                <a:ea typeface="+mn-ea"/>
-                <a:cs typeface="+mn-cs"/>
-              </a:defRPr>
-            </a:lvl6pPr>
-            <a:lvl7pPr marL="2971800" indent="-228600" algn="l" defTabSz="914400" rtl="0" eaLnBrk="1" latinLnBrk="0" hangingPunct="1">
-              <a:spcBef>
-                <a:spcPct val="20000"/>
-              </a:spcBef>
-              <a:buFont typeface="Arial" panose="020B0604020202020204" pitchFamily="34" charset="0"/>
-              <a:buChar char="•"/>
-              <a:defRPr sz="2000" kern="1200">
-                <a:solidFill>
-                  <a:schemeClr val="tx1"/>
-                </a:solidFill>
-                <a:latin typeface="+mn-lt"/>
-                <a:ea typeface="+mn-ea"/>
-                <a:cs typeface="+mn-cs"/>
-              </a:defRPr>
-            </a:lvl7pPr>
-            <a:lvl8pPr marL="3429000" indent="-228600" algn="l" defTabSz="914400" rtl="0" eaLnBrk="1" latinLnBrk="0" hangingPunct="1">
-              <a:spcBef>
-                <a:spcPct val="20000"/>
-              </a:spcBef>
-              <a:buFont typeface="Arial" panose="020B0604020202020204" pitchFamily="34" charset="0"/>
-              <a:buChar char="•"/>
-              <a:defRPr sz="2000" kern="1200">
-                <a:solidFill>
-                  <a:schemeClr val="tx1"/>
-                </a:solidFill>
-                <a:latin typeface="+mn-lt"/>
-                <a:ea typeface="+mn-ea"/>
-                <a:cs typeface="+mn-cs"/>
-              </a:defRPr>
-            </a:lvl8pPr>
-            <a:lvl9pPr marL="3886200" indent="-228600" algn="l" defTabSz="914400" rtl="0" eaLnBrk="1" latinLnBrk="0" hangingPunct="1">
-              <a:spcBef>
-                <a:spcPct val="20000"/>
-              </a:spcBef>
-              <a:buFont typeface="Arial" panose="020B0604020202020204" pitchFamily="34" charset="0"/>
-              <a:buChar char="•"/>
-              <a:defRPr sz="2000" kern="1200">
-                <a:solidFill>
-                  <a:schemeClr val="tx1"/>
-                </a:solidFill>
-                <a:latin typeface="+mn-lt"/>
-                <a:ea typeface="+mn-ea"/>
-                <a:cs typeface="+mn-cs"/>
-              </a:defRPr>
-            </a:lvl9pPr>
-          </a:lstStyle>
-          <a:p>
-            <a:pPr marL="342900" indent="-342900">
+            <a:pPr marL="342900" indent="-182880">
               <a:buFont typeface="Arial" panose="020B0604020202020204" pitchFamily="34" charset="0"/>
               <a:buChar char="•"/>
             </a:pPr>
@@ -21201,17 +20674,7 @@
             </a:r>
           </a:p>
           <a:p>
-            <a:pPr marL="342900" indent="-342900">
-              <a:buFont typeface="Arial" panose="020B0604020202020204" pitchFamily="34" charset="0"/>
-              <a:buChar char="•"/>
-            </a:pPr>
-            <a:r>
-              <a:rPr lang="en-US" sz="1200" dirty="0"/>
-              <a:t>Brewery ID</a:t>
-            </a:r>
-          </a:p>
-          <a:p>
-            <a:pPr marL="342900" indent="-342900">
+            <a:pPr marL="731520" lvl="1" indent="-182880">
               <a:buFont typeface="Arial" panose="020B0604020202020204" pitchFamily="34" charset="0"/>
               <a:buChar char="•"/>
             </a:pPr>
@@ -21221,23 +20684,13 @@
             </a:r>
           </a:p>
           <a:p>
-            <a:pPr marL="342900" indent="-342900">
+            <a:pPr marL="731520" lvl="1" indent="-182880">
               <a:buFont typeface="Arial" panose="020B0604020202020204" pitchFamily="34" charset="0"/>
               <a:buChar char="•"/>
             </a:pPr>
             <a:r>
               <a:rPr lang="en-US" sz="1200" dirty="0"/>
-              <a:t>City</a:t>
-            </a:r>
-          </a:p>
-          <a:p>
-            <a:pPr marL="342900" indent="-342900">
-              <a:buFont typeface="Arial" panose="020B0604020202020204" pitchFamily="34" charset="0"/>
-              <a:buChar char="•"/>
-            </a:pPr>
-            <a:r>
-              <a:rPr lang="en-US" sz="1200" dirty="0"/>
-              <a:t>State</a:t>
+              <a:t>Location (City &amp; State)</a:t>
             </a:r>
           </a:p>
         </p:txBody>
@@ -21279,228 +20732,12 @@
           </a:p>
         </p:txBody>
       </p:sp>
-    </p:spTree>
-    <p:extLst>
-      <p:ext uri="{BB962C8B-B14F-4D97-AF65-F5344CB8AC3E}">
-        <p14:creationId xmlns:p14="http://schemas.microsoft.com/office/powerpoint/2010/main" val="832593484"/>
-      </p:ext>
-    </p:extLst>
-  </p:cSld>
-  <p:clrMapOvr>
-    <a:masterClrMapping/>
-  </p:clrMapOvr>
-</p:sld>
-</file>
-
-<file path=ppt/slides/slide4.xml><?xml version="1.0" encoding="utf-8"?>
-<p:sld xmlns:a="http://schemas.openxmlformats.org/drawingml/2006/main" xmlns:r="http://schemas.openxmlformats.org/officeDocument/2006/relationships" xmlns:p="http://schemas.openxmlformats.org/presentationml/2006/main">
-  <p:cSld>
-    <p:spTree>
-      <p:nvGrpSpPr>
-        <p:cNvPr id="1" name=""/>
-        <p:cNvGrpSpPr/>
-        <p:nvPr/>
-      </p:nvGrpSpPr>
-      <p:grpSpPr>
-        <a:xfrm>
-          <a:off x="0" y="0"/>
-          <a:ext cx="0" cy="0"/>
-          <a:chOff x="0" y="0"/>
-          <a:chExt cx="0" cy="0"/>
-        </a:xfrm>
-      </p:grpSpPr>
-      <p:sp>
-        <p:nvSpPr>
-          <p:cNvPr id="2" name="Title 1">
+      <p:pic>
+        <p:nvPicPr>
+          <p:cNvPr id="10" name="Picture 9">
             <a:extLst>
               <a:ext uri="{FF2B5EF4-FFF2-40B4-BE49-F238E27FC236}">
-                <a16:creationId xmlns:a16="http://schemas.microsoft.com/office/drawing/2014/main" id="{C4752280-F4DF-4EFB-B55C-9788B7D62FEC}"/>
-              </a:ext>
-            </a:extLst>
-          </p:cNvPr>
-          <p:cNvSpPr>
-            <a:spLocks noGrp="1"/>
-          </p:cNvSpPr>
-          <p:nvPr>
-            <p:ph type="title"/>
-          </p:nvPr>
-        </p:nvSpPr>
-        <p:spPr/>
-        <p:txBody>
-          <a:bodyPr/>
-          <a:lstStyle/>
-          <a:p>
-            <a:r>
-              <a:rPr lang="en-US" dirty="0"/>
-              <a:t>Missing Values</a:t>
-            </a:r>
-          </a:p>
-        </p:txBody>
-      </p:sp>
-      <p:pic>
-        <p:nvPicPr>
-          <p:cNvPr id="4" name="Picture 2">
-            <a:extLst>
-              <a:ext uri="{FF2B5EF4-FFF2-40B4-BE49-F238E27FC236}">
-                <a16:creationId xmlns:a16="http://schemas.microsoft.com/office/drawing/2014/main" id="{C38FB1BA-CEF8-4704-8F2C-9584129155BE}"/>
-              </a:ext>
-            </a:extLst>
-          </p:cNvPr>
-          <p:cNvPicPr>
-            <a:picLocks noChangeAspect="1" noChangeArrowheads="1"/>
-          </p:cNvPicPr>
-          <p:nvPr/>
-        </p:nvPicPr>
-        <p:blipFill rotWithShape="1">
-          <a:blip r:embed="rId3" cstate="print">
-            <a:extLst>
-              <a:ext uri="{28A0092B-C50C-407E-A947-70E740481C1C}">
-                <a14:useLocalDpi xmlns:a14="http://schemas.microsoft.com/office/drawing/2010/main" val="0"/>
-              </a:ext>
-            </a:extLst>
-          </a:blip>
-          <a:srcRect b="12778"/>
-          <a:stretch/>
-        </p:blipFill>
-        <p:spPr bwMode="auto">
-          <a:xfrm>
-            <a:off x="152400" y="1094221"/>
-            <a:ext cx="4206240" cy="2620530"/>
-          </a:xfrm>
-          <a:prstGeom prst="rect">
-            <a:avLst/>
-          </a:prstGeom>
-          <a:noFill/>
-          <a:ln>
-            <a:solidFill>
-              <a:schemeClr val="accent1"/>
-            </a:solidFill>
-          </a:ln>
-          <a:extLst>
-            <a:ext uri="{909E8E84-426E-40DD-AFC4-6F175D3DCCD1}">
-              <a14:hiddenFill xmlns:a14="http://schemas.microsoft.com/office/drawing/2010/main">
-                <a:solidFill>
-                  <a:srgbClr val="FFFFFF"/>
-                </a:solidFill>
-              </a14:hiddenFill>
-            </a:ext>
-          </a:extLst>
-        </p:spPr>
-      </p:pic>
-      <p:pic>
-        <p:nvPicPr>
-          <p:cNvPr id="2052" name="Picture 4">
-            <a:extLst>
-              <a:ext uri="{FF2B5EF4-FFF2-40B4-BE49-F238E27FC236}">
-                <a16:creationId xmlns:a16="http://schemas.microsoft.com/office/drawing/2014/main" id="{3F980578-2894-40FA-84DA-A9854B43F14E}"/>
-              </a:ext>
-            </a:extLst>
-          </p:cNvPr>
-          <p:cNvPicPr>
-            <a:picLocks noChangeAspect="1" noChangeArrowheads="1"/>
-          </p:cNvPicPr>
-          <p:nvPr/>
-        </p:nvPicPr>
-        <p:blipFill rotWithShape="1">
-          <a:blip r:embed="rId4" cstate="print">
-            <a:extLst>
-              <a:ext uri="{28A0092B-C50C-407E-A947-70E740481C1C}">
-                <a14:useLocalDpi xmlns:a14="http://schemas.microsoft.com/office/drawing/2010/main" val="0"/>
-              </a:ext>
-            </a:extLst>
-          </a:blip>
-          <a:srcRect b="12778"/>
-          <a:stretch/>
-        </p:blipFill>
-        <p:spPr bwMode="auto">
-          <a:xfrm>
-            <a:off x="4724400" y="1094221"/>
-            <a:ext cx="4206240" cy="2620530"/>
-          </a:xfrm>
-          <a:prstGeom prst="rect">
-            <a:avLst/>
-          </a:prstGeom>
-          <a:noFill/>
-          <a:ln>
-            <a:solidFill>
-              <a:schemeClr val="accent1"/>
-            </a:solidFill>
-          </a:ln>
-          <a:extLst>
-            <a:ext uri="{909E8E84-426E-40DD-AFC4-6F175D3DCCD1}">
-              <a14:hiddenFill xmlns:a14="http://schemas.microsoft.com/office/drawing/2010/main">
-                <a:solidFill>
-                  <a:srgbClr val="FFFFFF"/>
-                </a:solidFill>
-              </a14:hiddenFill>
-            </a:ext>
-          </a:extLst>
-        </p:spPr>
-      </p:pic>
-    </p:spTree>
-    <p:extLst>
-      <p:ext uri="{BB962C8B-B14F-4D97-AF65-F5344CB8AC3E}">
-        <p14:creationId xmlns:p14="http://schemas.microsoft.com/office/powerpoint/2010/main" val="1524816342"/>
-      </p:ext>
-    </p:extLst>
-  </p:cSld>
-  <p:clrMapOvr>
-    <a:masterClrMapping/>
-  </p:clrMapOvr>
-</p:sld>
-</file>
-
-<file path=ppt/slides/slide5.xml><?xml version="1.0" encoding="utf-8"?>
-<p:sld xmlns:a="http://schemas.openxmlformats.org/drawingml/2006/main" xmlns:r="http://schemas.openxmlformats.org/officeDocument/2006/relationships" xmlns:p="http://schemas.openxmlformats.org/presentationml/2006/main">
-  <p:cSld>
-    <p:spTree>
-      <p:nvGrpSpPr>
-        <p:cNvPr id="1" name=""/>
-        <p:cNvGrpSpPr/>
-        <p:nvPr/>
-      </p:nvGrpSpPr>
-      <p:grpSpPr>
-        <a:xfrm>
-          <a:off x="0" y="0"/>
-          <a:ext cx="0" cy="0"/>
-          <a:chOff x="0" y="0"/>
-          <a:chExt cx="0" cy="0"/>
-        </a:xfrm>
-      </p:grpSpPr>
-      <p:sp>
-        <p:nvSpPr>
-          <p:cNvPr id="2" name="Title 1">
-            <a:extLst>
-              <a:ext uri="{FF2B5EF4-FFF2-40B4-BE49-F238E27FC236}">
-                <a16:creationId xmlns:a16="http://schemas.microsoft.com/office/drawing/2014/main" id="{6FE82648-CE36-4A2B-B3C3-9EBD346029FA}"/>
-              </a:ext>
-            </a:extLst>
-          </p:cNvPr>
-          <p:cNvSpPr>
-            <a:spLocks noGrp="1"/>
-          </p:cNvSpPr>
-          <p:nvPr>
-            <p:ph type="title"/>
-          </p:nvPr>
-        </p:nvSpPr>
-        <p:spPr/>
-        <p:txBody>
-          <a:bodyPr/>
-          <a:lstStyle/>
-          <a:p>
-            <a:r>
-              <a:rPr lang="en-US" dirty="0"/>
-              <a:t>Merge beer and Brewery</a:t>
-            </a:r>
-          </a:p>
-        </p:txBody>
-      </p:sp>
-      <p:pic>
-        <p:nvPicPr>
-          <p:cNvPr id="4" name="Picture 3">
-            <a:extLst>
-              <a:ext uri="{FF2B5EF4-FFF2-40B4-BE49-F238E27FC236}">
-                <a16:creationId xmlns:a16="http://schemas.microsoft.com/office/drawing/2014/main" id="{C230CC9A-AA53-4CB2-95F8-89DC600FCAFC}"/>
+                <a16:creationId xmlns:a16="http://schemas.microsoft.com/office/drawing/2014/main" id="{A56117B1-9819-42E5-AEFC-9AD2D125A6E9}"/>
               </a:ext>
             </a:extLst>
           </p:cNvPr>
@@ -21517,68 +20754,8 @@
         </p:blipFill>
         <p:spPr>
           <a:xfrm>
-            <a:off x="152400" y="1063228"/>
-            <a:ext cx="5787160" cy="1554480"/>
-          </a:xfrm>
-          <a:prstGeom prst="rect">
-            <a:avLst/>
-          </a:prstGeom>
-        </p:spPr>
-      </p:pic>
-      <p:pic>
-        <p:nvPicPr>
-          <p:cNvPr id="5" name="Picture 4">
-            <a:extLst>
-              <a:ext uri="{FF2B5EF4-FFF2-40B4-BE49-F238E27FC236}">
-                <a16:creationId xmlns:a16="http://schemas.microsoft.com/office/drawing/2014/main" id="{EEC5FDBD-EA7A-4924-8D84-94C46331C6D1}"/>
-              </a:ext>
-            </a:extLst>
-          </p:cNvPr>
-          <p:cNvPicPr>
-            <a:picLocks noChangeAspect="1"/>
-          </p:cNvPicPr>
-          <p:nvPr/>
-        </p:nvPicPr>
-        <p:blipFill>
-          <a:blip r:embed="rId4"/>
-          <a:stretch>
-            <a:fillRect/>
-          </a:stretch>
-        </p:blipFill>
-        <p:spPr>
-          <a:xfrm>
-            <a:off x="4114800" y="1063228"/>
-            <a:ext cx="5755946" cy="1554480"/>
-          </a:xfrm>
-          <a:prstGeom prst="rect">
-            <a:avLst/>
-          </a:prstGeom>
-        </p:spPr>
-      </p:pic>
-      <p:pic>
-        <p:nvPicPr>
-          <p:cNvPr id="6" name="Picture 5">
-            <a:extLst>
-              <a:ext uri="{FF2B5EF4-FFF2-40B4-BE49-F238E27FC236}">
-                <a16:creationId xmlns:a16="http://schemas.microsoft.com/office/drawing/2014/main" id="{99CA9CC8-D41E-4EC2-9AD9-88EAA1C3F8F8}"/>
-              </a:ext>
-            </a:extLst>
-          </p:cNvPr>
-          <p:cNvPicPr>
-            <a:picLocks noChangeAspect="1"/>
-          </p:cNvPicPr>
-          <p:nvPr/>
-        </p:nvPicPr>
-        <p:blipFill>
-          <a:blip r:embed="rId4"/>
-          <a:stretch>
-            <a:fillRect/>
-          </a:stretch>
-        </p:blipFill>
-        <p:spPr>
-          <a:xfrm>
-            <a:off x="1905000" y="3028950"/>
-            <a:ext cx="5755946" cy="1554480"/>
+            <a:off x="4038600" y="3536645"/>
+            <a:ext cx="3108960" cy="1596973"/>
           </a:xfrm>
           <a:prstGeom prst="rect">
             <a:avLst/>
@@ -21587,43 +20764,70 @@
       </p:pic>
       <p:sp>
         <p:nvSpPr>
-          <p:cNvPr id="9" name="TextBox 8">
+          <p:cNvPr id="11" name="Rectangle 10">
             <a:extLst>
               <a:ext uri="{FF2B5EF4-FFF2-40B4-BE49-F238E27FC236}">
-                <a16:creationId xmlns:a16="http://schemas.microsoft.com/office/drawing/2014/main" id="{9DAB8808-38A7-46F2-B73D-F269E6BEEAC4}"/>
+                <a16:creationId xmlns:a16="http://schemas.microsoft.com/office/drawing/2014/main" id="{A2387AF3-1DA3-4623-8B20-25111713E76F}"/>
               </a:ext>
             </a:extLst>
           </p:cNvPr>
-          <p:cNvSpPr txBox="1"/>
+          <p:cNvSpPr/>
           <p:nvPr/>
         </p:nvSpPr>
         <p:spPr>
           <a:xfrm>
-            <a:off x="228600" y="2800350"/>
-            <a:ext cx="1371600" cy="1477328"/>
+            <a:off x="7086600" y="3502355"/>
+            <a:ext cx="1981200" cy="1077218"/>
           </a:xfrm>
           <a:prstGeom prst="rect">
             <a:avLst/>
           </a:prstGeom>
-          <a:noFill/>
         </p:spPr>
         <p:txBody>
-          <a:bodyPr wrap="square" rtlCol="0">
+          <a:bodyPr wrap="square">
             <a:spAutoFit/>
           </a:bodyPr>
           <a:lstStyle/>
           <a:p>
+            <a:pPr marL="160020"/>
             <a:r>
-              <a:rPr lang="en-US" dirty="0"/>
-              <a:t>Insert single joined arrow that simulates the merge</a:t>
+              <a:rPr lang="en-US" sz="1200" b="1" dirty="0"/>
+              <a:t>Data Decisions</a:t>
             </a:r>
+          </a:p>
+          <a:p>
+            <a:pPr marL="274320" indent="-182880">
+              <a:buFont typeface="Arial" panose="020B0604020202020204" pitchFamily="34" charset="0"/>
+              <a:buChar char="•"/>
+            </a:pPr>
+            <a:r>
+              <a:rPr lang="en-US" sz="1200" dirty="0"/>
+              <a:t>Excluded all beers with no ABV</a:t>
+            </a:r>
+          </a:p>
+          <a:p>
+            <a:pPr marL="274320" indent="-182880">
+              <a:buFont typeface="Arial" panose="020B0604020202020204" pitchFamily="34" charset="0"/>
+              <a:buChar char="•"/>
+            </a:pPr>
+            <a:r>
+              <a:rPr lang="en-US" sz="1200" dirty="0"/>
+              <a:t>Included beers with no IBU</a:t>
+            </a:r>
+          </a:p>
+          <a:p>
+            <a:pPr indent="-194310">
+              <a:buFont typeface="Arial" panose="020B0604020202020204" pitchFamily="34" charset="0"/>
+              <a:buChar char="•"/>
+            </a:pPr>
+            <a:endParaRPr lang="en-US" sz="400" dirty="0"/>
           </a:p>
         </p:txBody>
       </p:sp>
     </p:spTree>
     <p:extLst>
       <p:ext uri="{BB962C8B-B14F-4D97-AF65-F5344CB8AC3E}">
-        <p14:creationId xmlns:p14="http://schemas.microsoft.com/office/powerpoint/2010/main" val="2460916010"/>
+        <p14:creationId xmlns:p14="http://schemas.microsoft.com/office/powerpoint/2010/main" val="832593484"/>
       </p:ext>
     </p:extLst>
   </p:cSld>
@@ -21633,7 +20837,7 @@
 </p:sld>
 </file>
 
-<file path=ppt/slides/slide6.xml><?xml version="1.0" encoding="utf-8"?>
+<file path=ppt/slides/slide4.xml><?xml version="1.0" encoding="utf-8"?>
 <p:sld xmlns:a="http://schemas.openxmlformats.org/drawingml/2006/main" xmlns:r="http://schemas.openxmlformats.org/officeDocument/2006/relationships" xmlns:p="http://schemas.openxmlformats.org/presentationml/2006/main">
   <p:cSld>
     <p:spTree>
@@ -21707,8 +20911,8 @@
         </p:blipFill>
         <p:spPr bwMode="auto">
           <a:xfrm>
-            <a:off x="304800" y="1063228"/>
-            <a:ext cx="4454732" cy="2956322"/>
+            <a:off x="77090" y="934224"/>
+            <a:ext cx="3749040" cy="2487998"/>
           </a:xfrm>
           <a:prstGeom prst="rect">
             <a:avLst/>
@@ -21734,13 +20938,15 @@
               </a:ext>
             </a:extLst>
           </p:cNvPr>
-          <p:cNvGrpSpPr/>
+          <p:cNvGrpSpPr>
+            <a:grpSpLocks noChangeAspect="1"/>
+          </p:cNvGrpSpPr>
           <p:nvPr/>
         </p:nvGrpSpPr>
         <p:grpSpPr>
           <a:xfrm>
-            <a:off x="0" y="3333750"/>
-            <a:ext cx="1786328" cy="1155671"/>
+            <a:off x="77090" y="2590697"/>
+            <a:ext cx="1057046" cy="621792"/>
             <a:chOff x="463758" y="3304304"/>
             <a:chExt cx="1786328" cy="1155671"/>
           </a:xfrm>
@@ -21760,7 +20966,7 @@
             <p:nvPr/>
           </p:nvPicPr>
           <p:blipFill>
-            <a:blip r:embed="rId4">
+            <a:blip r:embed="rId4" cstate="print">
               <a:extLst>
                 <a:ext uri="{28A0092B-C50C-407E-A947-70E740481C1C}">
                   <a14:useLocalDpi xmlns:a14="http://schemas.microsoft.com/office/drawing/2010/main" val="0"/>
@@ -21795,8 +21001,8 @@
           </p:nvSpPr>
           <p:spPr>
             <a:xfrm>
-              <a:off x="1339745" y="3666696"/>
-              <a:ext cx="342900" cy="215444"/>
+              <a:off x="1339744" y="3666696"/>
+              <a:ext cx="538991" cy="400427"/>
             </a:xfrm>
             <a:prstGeom prst="rect">
               <a:avLst/>
@@ -21817,6 +21023,36 @@
           </p:txBody>
         </p:sp>
       </p:grpSp>
+      <p:pic>
+        <p:nvPicPr>
+          <p:cNvPr id="3" name="Picture 2">
+            <a:extLst>
+              <a:ext uri="{FF2B5EF4-FFF2-40B4-BE49-F238E27FC236}">
+                <a16:creationId xmlns:a16="http://schemas.microsoft.com/office/drawing/2014/main" id="{871AE67E-71D0-41FB-A391-78FAA0B99D90}"/>
+              </a:ext>
+            </a:extLst>
+          </p:cNvPr>
+          <p:cNvPicPr>
+            <a:picLocks noChangeAspect="1"/>
+          </p:cNvPicPr>
+          <p:nvPr/>
+        </p:nvPicPr>
+        <p:blipFill>
+          <a:blip r:embed="rId5"/>
+          <a:stretch>
+            <a:fillRect/>
+          </a:stretch>
+        </p:blipFill>
+        <p:spPr>
+          <a:xfrm>
+            <a:off x="5181600" y="895350"/>
+            <a:ext cx="3566160" cy="2317139"/>
+          </a:xfrm>
+          <a:prstGeom prst="rect">
+            <a:avLst/>
+          </a:prstGeom>
+        </p:spPr>
+      </p:pic>
       <p:grpSp>
         <p:nvGrpSpPr>
           <p:cNvPr id="8" name="Group 7">
@@ -21826,13 +21062,15 @@
               </a:ext>
             </a:extLst>
           </p:cNvPr>
-          <p:cNvGrpSpPr/>
+          <p:cNvGrpSpPr>
+            <a:grpSpLocks noChangeAspect="1"/>
+          </p:cNvGrpSpPr>
           <p:nvPr/>
         </p:nvGrpSpPr>
         <p:grpSpPr>
           <a:xfrm>
-            <a:off x="1883451" y="3856822"/>
-            <a:ext cx="956872" cy="632599"/>
+            <a:off x="1247422" y="3028950"/>
+            <a:ext cx="688948" cy="455472"/>
             <a:chOff x="2377815" y="3751637"/>
             <a:chExt cx="956872" cy="632599"/>
           </a:xfrm>
@@ -21852,7 +21090,7 @@
             <p:nvPr/>
           </p:nvPicPr>
           <p:blipFill>
-            <a:blip r:embed="rId5">
+            <a:blip r:embed="rId6" cstate="print">
               <a:extLst>
                 <a:ext uri="{28A0092B-C50C-407E-A947-70E740481C1C}">
                   <a14:useLocalDpi xmlns:a14="http://schemas.microsoft.com/office/drawing/2010/main" val="0"/>
@@ -21888,7 +21126,7 @@
           <p:spPr>
             <a:xfrm>
               <a:off x="2884045" y="3960214"/>
-              <a:ext cx="342900" cy="215444"/>
+              <a:ext cx="450642" cy="299227"/>
             </a:xfrm>
             <a:prstGeom prst="rect">
               <a:avLst/>
@@ -21909,12 +21147,745 @@
           </p:txBody>
         </p:sp>
       </p:grpSp>
+      <p:sp>
+        <p:nvSpPr>
+          <p:cNvPr id="13" name="TextBox 12">
+            <a:extLst>
+              <a:ext uri="{FF2B5EF4-FFF2-40B4-BE49-F238E27FC236}">
+                <a16:creationId xmlns:a16="http://schemas.microsoft.com/office/drawing/2014/main" id="{3AEE4A84-F268-4FBB-BBBF-E08ACC13DA49}"/>
+              </a:ext>
+            </a:extLst>
+          </p:cNvPr>
+          <p:cNvSpPr txBox="1"/>
+          <p:nvPr/>
+        </p:nvSpPr>
+        <p:spPr>
+          <a:xfrm>
+            <a:off x="1486790" y="3466493"/>
+            <a:ext cx="6614160" cy="1015663"/>
+          </a:xfrm>
+          <a:prstGeom prst="rect">
+            <a:avLst/>
+          </a:prstGeom>
+          <a:noFill/>
+        </p:spPr>
+        <p:txBody>
+          <a:bodyPr wrap="square" rtlCol="0">
+            <a:spAutoFit/>
+          </a:bodyPr>
+          <a:lstStyle/>
+          <a:p>
+            <a:pPr marL="285750" indent="-285750">
+              <a:buFont typeface="+mj-lt"/>
+              <a:buAutoNum type="arabicPeriod"/>
+            </a:pPr>
+            <a:r>
+              <a:rPr lang="en-US" sz="1000" dirty="0"/>
+              <a:t>South and North Dakota had the lowest # of breweries, but the 3</a:t>
+            </a:r>
+            <a:r>
+              <a:rPr lang="en-US" sz="1000" baseline="30000" dirty="0"/>
+              <a:t>rd</a:t>
+            </a:r>
+            <a:r>
+              <a:rPr lang="en-US" sz="1000" dirty="0"/>
+              <a:t> &amp; 4</a:t>
+            </a:r>
+            <a:r>
+              <a:rPr lang="en-US" sz="1000" baseline="30000" dirty="0"/>
+              <a:t>th</a:t>
+            </a:r>
+            <a:r>
+              <a:rPr lang="en-US" sz="1000" dirty="0"/>
+              <a:t> highest beer consumption per capita. </a:t>
+            </a:r>
+          </a:p>
+          <a:p>
+            <a:pPr marL="285750" indent="-285750">
+              <a:buFont typeface="+mj-lt"/>
+              <a:buAutoNum type="arabicPeriod"/>
+            </a:pPr>
+            <a:r>
+              <a:rPr lang="en-US" sz="1000" dirty="0"/>
+              <a:t>New Hampshire has the highest consumption, but only 3 breweries. NH has no sales tax on beer, so the consumption also includes people that come from Vermont, Massachusetts, and Maine</a:t>
+            </a:r>
+          </a:p>
+          <a:p>
+            <a:pPr marL="285750" indent="-285750">
+              <a:buFont typeface="+mj-lt"/>
+              <a:buAutoNum type="arabicPeriod"/>
+            </a:pPr>
+            <a:r>
+              <a:rPr lang="en-US" sz="1000" dirty="0"/>
+              <a:t>Utah has 4 breweries, but the lowest beer consumption. The biggest city in Utah, Salt Lak City, only allows &lt; 4.0% ABV</a:t>
+            </a:r>
+          </a:p>
+          <a:p>
+            <a:pPr marL="285750" indent="-285750">
+              <a:buFont typeface="+mj-lt"/>
+              <a:buAutoNum type="arabicPeriod"/>
+            </a:pPr>
+            <a:r>
+              <a:rPr lang="en-US" sz="1000" dirty="0"/>
+              <a:t>With the popularity of craft beers and breweries. The pacific northwest is gaining on CA and CO for # of breweries. Beer consumption for Oregon is 14</a:t>
+            </a:r>
+            <a:r>
+              <a:rPr lang="en-US" sz="1000" baseline="30000" dirty="0"/>
+              <a:t>th</a:t>
+            </a:r>
+            <a:r>
+              <a:rPr lang="en-US" sz="1000" dirty="0"/>
+              <a:t> and Washington 37</a:t>
+            </a:r>
+            <a:r>
+              <a:rPr lang="en-US" sz="1000" baseline="30000" dirty="0"/>
+              <a:t>th</a:t>
+            </a:r>
+            <a:r>
+              <a:rPr lang="en-US" sz="1000" dirty="0"/>
+              <a:t>. Both have increased consumption by 9% in last 5 years.</a:t>
+            </a:r>
+          </a:p>
+        </p:txBody>
+      </p:sp>
+      <p:sp>
+        <p:nvSpPr>
+          <p:cNvPr id="16" name="TextBox 15">
+            <a:extLst>
+              <a:ext uri="{FF2B5EF4-FFF2-40B4-BE49-F238E27FC236}">
+                <a16:creationId xmlns:a16="http://schemas.microsoft.com/office/drawing/2014/main" id="{E5B29420-36CD-4AE9-A3B2-EA6E175E7AAC}"/>
+              </a:ext>
+            </a:extLst>
+          </p:cNvPr>
+          <p:cNvSpPr txBox="1"/>
+          <p:nvPr/>
+        </p:nvSpPr>
+        <p:spPr>
+          <a:xfrm>
+            <a:off x="6598920" y="1137587"/>
+            <a:ext cx="365760" cy="457200"/>
+          </a:xfrm>
+          <a:prstGeom prst="rect">
+            <a:avLst/>
+          </a:prstGeom>
+          <a:noFill/>
+          <a:ln w="19050">
+            <a:solidFill>
+              <a:srgbClr val="00B050"/>
+            </a:solidFill>
+          </a:ln>
+        </p:spPr>
+        <p:txBody>
+          <a:bodyPr wrap="square" rtlCol="0">
+            <a:spAutoFit/>
+          </a:bodyPr>
+          <a:lstStyle/>
+          <a:p>
+            <a:r>
+              <a:rPr lang="en-US" dirty="0"/>
+              <a:t> </a:t>
+            </a:r>
+          </a:p>
+        </p:txBody>
+      </p:sp>
+      <p:sp>
+        <p:nvSpPr>
+          <p:cNvPr id="17" name="TextBox 16">
+            <a:extLst>
+              <a:ext uri="{FF2B5EF4-FFF2-40B4-BE49-F238E27FC236}">
+                <a16:creationId xmlns:a16="http://schemas.microsoft.com/office/drawing/2014/main" id="{4839EAC9-E90A-4357-9CF5-11C2C00D9FCD}"/>
+              </a:ext>
+            </a:extLst>
+          </p:cNvPr>
+          <p:cNvSpPr txBox="1"/>
+          <p:nvPr/>
+        </p:nvSpPr>
+        <p:spPr>
+          <a:xfrm>
+            <a:off x="1494410" y="1063228"/>
+            <a:ext cx="457200" cy="548640"/>
+          </a:xfrm>
+          <a:prstGeom prst="rect">
+            <a:avLst/>
+          </a:prstGeom>
+          <a:noFill/>
+          <a:ln w="19050">
+            <a:solidFill>
+              <a:srgbClr val="00B050"/>
+            </a:solidFill>
+          </a:ln>
+        </p:spPr>
+        <p:txBody>
+          <a:bodyPr wrap="square" rtlCol="0">
+            <a:spAutoFit/>
+          </a:bodyPr>
+          <a:lstStyle/>
+          <a:p>
+            <a:r>
+              <a:rPr lang="en-US" dirty="0"/>
+              <a:t> </a:t>
+            </a:r>
+          </a:p>
+        </p:txBody>
+      </p:sp>
+      <p:sp>
+        <p:nvSpPr>
+          <p:cNvPr id="18" name="TextBox 17">
+            <a:extLst>
+              <a:ext uri="{FF2B5EF4-FFF2-40B4-BE49-F238E27FC236}">
+                <a16:creationId xmlns:a16="http://schemas.microsoft.com/office/drawing/2014/main" id="{C24B47A4-83D7-4CBD-9D14-001484753A9B}"/>
+              </a:ext>
+            </a:extLst>
+          </p:cNvPr>
+          <p:cNvSpPr txBox="1"/>
+          <p:nvPr/>
+        </p:nvSpPr>
+        <p:spPr>
+          <a:xfrm>
+            <a:off x="790222" y="1707804"/>
+            <a:ext cx="457200" cy="369332"/>
+          </a:xfrm>
+          <a:prstGeom prst="rect">
+            <a:avLst/>
+          </a:prstGeom>
+          <a:noFill/>
+          <a:ln w="19050">
+            <a:solidFill>
+              <a:srgbClr val="00B050"/>
+            </a:solidFill>
+          </a:ln>
+        </p:spPr>
+        <p:txBody>
+          <a:bodyPr wrap="square" rtlCol="0">
+            <a:spAutoFit/>
+          </a:bodyPr>
+          <a:lstStyle/>
+          <a:p>
+            <a:r>
+              <a:rPr lang="en-US" dirty="0"/>
+              <a:t> </a:t>
+            </a:r>
+          </a:p>
+        </p:txBody>
+      </p:sp>
+      <p:sp>
+        <p:nvSpPr>
+          <p:cNvPr id="19" name="TextBox 18">
+            <a:extLst>
+              <a:ext uri="{FF2B5EF4-FFF2-40B4-BE49-F238E27FC236}">
+                <a16:creationId xmlns:a16="http://schemas.microsoft.com/office/drawing/2014/main" id="{AE4833B9-D6C1-44B5-8608-77C3A7B2C4BE}"/>
+              </a:ext>
+            </a:extLst>
+          </p:cNvPr>
+          <p:cNvSpPr txBox="1"/>
+          <p:nvPr/>
+        </p:nvSpPr>
+        <p:spPr>
+          <a:xfrm>
+            <a:off x="5943600" y="1611868"/>
+            <a:ext cx="365760" cy="369332"/>
+          </a:xfrm>
+          <a:prstGeom prst="rect">
+            <a:avLst/>
+          </a:prstGeom>
+          <a:noFill/>
+          <a:ln w="19050">
+            <a:solidFill>
+              <a:srgbClr val="00B050"/>
+            </a:solidFill>
+          </a:ln>
+        </p:spPr>
+        <p:txBody>
+          <a:bodyPr wrap="square" rtlCol="0">
+            <a:spAutoFit/>
+          </a:bodyPr>
+          <a:lstStyle/>
+          <a:p>
+            <a:r>
+              <a:rPr lang="en-US" dirty="0"/>
+              <a:t> </a:t>
+            </a:r>
+          </a:p>
+        </p:txBody>
+      </p:sp>
+      <p:sp>
+        <p:nvSpPr>
+          <p:cNvPr id="20" name="TextBox 19">
+            <a:extLst>
+              <a:ext uri="{FF2B5EF4-FFF2-40B4-BE49-F238E27FC236}">
+                <a16:creationId xmlns:a16="http://schemas.microsoft.com/office/drawing/2014/main" id="{9708238A-1348-412D-B837-5F852B79610D}"/>
+              </a:ext>
+            </a:extLst>
+          </p:cNvPr>
+          <p:cNvSpPr txBox="1"/>
+          <p:nvPr/>
+        </p:nvSpPr>
+        <p:spPr>
+          <a:xfrm>
+            <a:off x="6333110" y="968216"/>
+            <a:ext cx="258190" cy="369332"/>
+          </a:xfrm>
+          <a:prstGeom prst="rect">
+            <a:avLst/>
+          </a:prstGeom>
+          <a:noFill/>
+        </p:spPr>
+        <p:txBody>
+          <a:bodyPr wrap="square" rtlCol="0">
+            <a:spAutoFit/>
+          </a:bodyPr>
+          <a:lstStyle/>
+          <a:p>
+            <a:r>
+              <a:rPr lang="en-US" dirty="0">
+                <a:solidFill>
+                  <a:srgbClr val="00B050"/>
+                </a:solidFill>
+              </a:rPr>
+              <a:t>1</a:t>
+            </a:r>
+          </a:p>
+        </p:txBody>
+      </p:sp>
+      <p:sp>
+        <p:nvSpPr>
+          <p:cNvPr id="21" name="TextBox 20">
+            <a:extLst>
+              <a:ext uri="{FF2B5EF4-FFF2-40B4-BE49-F238E27FC236}">
+                <a16:creationId xmlns:a16="http://schemas.microsoft.com/office/drawing/2014/main" id="{89A547CA-7700-45BD-9FA5-EFB39A34132E}"/>
+              </a:ext>
+            </a:extLst>
+          </p:cNvPr>
+          <p:cNvSpPr txBox="1"/>
+          <p:nvPr/>
+        </p:nvSpPr>
+        <p:spPr>
+          <a:xfrm>
+            <a:off x="1247422" y="853079"/>
+            <a:ext cx="258190" cy="369332"/>
+          </a:xfrm>
+          <a:prstGeom prst="rect">
+            <a:avLst/>
+          </a:prstGeom>
+          <a:noFill/>
+        </p:spPr>
+        <p:txBody>
+          <a:bodyPr wrap="square" rtlCol="0">
+            <a:spAutoFit/>
+          </a:bodyPr>
+          <a:lstStyle/>
+          <a:p>
+            <a:r>
+              <a:rPr lang="en-US" dirty="0">
+                <a:solidFill>
+                  <a:srgbClr val="00B050"/>
+                </a:solidFill>
+              </a:rPr>
+              <a:t>1</a:t>
+            </a:r>
+          </a:p>
+        </p:txBody>
+      </p:sp>
+      <p:sp>
+        <p:nvSpPr>
+          <p:cNvPr id="22" name="TextBox 21">
+            <a:extLst>
+              <a:ext uri="{FF2B5EF4-FFF2-40B4-BE49-F238E27FC236}">
+                <a16:creationId xmlns:a16="http://schemas.microsoft.com/office/drawing/2014/main" id="{0E8A1BBB-ECCC-44F7-A7E2-04FD74C820DB}"/>
+              </a:ext>
+            </a:extLst>
+          </p:cNvPr>
+          <p:cNvSpPr txBox="1"/>
+          <p:nvPr/>
+        </p:nvSpPr>
+        <p:spPr>
+          <a:xfrm>
+            <a:off x="6082985" y="1311830"/>
+            <a:ext cx="258190" cy="369332"/>
+          </a:xfrm>
+          <a:prstGeom prst="rect">
+            <a:avLst/>
+          </a:prstGeom>
+          <a:noFill/>
+        </p:spPr>
+        <p:txBody>
+          <a:bodyPr wrap="square" rtlCol="0">
+            <a:spAutoFit/>
+          </a:bodyPr>
+          <a:lstStyle/>
+          <a:p>
+            <a:r>
+              <a:rPr lang="en-US" dirty="0">
+                <a:solidFill>
+                  <a:srgbClr val="00B050"/>
+                </a:solidFill>
+              </a:rPr>
+              <a:t>3</a:t>
+            </a:r>
+          </a:p>
+        </p:txBody>
+      </p:sp>
+      <p:sp>
+        <p:nvSpPr>
+          <p:cNvPr id="23" name="TextBox 22">
+            <a:extLst>
+              <a:ext uri="{FF2B5EF4-FFF2-40B4-BE49-F238E27FC236}">
+                <a16:creationId xmlns:a16="http://schemas.microsoft.com/office/drawing/2014/main" id="{F12E0BBD-889A-4E9B-85FE-D263F1B0C273}"/>
+              </a:ext>
+            </a:extLst>
+          </p:cNvPr>
+          <p:cNvSpPr txBox="1"/>
+          <p:nvPr/>
+        </p:nvSpPr>
+        <p:spPr>
+          <a:xfrm>
+            <a:off x="635119" y="1421725"/>
+            <a:ext cx="258190" cy="369332"/>
+          </a:xfrm>
+          <a:prstGeom prst="rect">
+            <a:avLst/>
+          </a:prstGeom>
+          <a:noFill/>
+        </p:spPr>
+        <p:txBody>
+          <a:bodyPr wrap="square" rtlCol="0">
+            <a:spAutoFit/>
+          </a:bodyPr>
+          <a:lstStyle/>
+          <a:p>
+            <a:r>
+              <a:rPr lang="en-US" dirty="0">
+                <a:solidFill>
+                  <a:srgbClr val="00B050"/>
+                </a:solidFill>
+              </a:rPr>
+              <a:t>3</a:t>
+            </a:r>
+          </a:p>
+        </p:txBody>
+      </p:sp>
+      <p:sp>
+        <p:nvSpPr>
+          <p:cNvPr id="24" name="TextBox 23">
+            <a:extLst>
+              <a:ext uri="{FF2B5EF4-FFF2-40B4-BE49-F238E27FC236}">
+                <a16:creationId xmlns:a16="http://schemas.microsoft.com/office/drawing/2014/main" id="{163AFA49-870D-4198-80A0-081DFCEB351E}"/>
+              </a:ext>
+            </a:extLst>
+          </p:cNvPr>
+          <p:cNvSpPr txBox="1"/>
+          <p:nvPr/>
+        </p:nvSpPr>
+        <p:spPr>
+          <a:xfrm>
+            <a:off x="8153400" y="1159073"/>
+            <a:ext cx="182880" cy="274320"/>
+          </a:xfrm>
+          <a:prstGeom prst="rect">
+            <a:avLst/>
+          </a:prstGeom>
+          <a:noFill/>
+          <a:ln w="19050">
+            <a:solidFill>
+              <a:srgbClr val="00B050"/>
+            </a:solidFill>
+          </a:ln>
+        </p:spPr>
+        <p:txBody>
+          <a:bodyPr wrap="square" rtlCol="0">
+            <a:spAutoFit/>
+          </a:bodyPr>
+          <a:lstStyle/>
+          <a:p>
+            <a:r>
+              <a:rPr lang="en-US" dirty="0"/>
+              <a:t> </a:t>
+            </a:r>
+          </a:p>
+        </p:txBody>
+      </p:sp>
+      <p:sp>
+        <p:nvSpPr>
+          <p:cNvPr id="25" name="TextBox 24">
+            <a:extLst>
+              <a:ext uri="{FF2B5EF4-FFF2-40B4-BE49-F238E27FC236}">
+                <a16:creationId xmlns:a16="http://schemas.microsoft.com/office/drawing/2014/main" id="{4EE4CE1B-E1BE-4EFD-A996-9A3F40D2677F}"/>
+              </a:ext>
+            </a:extLst>
+          </p:cNvPr>
+          <p:cNvSpPr txBox="1"/>
+          <p:nvPr/>
+        </p:nvSpPr>
+        <p:spPr>
+          <a:xfrm>
+            <a:off x="7848600" y="935871"/>
+            <a:ext cx="258190" cy="369332"/>
+          </a:xfrm>
+          <a:prstGeom prst="rect">
+            <a:avLst/>
+          </a:prstGeom>
+          <a:noFill/>
+        </p:spPr>
+        <p:txBody>
+          <a:bodyPr wrap="square" rtlCol="0">
+            <a:spAutoFit/>
+          </a:bodyPr>
+          <a:lstStyle/>
+          <a:p>
+            <a:r>
+              <a:rPr lang="en-US" dirty="0">
+                <a:solidFill>
+                  <a:srgbClr val="00B050"/>
+                </a:solidFill>
+              </a:rPr>
+              <a:t>2</a:t>
+            </a:r>
+          </a:p>
+        </p:txBody>
+      </p:sp>
+      <p:sp>
+        <p:nvSpPr>
+          <p:cNvPr id="26" name="TextBox 25">
+            <a:extLst>
+              <a:ext uri="{FF2B5EF4-FFF2-40B4-BE49-F238E27FC236}">
+                <a16:creationId xmlns:a16="http://schemas.microsoft.com/office/drawing/2014/main" id="{27F5396A-F657-43DF-8D76-9D09BAD6B777}"/>
+              </a:ext>
+            </a:extLst>
+          </p:cNvPr>
+          <p:cNvSpPr txBox="1"/>
+          <p:nvPr/>
+        </p:nvSpPr>
+        <p:spPr>
+          <a:xfrm>
+            <a:off x="3376105" y="1354931"/>
+            <a:ext cx="258190" cy="274320"/>
+          </a:xfrm>
+          <a:prstGeom prst="rect">
+            <a:avLst/>
+          </a:prstGeom>
+          <a:noFill/>
+          <a:ln w="19050">
+            <a:solidFill>
+              <a:srgbClr val="00B050"/>
+            </a:solidFill>
+          </a:ln>
+        </p:spPr>
+        <p:txBody>
+          <a:bodyPr wrap="square" rtlCol="0">
+            <a:spAutoFit/>
+          </a:bodyPr>
+          <a:lstStyle/>
+          <a:p>
+            <a:r>
+              <a:rPr lang="en-US" dirty="0"/>
+              <a:t> </a:t>
+            </a:r>
+          </a:p>
+        </p:txBody>
+      </p:sp>
+      <p:sp>
+        <p:nvSpPr>
+          <p:cNvPr id="27" name="TextBox 26">
+            <a:extLst>
+              <a:ext uri="{FF2B5EF4-FFF2-40B4-BE49-F238E27FC236}">
+                <a16:creationId xmlns:a16="http://schemas.microsoft.com/office/drawing/2014/main" id="{DA52C59D-414A-4C78-A3F8-9B0CCAC74CB4}"/>
+              </a:ext>
+            </a:extLst>
+          </p:cNvPr>
+          <p:cNvSpPr txBox="1"/>
+          <p:nvPr/>
+        </p:nvSpPr>
+        <p:spPr>
+          <a:xfrm>
+            <a:off x="3124200" y="1134061"/>
+            <a:ext cx="258190" cy="369332"/>
+          </a:xfrm>
+          <a:prstGeom prst="rect">
+            <a:avLst/>
+          </a:prstGeom>
+          <a:noFill/>
+        </p:spPr>
+        <p:txBody>
+          <a:bodyPr wrap="square" rtlCol="0">
+            <a:spAutoFit/>
+          </a:bodyPr>
+          <a:lstStyle/>
+          <a:p>
+            <a:r>
+              <a:rPr lang="en-US" dirty="0">
+                <a:solidFill>
+                  <a:srgbClr val="00B050"/>
+                </a:solidFill>
+              </a:rPr>
+              <a:t>2</a:t>
+            </a:r>
+          </a:p>
+        </p:txBody>
+      </p:sp>
+      <p:sp>
+        <p:nvSpPr>
+          <p:cNvPr id="28" name="TextBox 27">
+            <a:extLst>
+              <a:ext uri="{FF2B5EF4-FFF2-40B4-BE49-F238E27FC236}">
+                <a16:creationId xmlns:a16="http://schemas.microsoft.com/office/drawing/2014/main" id="{CD6104F6-D666-4D59-A5B9-B337F2AEBBDA}"/>
+              </a:ext>
+            </a:extLst>
+          </p:cNvPr>
+          <p:cNvSpPr txBox="1"/>
+          <p:nvPr/>
+        </p:nvSpPr>
+        <p:spPr>
+          <a:xfrm>
+            <a:off x="214239" y="1045026"/>
+            <a:ext cx="457200" cy="640080"/>
+          </a:xfrm>
+          <a:prstGeom prst="rect">
+            <a:avLst/>
+          </a:prstGeom>
+          <a:noFill/>
+          <a:ln w="19050">
+            <a:solidFill>
+              <a:srgbClr val="00B050"/>
+            </a:solidFill>
+          </a:ln>
+        </p:spPr>
+        <p:txBody>
+          <a:bodyPr wrap="square" rtlCol="0">
+            <a:spAutoFit/>
+          </a:bodyPr>
+          <a:lstStyle/>
+          <a:p>
+            <a:r>
+              <a:rPr lang="en-US" dirty="0"/>
+              <a:t> </a:t>
+            </a:r>
+          </a:p>
+        </p:txBody>
+      </p:sp>
+      <p:sp>
+        <p:nvSpPr>
+          <p:cNvPr id="29" name="TextBox 28">
+            <a:extLst>
+              <a:ext uri="{FF2B5EF4-FFF2-40B4-BE49-F238E27FC236}">
+                <a16:creationId xmlns:a16="http://schemas.microsoft.com/office/drawing/2014/main" id="{2F81B23F-9B1C-41BA-BAFB-365749B47E72}"/>
+              </a:ext>
+            </a:extLst>
+          </p:cNvPr>
+          <p:cNvSpPr txBox="1"/>
+          <p:nvPr/>
+        </p:nvSpPr>
+        <p:spPr>
+          <a:xfrm>
+            <a:off x="-17498" y="829313"/>
+            <a:ext cx="258190" cy="369332"/>
+          </a:xfrm>
+          <a:prstGeom prst="rect">
+            <a:avLst/>
+          </a:prstGeom>
+          <a:noFill/>
+        </p:spPr>
+        <p:txBody>
+          <a:bodyPr wrap="square" rtlCol="0">
+            <a:spAutoFit/>
+          </a:bodyPr>
+          <a:lstStyle/>
+          <a:p>
+            <a:r>
+              <a:rPr lang="en-US" dirty="0">
+                <a:solidFill>
+                  <a:srgbClr val="00B050"/>
+                </a:solidFill>
+              </a:rPr>
+              <a:t>4</a:t>
+            </a:r>
+          </a:p>
+        </p:txBody>
+      </p:sp>
+      <p:sp>
+        <p:nvSpPr>
+          <p:cNvPr id="30" name="TextBox 29">
+            <a:extLst>
+              <a:ext uri="{FF2B5EF4-FFF2-40B4-BE49-F238E27FC236}">
+                <a16:creationId xmlns:a16="http://schemas.microsoft.com/office/drawing/2014/main" id="{B431DC8C-8582-4EB1-9006-90FD4AC388F9}"/>
+              </a:ext>
+            </a:extLst>
+          </p:cNvPr>
+          <p:cNvSpPr txBox="1"/>
+          <p:nvPr/>
+        </p:nvSpPr>
+        <p:spPr>
+          <a:xfrm>
+            <a:off x="5456810" y="985163"/>
+            <a:ext cx="457200" cy="640080"/>
+          </a:xfrm>
+          <a:prstGeom prst="rect">
+            <a:avLst/>
+          </a:prstGeom>
+          <a:noFill/>
+          <a:ln w="19050">
+            <a:solidFill>
+              <a:srgbClr val="00B050"/>
+            </a:solidFill>
+          </a:ln>
+        </p:spPr>
+        <p:txBody>
+          <a:bodyPr wrap="square" rtlCol="0">
+            <a:spAutoFit/>
+          </a:bodyPr>
+          <a:lstStyle/>
+          <a:p>
+            <a:r>
+              <a:rPr lang="en-US" dirty="0"/>
+              <a:t> </a:t>
+            </a:r>
+          </a:p>
+        </p:txBody>
+      </p:sp>
+      <p:sp>
+        <p:nvSpPr>
+          <p:cNvPr id="31" name="TextBox 30">
+            <a:extLst>
+              <a:ext uri="{FF2B5EF4-FFF2-40B4-BE49-F238E27FC236}">
+                <a16:creationId xmlns:a16="http://schemas.microsoft.com/office/drawing/2014/main" id="{19FE87C2-AAE5-4E16-AD1A-F98A63E06407}"/>
+              </a:ext>
+            </a:extLst>
+          </p:cNvPr>
+          <p:cNvSpPr txBox="1"/>
+          <p:nvPr/>
+        </p:nvSpPr>
+        <p:spPr>
+          <a:xfrm>
+            <a:off x="5225073" y="769450"/>
+            <a:ext cx="258190" cy="369332"/>
+          </a:xfrm>
+          <a:prstGeom prst="rect">
+            <a:avLst/>
+          </a:prstGeom>
+          <a:noFill/>
+        </p:spPr>
+        <p:txBody>
+          <a:bodyPr wrap="square" rtlCol="0">
+            <a:spAutoFit/>
+          </a:bodyPr>
+          <a:lstStyle/>
+          <a:p>
+            <a:r>
+              <a:rPr lang="en-US" dirty="0">
+                <a:solidFill>
+                  <a:srgbClr val="00B050"/>
+                </a:solidFill>
+              </a:rPr>
+              <a:t>4</a:t>
+            </a:r>
+          </a:p>
+        </p:txBody>
+      </p:sp>
       <p:pic>
         <p:nvPicPr>
-          <p:cNvPr id="11" name="Picture 10" descr="A picture containing stationary, implement, pencil&#10;&#10;Description automatically generated">
+          <p:cNvPr id="32" name="Picture 31">
             <a:extLst>
               <a:ext uri="{FF2B5EF4-FFF2-40B4-BE49-F238E27FC236}">
-                <a16:creationId xmlns:a16="http://schemas.microsoft.com/office/drawing/2014/main" id="{8F2E8028-4874-4A2B-A74A-B44D2F2CF729}"/>
+                <a16:creationId xmlns:a16="http://schemas.microsoft.com/office/drawing/2014/main" id="{D8348F65-9783-433D-8845-1AB57C814A79}"/>
               </a:ext>
             </a:extLst>
           </p:cNvPr>
@@ -21923,150 +21894,21 @@
           </p:cNvPicPr>
           <p:nvPr/>
         </p:nvPicPr>
-        <p:blipFill>
-          <a:blip r:embed="rId6" cstate="print">
-            <a:extLst>
-              <a:ext uri="{28A0092B-C50C-407E-A947-70E740481C1C}">
-                <a14:useLocalDpi xmlns:a14="http://schemas.microsoft.com/office/drawing/2010/main" val="0"/>
-              </a:ext>
-            </a:extLst>
-          </a:blip>
-          <a:stretch>
-            <a:fillRect/>
-          </a:stretch>
+        <p:blipFill rotWithShape="1">
+          <a:blip r:embed="rId7"/>
+          <a:srcRect t="24516" r="52369" b="28774"/>
+          <a:stretch/>
         </p:blipFill>
         <p:spPr>
           <a:xfrm>
-            <a:off x="4724400" y="1027939"/>
-            <a:ext cx="4364357" cy="2956322"/>
+            <a:off x="3299460" y="2252613"/>
+            <a:ext cx="1920240" cy="959876"/>
           </a:xfrm>
           <a:prstGeom prst="rect">
             <a:avLst/>
           </a:prstGeom>
         </p:spPr>
       </p:pic>
-      <p:sp>
-        <p:nvSpPr>
-          <p:cNvPr id="12" name="TextBox 11">
-            <a:extLst>
-              <a:ext uri="{FF2B5EF4-FFF2-40B4-BE49-F238E27FC236}">
-                <a16:creationId xmlns:a16="http://schemas.microsoft.com/office/drawing/2014/main" id="{E9C739FB-FCAC-4C35-A802-BA59270850A7}"/>
-              </a:ext>
-            </a:extLst>
-          </p:cNvPr>
-          <p:cNvSpPr txBox="1"/>
-          <p:nvPr/>
-        </p:nvSpPr>
-        <p:spPr>
-          <a:xfrm>
-            <a:off x="2283527" y="2865971"/>
-            <a:ext cx="274434" cy="200055"/>
-          </a:xfrm>
-          <a:prstGeom prst="rect">
-            <a:avLst/>
-          </a:prstGeom>
-          <a:noFill/>
-        </p:spPr>
-        <p:txBody>
-          <a:bodyPr wrap="none" rtlCol="0">
-            <a:spAutoFit/>
-          </a:bodyPr>
-          <a:lstStyle/>
-          <a:p>
-            <a:r>
-              <a:rPr lang="en-US" sz="700" dirty="0">
-                <a:solidFill>
-                  <a:srgbClr val="FF0000"/>
-                </a:solidFill>
-              </a:rPr>
-              <a:t>28</a:t>
-            </a:r>
-          </a:p>
-        </p:txBody>
-      </p:sp>
-      <p:sp>
-        <p:nvSpPr>
-          <p:cNvPr id="14" name="TextBox 13">
-            <a:extLst>
-              <a:ext uri="{FF2B5EF4-FFF2-40B4-BE49-F238E27FC236}">
-                <a16:creationId xmlns:a16="http://schemas.microsoft.com/office/drawing/2014/main" id="{2F068543-6D36-4D1D-9D4E-0FD9E20F49DE}"/>
-              </a:ext>
-            </a:extLst>
-          </p:cNvPr>
-          <p:cNvSpPr txBox="1"/>
-          <p:nvPr/>
-        </p:nvSpPr>
-        <p:spPr>
-          <a:xfrm>
-            <a:off x="760179" y="2416022"/>
-            <a:ext cx="274434" cy="200055"/>
-          </a:xfrm>
-          <a:prstGeom prst="rect">
-            <a:avLst/>
-          </a:prstGeom>
-          <a:noFill/>
-        </p:spPr>
-        <p:txBody>
-          <a:bodyPr wrap="none" rtlCol="0">
-            <a:spAutoFit/>
-          </a:bodyPr>
-          <a:lstStyle/>
-          <a:p>
-            <a:r>
-              <a:rPr lang="en-US" sz="700" dirty="0">
-                <a:solidFill>
-                  <a:srgbClr val="FF0000"/>
-                </a:solidFill>
-              </a:rPr>
-              <a:t>39</a:t>
-            </a:r>
-          </a:p>
-        </p:txBody>
-      </p:sp>
-      <p:sp>
-        <p:nvSpPr>
-          <p:cNvPr id="15" name="TextBox 14">
-            <a:extLst>
-              <a:ext uri="{FF2B5EF4-FFF2-40B4-BE49-F238E27FC236}">
-                <a16:creationId xmlns:a16="http://schemas.microsoft.com/office/drawing/2014/main" id="{3EB8C113-62EB-4383-BF2F-8E1274F9B96B}"/>
-              </a:ext>
-            </a:extLst>
-          </p:cNvPr>
-          <p:cNvSpPr txBox="1"/>
-          <p:nvPr/>
-        </p:nvSpPr>
-        <p:spPr>
-          <a:xfrm>
-            <a:off x="1850374" y="2159520"/>
-            <a:ext cx="274434" cy="200055"/>
-          </a:xfrm>
-          <a:prstGeom prst="rect">
-            <a:avLst/>
-          </a:prstGeom>
-          <a:noFill/>
-        </p:spPr>
-        <p:txBody>
-          <a:bodyPr wrap="none" rtlCol="0">
-            <a:spAutoFit/>
-          </a:bodyPr>
-          <a:lstStyle/>
-          <a:p>
-            <a:r>
-              <a:rPr lang="en-US" sz="700" dirty="0">
-                <a:solidFill>
-                  <a:srgbClr val="FF0000"/>
-                </a:solidFill>
-              </a:rPr>
-              <a:t>47</a:t>
-            </a:r>
-            <a:endParaRPr lang="en-US" sz="600" dirty="0">
-              <a:solidFill>
-                <a:srgbClr val="FF0000"/>
-              </a:solidFill>
-            </a:endParaRPr>
-          </a:p>
-        </p:txBody>
-      </p:sp>
     </p:spTree>
     <p:extLst>
       <p:ext uri="{BB962C8B-B14F-4D97-AF65-F5344CB8AC3E}">
@@ -22080,7 +21922,7 @@
 </p:sld>
 </file>
 
-<file path=ppt/slides/slide7.xml><?xml version="1.0" encoding="utf-8"?>
+<file path=ppt/slides/slide5.xml><?xml version="1.0" encoding="utf-8"?>
 <p:sld xmlns:a="http://schemas.openxmlformats.org/drawingml/2006/main" xmlns:r="http://schemas.openxmlformats.org/officeDocument/2006/relationships" xmlns:p="http://schemas.openxmlformats.org/presentationml/2006/main">
   <p:cSld>
     <p:spTree>
@@ -22097,47 +21939,12 @@
           <a:chExt cx="0" cy="0"/>
         </a:xfrm>
       </p:grpSpPr>
-      <p:sp>
-        <p:nvSpPr>
-          <p:cNvPr id="2" name="Title 1">
+      <p:pic>
+        <p:nvPicPr>
+          <p:cNvPr id="1026" name="Picture 2">
             <a:extLst>
               <a:ext uri="{FF2B5EF4-FFF2-40B4-BE49-F238E27FC236}">
-                <a16:creationId xmlns:a16="http://schemas.microsoft.com/office/drawing/2014/main" id="{8D8003AF-F773-49EF-8D94-9D7D95CB2D76}"/>
-              </a:ext>
-            </a:extLst>
-          </p:cNvPr>
-          <p:cNvSpPr>
-            <a:spLocks noGrp="1"/>
-          </p:cNvSpPr>
-          <p:nvPr>
-            <p:ph type="title"/>
-          </p:nvPr>
-        </p:nvSpPr>
-        <p:spPr>
-          <a:xfrm>
-            <a:off x="1371600" y="361950"/>
-            <a:ext cx="3810000" cy="857250"/>
-          </a:xfrm>
-        </p:spPr>
-        <p:txBody>
-          <a:bodyPr>
-            <a:normAutofit fontScale="90000"/>
-          </a:bodyPr>
-          <a:lstStyle/>
-          <a:p>
-            <a:r>
-              <a:rPr lang="en-US" dirty="0"/>
-              <a:t>Median ABV and IBU by State</a:t>
-            </a:r>
-          </a:p>
-        </p:txBody>
-      </p:sp>
-      <p:pic>
-        <p:nvPicPr>
-          <p:cNvPr id="5" name="Picture 4">
-            <a:extLst>
-              <a:ext uri="{FF2B5EF4-FFF2-40B4-BE49-F238E27FC236}">
-                <a16:creationId xmlns:a16="http://schemas.microsoft.com/office/drawing/2014/main" id="{6602F371-6279-4F6C-8C92-3AA295A07975}"/>
+                <a16:creationId xmlns:a16="http://schemas.microsoft.com/office/drawing/2014/main" id="{F6925CE4-416A-4DC9-8FF4-3CF120BD9CD7}"/>
               </a:ext>
             </a:extLst>
           </p:cNvPr>
@@ -22147,7 +21954,7 @@
           <p:nvPr/>
         </p:nvPicPr>
         <p:blipFill>
-          <a:blip r:embed="rId3" cstate="print">
+          <a:blip r:embed="rId3">
             <a:extLst>
               <a:ext uri="{28A0092B-C50C-407E-A947-70E740481C1C}">
                 <a14:useLocalDpi xmlns:a14="http://schemas.microsoft.com/office/drawing/2010/main" val="0"/>
@@ -22179,6 +21986,260 @@
           </a:extLst>
         </p:spPr>
       </p:pic>
+      <p:sp>
+        <p:nvSpPr>
+          <p:cNvPr id="2" name="Title 1">
+            <a:extLst>
+              <a:ext uri="{FF2B5EF4-FFF2-40B4-BE49-F238E27FC236}">
+                <a16:creationId xmlns:a16="http://schemas.microsoft.com/office/drawing/2014/main" id="{8D8003AF-F773-49EF-8D94-9D7D95CB2D76}"/>
+              </a:ext>
+            </a:extLst>
+          </p:cNvPr>
+          <p:cNvSpPr>
+            <a:spLocks noGrp="1"/>
+          </p:cNvSpPr>
+          <p:nvPr>
+            <p:ph type="title"/>
+          </p:nvPr>
+        </p:nvSpPr>
+        <p:spPr>
+          <a:xfrm>
+            <a:off x="990600" y="0"/>
+            <a:ext cx="4267200" cy="857250"/>
+          </a:xfrm>
+        </p:spPr>
+        <p:txBody>
+          <a:bodyPr>
+            <a:normAutofit fontScale="90000"/>
+          </a:bodyPr>
+          <a:lstStyle/>
+          <a:p>
+            <a:r>
+              <a:rPr lang="en-US" dirty="0"/>
+              <a:t>Median ABV and IBU</a:t>
+            </a:r>
+          </a:p>
+        </p:txBody>
+      </p:sp>
+      <p:sp>
+        <p:nvSpPr>
+          <p:cNvPr id="5" name="TextBox 4">
+            <a:extLst>
+              <a:ext uri="{FF2B5EF4-FFF2-40B4-BE49-F238E27FC236}">
+                <a16:creationId xmlns:a16="http://schemas.microsoft.com/office/drawing/2014/main" id="{2C90659F-55B5-4268-93E8-9FE2ADD9FE80}"/>
+              </a:ext>
+            </a:extLst>
+          </p:cNvPr>
+          <p:cNvSpPr txBox="1"/>
+          <p:nvPr/>
+        </p:nvSpPr>
+        <p:spPr>
+          <a:xfrm>
+            <a:off x="5585460" y="4827270"/>
+            <a:ext cx="1645920" cy="182880"/>
+          </a:xfrm>
+          <a:prstGeom prst="rect">
+            <a:avLst/>
+          </a:prstGeom>
+          <a:noFill/>
+          <a:ln w="19050">
+            <a:solidFill>
+              <a:srgbClr val="00B050"/>
+            </a:solidFill>
+          </a:ln>
+        </p:spPr>
+        <p:txBody>
+          <a:bodyPr wrap="square" rtlCol="0">
+            <a:spAutoFit/>
+          </a:bodyPr>
+          <a:lstStyle/>
+          <a:p>
+            <a:r>
+              <a:rPr lang="en-US" dirty="0"/>
+              <a:t> </a:t>
+            </a:r>
+          </a:p>
+        </p:txBody>
+      </p:sp>
+      <p:sp>
+        <p:nvSpPr>
+          <p:cNvPr id="3" name="TextBox 2">
+            <a:extLst>
+              <a:ext uri="{FF2B5EF4-FFF2-40B4-BE49-F238E27FC236}">
+                <a16:creationId xmlns:a16="http://schemas.microsoft.com/office/drawing/2014/main" id="{74882E81-5526-42AC-A6FF-41F41DF63B40}"/>
+              </a:ext>
+            </a:extLst>
+          </p:cNvPr>
+          <p:cNvSpPr txBox="1"/>
+          <p:nvPr/>
+        </p:nvSpPr>
+        <p:spPr>
+          <a:xfrm>
+            <a:off x="1295400" y="971550"/>
+            <a:ext cx="4114800" cy="1477328"/>
+          </a:xfrm>
+          <a:prstGeom prst="rect">
+            <a:avLst/>
+          </a:prstGeom>
+          <a:noFill/>
+        </p:spPr>
+        <p:txBody>
+          <a:bodyPr wrap="square" rtlCol="0">
+            <a:spAutoFit/>
+          </a:bodyPr>
+          <a:lstStyle/>
+          <a:p>
+            <a:pPr marL="285750" indent="-285750">
+              <a:buFont typeface="Arial" panose="020B0604020202020204" pitchFamily="34" charset="0"/>
+              <a:buChar char="•"/>
+            </a:pPr>
+            <a:r>
+              <a:rPr lang="en-US" dirty="0"/>
+              <a:t>IBU range is 57.5 (WV) to 7.8 (AR)</a:t>
+            </a:r>
+          </a:p>
+          <a:p>
+            <a:pPr marL="285750" indent="-285750">
+              <a:buFont typeface="Arial" panose="020B0604020202020204" pitchFamily="34" charset="0"/>
+              <a:buChar char="•"/>
+            </a:pPr>
+            <a:r>
+              <a:rPr lang="en-US" dirty="0"/>
+              <a:t>IPA’s tend to have the biggest impact on IBU</a:t>
+            </a:r>
+          </a:p>
+          <a:p>
+            <a:pPr marL="285750" indent="-285750">
+              <a:buFont typeface="Arial" panose="020B0604020202020204" pitchFamily="34" charset="0"/>
+              <a:buChar char="•"/>
+            </a:pPr>
+            <a:r>
+              <a:rPr lang="en-US" dirty="0"/>
+              <a:t>ABU median range is 6.7% (NV) to 5.19% (UT)</a:t>
+            </a:r>
+          </a:p>
+        </p:txBody>
+      </p:sp>
+      <p:sp>
+        <p:nvSpPr>
+          <p:cNvPr id="7" name="TextBox 6">
+            <a:extLst>
+              <a:ext uri="{FF2B5EF4-FFF2-40B4-BE49-F238E27FC236}">
+                <a16:creationId xmlns:a16="http://schemas.microsoft.com/office/drawing/2014/main" id="{8096F17D-6248-417E-A780-BE3D7A4F4E55}"/>
+              </a:ext>
+            </a:extLst>
+          </p:cNvPr>
+          <p:cNvSpPr txBox="1"/>
+          <p:nvPr/>
+        </p:nvSpPr>
+        <p:spPr>
+          <a:xfrm>
+            <a:off x="7391400" y="4857750"/>
+            <a:ext cx="1554480" cy="182880"/>
+          </a:xfrm>
+          <a:prstGeom prst="rect">
+            <a:avLst/>
+          </a:prstGeom>
+          <a:noFill/>
+          <a:ln w="19050">
+            <a:solidFill>
+              <a:srgbClr val="00B050"/>
+            </a:solidFill>
+          </a:ln>
+        </p:spPr>
+        <p:txBody>
+          <a:bodyPr wrap="square" rtlCol="0">
+            <a:spAutoFit/>
+          </a:bodyPr>
+          <a:lstStyle/>
+          <a:p>
+            <a:r>
+              <a:rPr lang="en-US" dirty="0"/>
+              <a:t> </a:t>
+            </a:r>
+          </a:p>
+        </p:txBody>
+      </p:sp>
+      <p:sp>
+        <p:nvSpPr>
+          <p:cNvPr id="8" name="TextBox 7">
+            <a:extLst>
+              <a:ext uri="{FF2B5EF4-FFF2-40B4-BE49-F238E27FC236}">
+                <a16:creationId xmlns:a16="http://schemas.microsoft.com/office/drawing/2014/main" id="{612B8AB7-AF78-4751-955A-0A095D0B171F}"/>
+              </a:ext>
+            </a:extLst>
+          </p:cNvPr>
+          <p:cNvSpPr txBox="1"/>
+          <p:nvPr/>
+        </p:nvSpPr>
+        <p:spPr>
+          <a:xfrm>
+            <a:off x="5577840" y="133350"/>
+            <a:ext cx="1737360" cy="182880"/>
+          </a:xfrm>
+          <a:prstGeom prst="rect">
+            <a:avLst/>
+          </a:prstGeom>
+          <a:noFill/>
+          <a:ln w="19050">
+            <a:solidFill>
+              <a:srgbClr val="00B050"/>
+            </a:solidFill>
+          </a:ln>
+        </p:spPr>
+        <p:txBody>
+          <a:bodyPr wrap="square" rtlCol="0">
+            <a:spAutoFit/>
+          </a:bodyPr>
+          <a:lstStyle/>
+          <a:p>
+            <a:r>
+              <a:rPr lang="en-US" dirty="0"/>
+              <a:t> </a:t>
+            </a:r>
+          </a:p>
+        </p:txBody>
+      </p:sp>
+      <p:sp>
+        <p:nvSpPr>
+          <p:cNvPr id="9" name="TextBox 8">
+            <a:extLst>
+              <a:ext uri="{FF2B5EF4-FFF2-40B4-BE49-F238E27FC236}">
+                <a16:creationId xmlns:a16="http://schemas.microsoft.com/office/drawing/2014/main" id="{E37FECA1-0D5F-42F0-BCAA-F29A29D6596F}"/>
+              </a:ext>
+            </a:extLst>
+          </p:cNvPr>
+          <p:cNvSpPr txBox="1"/>
+          <p:nvPr/>
+        </p:nvSpPr>
+        <p:spPr>
+          <a:xfrm>
+            <a:off x="7391400" y="133350"/>
+            <a:ext cx="1737360" cy="182880"/>
+          </a:xfrm>
+          <a:prstGeom prst="rect">
+            <a:avLst/>
+          </a:prstGeom>
+          <a:noFill/>
+          <a:ln w="19050">
+            <a:solidFill>
+              <a:srgbClr val="00B050"/>
+            </a:solidFill>
+          </a:ln>
+        </p:spPr>
+        <p:txBody>
+          <a:bodyPr wrap="square" rtlCol="0">
+            <a:spAutoFit/>
+          </a:bodyPr>
+          <a:lstStyle/>
+          <a:p>
+            <a:r>
+              <a:rPr lang="en-US" dirty="0"/>
+              <a:t> </a:t>
+            </a:r>
+          </a:p>
+        </p:txBody>
+      </p:sp>
     </p:spTree>
     <p:extLst>
       <p:ext uri="{BB962C8B-B14F-4D97-AF65-F5344CB8AC3E}">
@@ -22192,7 +22253,7 @@
 </p:sld>
 </file>
 
-<file path=ppt/slides/slide8.xml><?xml version="1.0" encoding="utf-8"?>
+<file path=ppt/slides/slide6.xml><?xml version="1.0" encoding="utf-8"?>
 <p:sld xmlns:a="http://schemas.openxmlformats.org/drawingml/2006/main" xmlns:r="http://schemas.openxmlformats.org/officeDocument/2006/relationships" xmlns:p="http://schemas.openxmlformats.org/presentationml/2006/main">
   <p:cSld>
     <p:spTree>
@@ -22232,17 +22293,17 @@
           <a:p>
             <a:r>
               <a:rPr lang="en-US" dirty="0"/>
-              <a:t>Top IBU</a:t>
+              <a:t>Max IBU</a:t>
             </a:r>
           </a:p>
         </p:txBody>
       </p:sp>
       <p:pic>
         <p:nvPicPr>
-          <p:cNvPr id="4" name="Picture 2">
+          <p:cNvPr id="6" name="Picture 4">
             <a:extLst>
               <a:ext uri="{FF2B5EF4-FFF2-40B4-BE49-F238E27FC236}">
-                <a16:creationId xmlns:a16="http://schemas.microsoft.com/office/drawing/2014/main" id="{CD3765AA-58E2-42FE-9E6E-A875BCB1D73F}"/>
+                <a16:creationId xmlns:a16="http://schemas.microsoft.com/office/drawing/2014/main" id="{373817C9-89CA-46E9-AB0D-999F923AEB79}"/>
               </a:ext>
             </a:extLst>
           </p:cNvPr>
@@ -22266,8 +22327,8 @@
         </p:blipFill>
         <p:spPr bwMode="auto">
           <a:xfrm>
-            <a:off x="152400" y="1200150"/>
-            <a:ext cx="4206240" cy="3004457"/>
+            <a:off x="4876800" y="918050"/>
+            <a:ext cx="3200400" cy="2286000"/>
           </a:xfrm>
           <a:prstGeom prst="rect">
             <a:avLst/>
@@ -22286,10 +22347,10 @@
       </p:pic>
       <p:pic>
         <p:nvPicPr>
-          <p:cNvPr id="5" name="Picture 4">
+          <p:cNvPr id="7" name="Picture 2">
             <a:extLst>
               <a:ext uri="{FF2B5EF4-FFF2-40B4-BE49-F238E27FC236}">
-                <a16:creationId xmlns:a16="http://schemas.microsoft.com/office/drawing/2014/main" id="{28B18D85-1151-450B-8AFF-D3E3FCE62C14}"/>
+                <a16:creationId xmlns:a16="http://schemas.microsoft.com/office/drawing/2014/main" id="{A1CB0376-FE9D-4869-8DFA-36E7B01214B8}"/>
               </a:ext>
             </a:extLst>
           </p:cNvPr>
@@ -22313,8 +22374,8 @@
         </p:blipFill>
         <p:spPr bwMode="auto">
           <a:xfrm>
-            <a:off x="4724400" y="1200150"/>
-            <a:ext cx="4206240" cy="3004457"/>
+            <a:off x="1066800" y="921860"/>
+            <a:ext cx="3200400" cy="2286000"/>
           </a:xfrm>
           <a:prstGeom prst="rect">
             <a:avLst/>
@@ -22331,6 +22392,85 @@
           </a:extLst>
         </p:spPr>
       </p:pic>
+      <p:sp>
+        <p:nvSpPr>
+          <p:cNvPr id="5" name="TextBox 4">
+            <a:extLst>
+              <a:ext uri="{FF2B5EF4-FFF2-40B4-BE49-F238E27FC236}">
+                <a16:creationId xmlns:a16="http://schemas.microsoft.com/office/drawing/2014/main" id="{5EF3F279-2AC6-4FC8-AE6A-1D976E15B713}"/>
+              </a:ext>
+            </a:extLst>
+          </p:cNvPr>
+          <p:cNvSpPr txBox="1"/>
+          <p:nvPr/>
+        </p:nvSpPr>
+        <p:spPr>
+          <a:xfrm>
+            <a:off x="2419350" y="3315957"/>
+            <a:ext cx="4305300" cy="1200329"/>
+          </a:xfrm>
+          <a:prstGeom prst="rect">
+            <a:avLst/>
+          </a:prstGeom>
+          <a:noFill/>
+        </p:spPr>
+        <p:txBody>
+          <a:bodyPr wrap="square" rtlCol="0">
+            <a:spAutoFit/>
+          </a:bodyPr>
+          <a:lstStyle/>
+          <a:p>
+            <a:pPr marL="285750" indent="-285750">
+              <a:buFont typeface="Arial" panose="020B0604020202020204" pitchFamily="34" charset="0"/>
+              <a:buChar char="•"/>
+            </a:pPr>
+            <a:r>
+              <a:rPr lang="en-US" sz="1200" dirty="0"/>
+              <a:t>IBU max ranges from 138 (OR - Bitter Bitch Imperial IPA) to 0 (SD – 7 different beers)</a:t>
+            </a:r>
+          </a:p>
+          <a:p>
+            <a:pPr marL="285750" indent="-285750">
+              <a:buFont typeface="Arial" panose="020B0604020202020204" pitchFamily="34" charset="0"/>
+              <a:buChar char="•"/>
+            </a:pPr>
+            <a:r>
+              <a:rPr lang="en-US" sz="1200" dirty="0"/>
+              <a:t>AR (39) has the lowest non-zero IBU</a:t>
+            </a:r>
+          </a:p>
+          <a:p>
+            <a:pPr marL="285750" indent="-285750">
+              <a:buFont typeface="Arial" panose="020B0604020202020204" pitchFamily="34" charset="0"/>
+              <a:buChar char="•"/>
+            </a:pPr>
+            <a:r>
+              <a:rPr lang="en-US" sz="1200" dirty="0"/>
+              <a:t>Dogs Day Summer Ale (PA – 28) ha the lowest non-zero IBU</a:t>
+            </a:r>
+          </a:p>
+          <a:p>
+            <a:pPr marL="285750" indent="-285750">
+              <a:buFont typeface="Arial" panose="020B0604020202020204" pitchFamily="34" charset="0"/>
+              <a:buChar char="•"/>
+            </a:pPr>
+            <a:r>
+              <a:rPr lang="en-US" sz="1200" dirty="0"/>
+              <a:t>90 IBU is the median max</a:t>
+            </a:r>
+          </a:p>
+          <a:p>
+            <a:pPr marL="285750" indent="-285750">
+              <a:buFont typeface="Arial" panose="020B0604020202020204" pitchFamily="34" charset="0"/>
+              <a:buChar char="•"/>
+            </a:pPr>
+            <a:r>
+              <a:rPr lang="en-US" sz="1200" dirty="0"/>
+              <a:t>26 states have a max IBU =&gt;90</a:t>
+            </a:r>
+          </a:p>
+        </p:txBody>
+      </p:sp>
     </p:spTree>
     <p:extLst>
       <p:ext uri="{BB962C8B-B14F-4D97-AF65-F5344CB8AC3E}">
@@ -22344,7 +22484,7 @@
 </p:sld>
 </file>
 
-<file path=ppt/slides/slide9.xml><?xml version="1.0" encoding="utf-8"?>
+<file path=ppt/slides/slide7.xml><?xml version="1.0" encoding="utf-8"?>
 <p:sld xmlns:a="http://schemas.openxmlformats.org/drawingml/2006/main" xmlns:r="http://schemas.openxmlformats.org/officeDocument/2006/relationships" xmlns:p="http://schemas.openxmlformats.org/presentationml/2006/main">
   <p:cSld>
     <p:spTree>
@@ -22384,17 +22524,250 @@
           <a:p>
             <a:r>
               <a:rPr lang="en-US" dirty="0"/>
-              <a:t>Top ABV</a:t>
+              <a:t>Max ABV</a:t>
+            </a:r>
+          </a:p>
+        </p:txBody>
+      </p:sp>
+      <p:sp>
+        <p:nvSpPr>
+          <p:cNvPr id="7" name="TextBox 6">
+            <a:extLst>
+              <a:ext uri="{FF2B5EF4-FFF2-40B4-BE49-F238E27FC236}">
+                <a16:creationId xmlns:a16="http://schemas.microsoft.com/office/drawing/2014/main" id="{E0FA0565-B86C-447A-930A-4F644DA70F73}"/>
+              </a:ext>
+            </a:extLst>
+          </p:cNvPr>
+          <p:cNvSpPr txBox="1"/>
+          <p:nvPr/>
+        </p:nvSpPr>
+        <p:spPr>
+          <a:xfrm>
+            <a:off x="1295400" y="3409950"/>
+            <a:ext cx="6553200" cy="1200329"/>
+          </a:xfrm>
+          <a:prstGeom prst="rect">
+            <a:avLst/>
+          </a:prstGeom>
+          <a:noFill/>
+        </p:spPr>
+        <p:txBody>
+          <a:bodyPr wrap="square" rtlCol="0">
+            <a:spAutoFit/>
+          </a:bodyPr>
+          <a:lstStyle/>
+          <a:p>
+            <a:pPr marL="285750" indent="-285750">
+              <a:buFont typeface="Arial" panose="020B0604020202020204" pitchFamily="34" charset="0"/>
+              <a:buChar char="•"/>
+            </a:pPr>
+            <a:r>
+              <a:rPr lang="en-US" sz="1200" dirty="0"/>
+              <a:t>The national range is 12.8% (CO - Lee Hill Series Vol. 5 - Belgian Style Quadruple Ale) to 4.5% (SD – Easy </a:t>
+            </a:r>
+            <a:r>
+              <a:rPr lang="en-US" sz="1200" dirty="0" err="1"/>
+              <a:t>Livin</a:t>
+            </a:r>
+            <a:r>
+              <a:rPr lang="en-US" sz="1200" dirty="0"/>
+              <a:t>’ Summer Ale)</a:t>
+            </a:r>
+          </a:p>
+          <a:p>
+            <a:pPr marL="285750" indent="-285750">
+              <a:buFont typeface="Arial" panose="020B0604020202020204" pitchFamily="34" charset="0"/>
+              <a:buChar char="•"/>
+            </a:pPr>
+            <a:r>
+              <a:rPr lang="en-US" sz="1200" dirty="0"/>
+              <a:t>Max median by state is 5.87%</a:t>
+            </a:r>
+          </a:p>
+          <a:p>
+            <a:pPr marL="285750" indent="-285750">
+              <a:buFont typeface="Arial" panose="020B0604020202020204" pitchFamily="34" charset="0"/>
+              <a:buChar char="•"/>
+            </a:pPr>
+            <a:r>
+              <a:rPr lang="en-US" sz="1200" dirty="0" err="1"/>
+              <a:t>Delewar</a:t>
+            </a:r>
+            <a:r>
+              <a:rPr lang="en-US" sz="1200" dirty="0"/>
+              <a:t> has the lowest max median (5.5%) </a:t>
+            </a:r>
+          </a:p>
+          <a:p>
+            <a:pPr marL="285750" indent="-285750">
+              <a:buFont typeface="Arial" panose="020B0604020202020204" pitchFamily="34" charset="0"/>
+              <a:buChar char="•"/>
+            </a:pPr>
+            <a:r>
+              <a:rPr lang="en-US" sz="1200" dirty="0"/>
+              <a:t>In Utah beer sold in a grocery store has to be &lt;5.0% ABV, if &gt;5.0% ABV then beer is sold in state-controlled stores</a:t>
             </a:r>
           </a:p>
         </p:txBody>
       </p:sp>
       <p:pic>
         <p:nvPicPr>
-          <p:cNvPr id="5122" name="Picture 2">
+          <p:cNvPr id="2050" name="Picture 2">
             <a:extLst>
               <a:ext uri="{FF2B5EF4-FFF2-40B4-BE49-F238E27FC236}">
-                <a16:creationId xmlns:a16="http://schemas.microsoft.com/office/drawing/2014/main" id="{E734F5E3-6122-4A2E-8281-C1C4D2757A27}"/>
+                <a16:creationId xmlns:a16="http://schemas.microsoft.com/office/drawing/2014/main" id="{E68324F2-06F6-44DF-A810-517B2049BB93}"/>
+              </a:ext>
+            </a:extLst>
+          </p:cNvPr>
+          <p:cNvPicPr>
+            <a:picLocks noChangeAspect="1" noChangeArrowheads="1"/>
+          </p:cNvPicPr>
+          <p:nvPr/>
+        </p:nvPicPr>
+        <p:blipFill>
+          <a:blip r:embed="rId3">
+            <a:extLst>
+              <a:ext uri="{28A0092B-C50C-407E-A947-70E740481C1C}">
+                <a14:useLocalDpi xmlns:a14="http://schemas.microsoft.com/office/drawing/2010/main" val="0"/>
+              </a:ext>
+            </a:extLst>
+          </a:blip>
+          <a:srcRect/>
+          <a:stretch>
+            <a:fillRect/>
+          </a:stretch>
+        </p:blipFill>
+        <p:spPr bwMode="auto">
+          <a:xfrm>
+            <a:off x="990600" y="971550"/>
+            <a:ext cx="3200400" cy="2286000"/>
+          </a:xfrm>
+          <a:prstGeom prst="rect">
+            <a:avLst/>
+          </a:prstGeom>
+          <a:noFill/>
+          <a:extLst>
+            <a:ext uri="{909E8E84-426E-40DD-AFC4-6F175D3DCCD1}">
+              <a14:hiddenFill xmlns:a14="http://schemas.microsoft.com/office/drawing/2010/main">
+                <a:solidFill>
+                  <a:srgbClr val="FFFFFF"/>
+                </a:solidFill>
+              </a14:hiddenFill>
+            </a:ext>
+          </a:extLst>
+        </p:spPr>
+      </p:pic>
+      <p:pic>
+        <p:nvPicPr>
+          <p:cNvPr id="2052" name="Picture 4">
+            <a:extLst>
+              <a:ext uri="{FF2B5EF4-FFF2-40B4-BE49-F238E27FC236}">
+                <a16:creationId xmlns:a16="http://schemas.microsoft.com/office/drawing/2014/main" id="{5CFEAA06-4EA4-4AA6-8893-E43263412426}"/>
+              </a:ext>
+            </a:extLst>
+          </p:cNvPr>
+          <p:cNvPicPr>
+            <a:picLocks noChangeAspect="1" noChangeArrowheads="1"/>
+          </p:cNvPicPr>
+          <p:nvPr/>
+        </p:nvPicPr>
+        <p:blipFill>
+          <a:blip r:embed="rId4">
+            <a:extLst>
+              <a:ext uri="{28A0092B-C50C-407E-A947-70E740481C1C}">
+                <a14:useLocalDpi xmlns:a14="http://schemas.microsoft.com/office/drawing/2010/main" val="0"/>
+              </a:ext>
+            </a:extLst>
+          </a:blip>
+          <a:srcRect/>
+          <a:stretch>
+            <a:fillRect/>
+          </a:stretch>
+        </p:blipFill>
+        <p:spPr bwMode="auto">
+          <a:xfrm>
+            <a:off x="4953000" y="971550"/>
+            <a:ext cx="3200400" cy="2286000"/>
+          </a:xfrm>
+          <a:prstGeom prst="rect">
+            <a:avLst/>
+          </a:prstGeom>
+          <a:noFill/>
+          <a:extLst>
+            <a:ext uri="{909E8E84-426E-40DD-AFC4-6F175D3DCCD1}">
+              <a14:hiddenFill xmlns:a14="http://schemas.microsoft.com/office/drawing/2010/main">
+                <a:solidFill>
+                  <a:srgbClr val="FFFFFF"/>
+                </a:solidFill>
+              </a14:hiddenFill>
+            </a:ext>
+          </a:extLst>
+        </p:spPr>
+      </p:pic>
+    </p:spTree>
+    <p:extLst>
+      <p:ext uri="{BB962C8B-B14F-4D97-AF65-F5344CB8AC3E}">
+        <p14:creationId xmlns:p14="http://schemas.microsoft.com/office/powerpoint/2010/main" val="245379799"/>
+      </p:ext>
+    </p:extLst>
+  </p:cSld>
+  <p:clrMapOvr>
+    <a:masterClrMapping/>
+  </p:clrMapOvr>
+</p:sld>
+</file>
+
+<file path=ppt/slides/slide8.xml><?xml version="1.0" encoding="utf-8"?>
+<p:sld xmlns:a="http://schemas.openxmlformats.org/drawingml/2006/main" xmlns:r="http://schemas.openxmlformats.org/officeDocument/2006/relationships" xmlns:p="http://schemas.openxmlformats.org/presentationml/2006/main">
+  <p:cSld>
+    <p:spTree>
+      <p:nvGrpSpPr>
+        <p:cNvPr id="1" name=""/>
+        <p:cNvGrpSpPr/>
+        <p:nvPr/>
+      </p:nvGrpSpPr>
+      <p:grpSpPr>
+        <a:xfrm>
+          <a:off x="0" y="0"/>
+          <a:ext cx="0" cy="0"/>
+          <a:chOff x="0" y="0"/>
+          <a:chExt cx="0" cy="0"/>
+        </a:xfrm>
+      </p:grpSpPr>
+      <p:sp>
+        <p:nvSpPr>
+          <p:cNvPr id="2" name="Title 1">
+            <a:extLst>
+              <a:ext uri="{FF2B5EF4-FFF2-40B4-BE49-F238E27FC236}">
+                <a16:creationId xmlns:a16="http://schemas.microsoft.com/office/drawing/2014/main" id="{C06565CC-4BFD-4A68-874A-74D0DB174AB6}"/>
+              </a:ext>
+            </a:extLst>
+          </p:cNvPr>
+          <p:cNvSpPr>
+            <a:spLocks noGrp="1"/>
+          </p:cNvSpPr>
+          <p:nvPr>
+            <p:ph type="title"/>
+          </p:nvPr>
+        </p:nvSpPr>
+        <p:spPr/>
+        <p:txBody>
+          <a:bodyPr/>
+          <a:lstStyle/>
+          <a:p>
+            <a:r>
+              <a:rPr lang="en-US" dirty="0"/>
+              <a:t>ABV Stats and Distribution</a:t>
+            </a:r>
+          </a:p>
+        </p:txBody>
+      </p:sp>
+      <p:pic>
+        <p:nvPicPr>
+          <p:cNvPr id="6" name="Picture 5">
+            <a:extLst>
+              <a:ext uri="{FF2B5EF4-FFF2-40B4-BE49-F238E27FC236}">
+                <a16:creationId xmlns:a16="http://schemas.microsoft.com/office/drawing/2014/main" id="{090D33B6-0848-4237-B9CA-8ADFF1473229}"/>
               </a:ext>
             </a:extLst>
           </p:cNvPr>
@@ -22418,8 +22791,8 @@
         </p:blipFill>
         <p:spPr bwMode="auto">
           <a:xfrm>
-            <a:off x="252029" y="1061238"/>
-            <a:ext cx="4206240" cy="3004457"/>
+            <a:off x="0" y="971550"/>
+            <a:ext cx="3017520" cy="2155371"/>
           </a:xfrm>
           <a:prstGeom prst="rect">
             <a:avLst/>
@@ -22438,10 +22811,10 @@
       </p:pic>
       <p:pic>
         <p:nvPicPr>
-          <p:cNvPr id="5124" name="Picture 4">
+          <p:cNvPr id="7" name="Picture 2">
             <a:extLst>
               <a:ext uri="{FF2B5EF4-FFF2-40B4-BE49-F238E27FC236}">
-                <a16:creationId xmlns:a16="http://schemas.microsoft.com/office/drawing/2014/main" id="{C3F5B074-1700-48C5-A864-2001055CE578}"/>
+                <a16:creationId xmlns:a16="http://schemas.microsoft.com/office/drawing/2014/main" id="{8D4657B4-E1A7-4229-972C-F2708B657FF0}"/>
               </a:ext>
             </a:extLst>
           </p:cNvPr>
@@ -22465,8 +22838,8 @@
         </p:blipFill>
         <p:spPr bwMode="auto">
           <a:xfrm>
-            <a:off x="4632960" y="1061238"/>
-            <a:ext cx="4206240" cy="3004457"/>
+            <a:off x="3048000" y="971550"/>
+            <a:ext cx="3017520" cy="2155371"/>
           </a:xfrm>
           <a:prstGeom prst="rect">
             <a:avLst/>
@@ -22483,10 +22856,314 @@
           </a:extLst>
         </p:spPr>
       </p:pic>
+      <p:pic>
+        <p:nvPicPr>
+          <p:cNvPr id="10" name="Picture 4">
+            <a:extLst>
+              <a:ext uri="{FF2B5EF4-FFF2-40B4-BE49-F238E27FC236}">
+                <a16:creationId xmlns:a16="http://schemas.microsoft.com/office/drawing/2014/main" id="{75564B22-3450-4DFB-88DD-C98D4A009E0D}"/>
+              </a:ext>
+            </a:extLst>
+          </p:cNvPr>
+          <p:cNvPicPr>
+            <a:picLocks noChangeAspect="1" noChangeArrowheads="1"/>
+          </p:cNvPicPr>
+          <p:nvPr/>
+        </p:nvPicPr>
+        <p:blipFill>
+          <a:blip r:embed="rId5" cstate="print">
+            <a:extLst>
+              <a:ext uri="{28A0092B-C50C-407E-A947-70E740481C1C}">
+                <a14:useLocalDpi xmlns:a14="http://schemas.microsoft.com/office/drawing/2010/main" val="0"/>
+              </a:ext>
+            </a:extLst>
+          </a:blip>
+          <a:srcRect/>
+          <a:stretch>
+            <a:fillRect/>
+          </a:stretch>
+        </p:blipFill>
+        <p:spPr bwMode="auto">
+          <a:xfrm>
+            <a:off x="6096000" y="971550"/>
+            <a:ext cx="3017520" cy="2155371"/>
+          </a:xfrm>
+          <a:prstGeom prst="rect">
+            <a:avLst/>
+          </a:prstGeom>
+          <a:noFill/>
+          <a:extLst>
+            <a:ext uri="{909E8E84-426E-40DD-AFC4-6F175D3DCCD1}">
+              <a14:hiddenFill xmlns:a14="http://schemas.microsoft.com/office/drawing/2010/main">
+                <a:solidFill>
+                  <a:srgbClr val="FFFFFF"/>
+                </a:solidFill>
+              </a14:hiddenFill>
+            </a:ext>
+          </a:extLst>
+        </p:spPr>
+      </p:pic>
+      <p:sp>
+        <p:nvSpPr>
+          <p:cNvPr id="8" name="TextBox 7">
+            <a:extLst>
+              <a:ext uri="{FF2B5EF4-FFF2-40B4-BE49-F238E27FC236}">
+                <a16:creationId xmlns:a16="http://schemas.microsoft.com/office/drawing/2014/main" id="{827C587C-DA10-4965-BD51-C25071B901C4}"/>
+              </a:ext>
+            </a:extLst>
+          </p:cNvPr>
+          <p:cNvSpPr txBox="1"/>
+          <p:nvPr/>
+        </p:nvSpPr>
+        <p:spPr>
+          <a:xfrm>
+            <a:off x="2057400" y="3409950"/>
+            <a:ext cx="5638800" cy="830997"/>
+          </a:xfrm>
+          <a:prstGeom prst="rect">
+            <a:avLst/>
+          </a:prstGeom>
+          <a:noFill/>
+        </p:spPr>
+        <p:txBody>
+          <a:bodyPr wrap="square" rtlCol="0">
+            <a:spAutoFit/>
+          </a:bodyPr>
+          <a:lstStyle/>
+          <a:p>
+            <a:pPr marL="285750" indent="-285750">
+              <a:buFont typeface="Arial" panose="020B0604020202020204" pitchFamily="34" charset="0"/>
+              <a:buChar char="•"/>
+            </a:pPr>
+            <a:r>
+              <a:rPr lang="en-US" sz="1200" dirty="0"/>
+              <a:t>19.2 ounces is the new 12 ounce. Beers are packaged in 4 packs at 16.9 ounces or greater. 12-ounce beers generally are bought in 6-packs</a:t>
+            </a:r>
+          </a:p>
+          <a:p>
+            <a:pPr marL="285750" indent="-285750">
+              <a:buFont typeface="Arial" panose="020B0604020202020204" pitchFamily="34" charset="0"/>
+              <a:buChar char="•"/>
+            </a:pPr>
+            <a:r>
+              <a:rPr lang="en-US" sz="1200" dirty="0"/>
+              <a:t>In AL, beer containers may not exceed 25.4 ounces</a:t>
+            </a:r>
+          </a:p>
+          <a:p>
+            <a:pPr marL="285750" indent="-285750">
+              <a:buFont typeface="Arial" panose="020B0604020202020204" pitchFamily="34" charset="0"/>
+              <a:buChar char="•"/>
+            </a:pPr>
+            <a:r>
+              <a:rPr lang="en-US" sz="1200" dirty="0"/>
+              <a:t>IPA’s have more ABV than Ale’s and other beers</a:t>
+            </a:r>
+          </a:p>
+        </p:txBody>
+      </p:sp>
     </p:spTree>
     <p:extLst>
       <p:ext uri="{BB962C8B-B14F-4D97-AF65-F5344CB8AC3E}">
-        <p14:creationId xmlns:p14="http://schemas.microsoft.com/office/powerpoint/2010/main" val="245379799"/>
+        <p14:creationId xmlns:p14="http://schemas.microsoft.com/office/powerpoint/2010/main" val="1387322310"/>
+      </p:ext>
+    </p:extLst>
+  </p:cSld>
+  <p:clrMapOvr>
+    <a:masterClrMapping/>
+  </p:clrMapOvr>
+</p:sld>
+</file>
+
+<file path=ppt/slides/slide9.xml><?xml version="1.0" encoding="utf-8"?>
+<p:sld xmlns:a="http://schemas.openxmlformats.org/drawingml/2006/main" xmlns:r="http://schemas.openxmlformats.org/officeDocument/2006/relationships" xmlns:p="http://schemas.openxmlformats.org/presentationml/2006/main">
+  <p:cSld>
+    <p:spTree>
+      <p:nvGrpSpPr>
+        <p:cNvPr id="1" name=""/>
+        <p:cNvGrpSpPr/>
+        <p:nvPr/>
+      </p:nvGrpSpPr>
+      <p:grpSpPr>
+        <a:xfrm>
+          <a:off x="0" y="0"/>
+          <a:ext cx="0" cy="0"/>
+          <a:chOff x="0" y="0"/>
+          <a:chExt cx="0" cy="0"/>
+        </a:xfrm>
+      </p:grpSpPr>
+      <p:sp>
+        <p:nvSpPr>
+          <p:cNvPr id="2" name="Title 1">
+            <a:extLst>
+              <a:ext uri="{FF2B5EF4-FFF2-40B4-BE49-F238E27FC236}">
+                <a16:creationId xmlns:a16="http://schemas.microsoft.com/office/drawing/2014/main" id="{48B828A6-A73B-4DEA-BD33-B6CEB6EA43D6}"/>
+              </a:ext>
+            </a:extLst>
+          </p:cNvPr>
+          <p:cNvSpPr>
+            <a:spLocks noGrp="1"/>
+          </p:cNvSpPr>
+          <p:nvPr>
+            <p:ph type="title"/>
+          </p:nvPr>
+        </p:nvSpPr>
+        <p:spPr/>
+        <p:txBody>
+          <a:bodyPr/>
+          <a:lstStyle/>
+          <a:p>
+            <a:r>
+              <a:rPr lang="en-US" dirty="0"/>
+              <a:t>Relationship Between IBU and ABV</a:t>
+            </a:r>
+          </a:p>
+        </p:txBody>
+      </p:sp>
+      <p:pic>
+        <p:nvPicPr>
+          <p:cNvPr id="5" name="Picture 2">
+            <a:extLst>
+              <a:ext uri="{FF2B5EF4-FFF2-40B4-BE49-F238E27FC236}">
+                <a16:creationId xmlns:a16="http://schemas.microsoft.com/office/drawing/2014/main" id="{0D3A44EB-288C-4A2A-A28F-B9140C199932}"/>
+              </a:ext>
+            </a:extLst>
+          </p:cNvPr>
+          <p:cNvPicPr>
+            <a:picLocks noChangeAspect="1" noChangeArrowheads="1"/>
+          </p:cNvPicPr>
+          <p:nvPr/>
+        </p:nvPicPr>
+        <p:blipFill>
+          <a:blip r:embed="rId3" cstate="print">
+            <a:extLst>
+              <a:ext uri="{28A0092B-C50C-407E-A947-70E740481C1C}">
+                <a14:useLocalDpi xmlns:a14="http://schemas.microsoft.com/office/drawing/2010/main" val="0"/>
+              </a:ext>
+            </a:extLst>
+          </a:blip>
+          <a:srcRect/>
+          <a:stretch>
+            <a:fillRect/>
+          </a:stretch>
+        </p:blipFill>
+        <p:spPr bwMode="auto">
+          <a:xfrm>
+            <a:off x="76200" y="1063228"/>
+            <a:ext cx="3200400" cy="3200400"/>
+          </a:xfrm>
+          <a:prstGeom prst="rect">
+            <a:avLst/>
+          </a:prstGeom>
+          <a:noFill/>
+          <a:extLst>
+            <a:ext uri="{909E8E84-426E-40DD-AFC4-6F175D3DCCD1}">
+              <a14:hiddenFill xmlns:a14="http://schemas.microsoft.com/office/drawing/2010/main">
+                <a:solidFill>
+                  <a:srgbClr val="FFFFFF"/>
+                </a:solidFill>
+              </a14:hiddenFill>
+            </a:ext>
+          </a:extLst>
+        </p:spPr>
+      </p:pic>
+      <p:pic>
+        <p:nvPicPr>
+          <p:cNvPr id="6" name="Picture 4">
+            <a:extLst>
+              <a:ext uri="{FF2B5EF4-FFF2-40B4-BE49-F238E27FC236}">
+                <a16:creationId xmlns:a16="http://schemas.microsoft.com/office/drawing/2014/main" id="{63713F0D-C928-47F7-AF3B-9421268BEFA4}"/>
+              </a:ext>
+            </a:extLst>
+          </p:cNvPr>
+          <p:cNvPicPr>
+            <a:picLocks noChangeAspect="1" noChangeArrowheads="1"/>
+          </p:cNvPicPr>
+          <p:nvPr/>
+        </p:nvPicPr>
+        <p:blipFill>
+          <a:blip r:embed="rId4" cstate="print">
+            <a:extLst>
+              <a:ext uri="{28A0092B-C50C-407E-A947-70E740481C1C}">
+                <a14:useLocalDpi xmlns:a14="http://schemas.microsoft.com/office/drawing/2010/main" val="0"/>
+              </a:ext>
+            </a:extLst>
+          </a:blip>
+          <a:srcRect/>
+          <a:stretch>
+            <a:fillRect/>
+          </a:stretch>
+        </p:blipFill>
+        <p:spPr bwMode="auto">
+          <a:xfrm>
+            <a:off x="5839265" y="1063228"/>
+            <a:ext cx="3200400" cy="3200400"/>
+          </a:xfrm>
+          <a:prstGeom prst="rect">
+            <a:avLst/>
+          </a:prstGeom>
+          <a:noFill/>
+          <a:extLst>
+            <a:ext uri="{909E8E84-426E-40DD-AFC4-6F175D3DCCD1}">
+              <a14:hiddenFill xmlns:a14="http://schemas.microsoft.com/office/drawing/2010/main">
+                <a:solidFill>
+                  <a:srgbClr val="FFFFFF"/>
+                </a:solidFill>
+              </a14:hiddenFill>
+            </a:ext>
+          </a:extLst>
+        </p:spPr>
+      </p:pic>
+      <p:sp>
+        <p:nvSpPr>
+          <p:cNvPr id="3" name="TextBox 2">
+            <a:extLst>
+              <a:ext uri="{FF2B5EF4-FFF2-40B4-BE49-F238E27FC236}">
+                <a16:creationId xmlns:a16="http://schemas.microsoft.com/office/drawing/2014/main" id="{B931521C-8D09-4634-A177-CE683FD68DFA}"/>
+              </a:ext>
+            </a:extLst>
+          </p:cNvPr>
+          <p:cNvSpPr txBox="1"/>
+          <p:nvPr/>
+        </p:nvSpPr>
+        <p:spPr>
+          <a:xfrm>
+            <a:off x="3276600" y="1068348"/>
+            <a:ext cx="2362200" cy="1107996"/>
+          </a:xfrm>
+          <a:prstGeom prst="rect">
+            <a:avLst/>
+          </a:prstGeom>
+          <a:noFill/>
+        </p:spPr>
+        <p:txBody>
+          <a:bodyPr wrap="square" rtlCol="0">
+            <a:spAutoFit/>
+          </a:bodyPr>
+          <a:lstStyle/>
+          <a:p>
+            <a:pPr marL="285750" indent="-285750">
+              <a:buFont typeface="Arial" panose="020B0604020202020204" pitchFamily="34" charset="0"/>
+              <a:buChar char="•"/>
+            </a:pPr>
+            <a:r>
+              <a:rPr lang="en-US" sz="1200" dirty="0"/>
+              <a:t>Bitterness generally rises with alcohol content, however they are not clearly dependent on one another</a:t>
+            </a:r>
+          </a:p>
+          <a:p>
+            <a:pPr marL="285750" indent="-285750">
+              <a:buFont typeface="Arial" panose="020B0604020202020204" pitchFamily="34" charset="0"/>
+              <a:buChar char="•"/>
+            </a:pPr>
+            <a:endParaRPr lang="en-US" dirty="0"/>
+          </a:p>
+        </p:txBody>
+      </p:sp>
+    </p:spTree>
+    <p:extLst>
+      <p:ext uri="{BB962C8B-B14F-4D97-AF65-F5344CB8AC3E}">
+        <p14:creationId xmlns:p14="http://schemas.microsoft.com/office/powerpoint/2010/main" val="4003640020"/>
       </p:ext>
     </p:extLst>
   </p:cSld>

</xml_diff>

<commit_message>
v2 updates after meeting
</commit_message>
<xml_diff>
--- a/DS6306 Group Project 1 v2.pptx
+++ b/DS6306 Group Project 1 v2.pptx
@@ -5,22 +5,23 @@
     <p:sldMasterId id="2147483648" r:id="rId1"/>
   </p:sldMasterIdLst>
   <p:notesMasterIdLst>
-    <p:notesMasterId r:id="rId12"/>
+    <p:notesMasterId r:id="rId13"/>
   </p:notesMasterIdLst>
   <p:handoutMasterIdLst>
-    <p:handoutMasterId r:id="rId13"/>
+    <p:handoutMasterId r:id="rId14"/>
   </p:handoutMasterIdLst>
   <p:sldIdLst>
     <p:sldId id="256" r:id="rId2"/>
     <p:sldId id="272" r:id="rId3"/>
     <p:sldId id="271" r:id="rId4"/>
-    <p:sldId id="261" r:id="rId5"/>
-    <p:sldId id="264" r:id="rId6"/>
-    <p:sldId id="268" r:id="rId7"/>
-    <p:sldId id="265" r:id="rId8"/>
-    <p:sldId id="266" r:id="rId9"/>
-    <p:sldId id="267" r:id="rId10"/>
-    <p:sldId id="273" r:id="rId11"/>
+    <p:sldId id="274" r:id="rId5"/>
+    <p:sldId id="261" r:id="rId6"/>
+    <p:sldId id="264" r:id="rId7"/>
+    <p:sldId id="268" r:id="rId8"/>
+    <p:sldId id="265" r:id="rId9"/>
+    <p:sldId id="266" r:id="rId10"/>
+    <p:sldId id="267" r:id="rId11"/>
+    <p:sldId id="273" r:id="rId12"/>
   </p:sldIdLst>
   <p:sldSz cx="9144000" cy="5143500" type="screen16x9"/>
   <p:notesSz cx="6858000" cy="9144000"/>
@@ -155,7 +156,7 @@
 <file path=ppt/revisionInfo.xml><?xml version="1.0" encoding="utf-8"?>
 <p1510:revInfo xmlns:a="http://schemas.openxmlformats.org/drawingml/2006/main" xmlns:r="http://schemas.openxmlformats.org/officeDocument/2006/relationships" xmlns:p1510="http://schemas.microsoft.com/office/powerpoint/2015/10/main">
   <p1510:revLst>
-    <p1510:client id="{704E13B9-32D7-4A28-92D8-A92CE0D0E976}" v="99" dt="2020-02-28T23:03:38.351"/>
+    <p1510:client id="{704E13B9-32D7-4A28-92D8-A92CE0D0E976}" v="103" dt="2020-02-28T23:44:39.885"/>
   </p1510:revLst>
 </p1510:revInfo>
 </file>
@@ -164,13 +165,13 @@
 <pc:chgInfo xmlns:a="http://schemas.openxmlformats.org/drawingml/2006/main" xmlns:r="http://schemas.openxmlformats.org/officeDocument/2006/relationships" xmlns:ac="http://schemas.microsoft.com/office/drawing/2013/main/command" xmlns:pc="http://schemas.microsoft.com/office/powerpoint/2013/main/command">
   <pc:docChgLst>
     <pc:chgData name="Thad Schwebke" userId="8a3b078b179e4a90" providerId="LiveId" clId="{704E13B9-32D7-4A28-92D8-A92CE0D0E976}"/>
-    <pc:docChg chg="undo custSel modSld">
-      <pc:chgData name="Thad Schwebke" userId="8a3b078b179e4a90" providerId="LiveId" clId="{704E13B9-32D7-4A28-92D8-A92CE0D0E976}" dt="2020-02-28T23:19:44.629" v="1605" actId="33524"/>
+    <pc:docChg chg="undo custSel addSld modSld">
+      <pc:chgData name="Thad Schwebke" userId="8a3b078b179e4a90" providerId="LiveId" clId="{704E13B9-32D7-4A28-92D8-A92CE0D0E976}" dt="2020-02-28T23:47:40.202" v="2063" actId="20577"/>
       <pc:docMkLst>
         <pc:docMk/>
       </pc:docMkLst>
-      <pc:sldChg chg="modSp mod modNotesTx">
-        <pc:chgData name="Thad Schwebke" userId="8a3b078b179e4a90" providerId="LiveId" clId="{704E13B9-32D7-4A28-92D8-A92CE0D0E976}" dt="2020-02-28T22:04:54.060" v="167" actId="20577"/>
+      <pc:sldChg chg="addSp modSp mod modNotesTx">
+        <pc:chgData name="Thad Schwebke" userId="8a3b078b179e4a90" providerId="LiveId" clId="{704E13B9-32D7-4A28-92D8-A92CE0D0E976}" dt="2020-02-28T23:37:14.938" v="1621" actId="14100"/>
         <pc:sldMkLst>
           <pc:docMk/>
           <pc:sldMk cId="3849262026" sldId="261"/>
@@ -183,15 +184,39 @@
             <ac:spMk id="13" creationId="{3AEE4A84-F268-4FBB-BBBF-E08ACC13DA49}"/>
           </ac:spMkLst>
         </pc:spChg>
+        <pc:spChg chg="add mod">
+          <ac:chgData name="Thad Schwebke" userId="8a3b078b179e4a90" providerId="LiveId" clId="{704E13B9-32D7-4A28-92D8-A92CE0D0E976}" dt="2020-02-28T23:37:14.938" v="1621" actId="14100"/>
+          <ac:spMkLst>
+            <pc:docMk/>
+            <pc:sldMk cId="3849262026" sldId="261"/>
+            <ac:spMk id="33" creationId="{3B5514CC-B342-484B-B4C3-307C7ED89E56}"/>
+          </ac:spMkLst>
+        </pc:spChg>
+        <pc:spChg chg="add mod">
+          <ac:chgData name="Thad Schwebke" userId="8a3b078b179e4a90" providerId="LiveId" clId="{704E13B9-32D7-4A28-92D8-A92CE0D0E976}" dt="2020-02-28T23:37:05.184" v="1617" actId="1076"/>
+          <ac:spMkLst>
+            <pc:docMk/>
+            <pc:sldMk cId="3849262026" sldId="261"/>
+            <ac:spMk id="34" creationId="{0627BCC2-5CCE-4713-83E3-2B9538750BC3}"/>
+          </ac:spMkLst>
+        </pc:spChg>
+        <pc:grpChg chg="mod">
+          <ac:chgData name="Thad Schwebke" userId="8a3b078b179e4a90" providerId="LiveId" clId="{704E13B9-32D7-4A28-92D8-A92CE0D0E976}" dt="2020-02-28T23:34:08.727" v="1615" actId="1076"/>
+          <ac:grpSpMkLst>
+            <pc:docMk/>
+            <pc:sldMk cId="3849262026" sldId="261"/>
+            <ac:grpSpMk id="8" creationId="{099554DF-8A97-4F23-B719-E4DB7A7D15D0}"/>
+          </ac:grpSpMkLst>
+        </pc:grpChg>
       </pc:sldChg>
       <pc:sldChg chg="addSp delSp modSp mod modNotesTx">
-        <pc:chgData name="Thad Schwebke" userId="8a3b078b179e4a90" providerId="LiveId" clId="{704E13B9-32D7-4A28-92D8-A92CE0D0E976}" dt="2020-02-28T23:16:36.045" v="1337" actId="20577"/>
+        <pc:chgData name="Thad Schwebke" userId="8a3b078b179e4a90" providerId="LiveId" clId="{704E13B9-32D7-4A28-92D8-A92CE0D0E976}" dt="2020-02-28T23:38:06.841" v="1623" actId="20577"/>
         <pc:sldMkLst>
           <pc:docMk/>
           <pc:sldMk cId="2663868610" sldId="264"/>
         </pc:sldMkLst>
         <pc:spChg chg="add mod">
-          <ac:chgData name="Thad Schwebke" userId="8a3b078b179e4a90" providerId="LiveId" clId="{704E13B9-32D7-4A28-92D8-A92CE0D0E976}" dt="2020-02-28T23:16:36.045" v="1337" actId="20577"/>
+          <ac:chgData name="Thad Schwebke" userId="8a3b078b179e4a90" providerId="LiveId" clId="{704E13B9-32D7-4A28-92D8-A92CE0D0E976}" dt="2020-02-28T23:38:06.841" v="1623" actId="20577"/>
           <ac:spMkLst>
             <pc:docMk/>
             <pc:sldMk cId="2663868610" sldId="264"/>
@@ -256,13 +281,13 @@
         </pc:picChg>
       </pc:sldChg>
       <pc:sldChg chg="addSp delSp modSp mod">
-        <pc:chgData name="Thad Schwebke" userId="8a3b078b179e4a90" providerId="LiveId" clId="{704E13B9-32D7-4A28-92D8-A92CE0D0E976}" dt="2020-02-28T23:01:20.723" v="1102" actId="20577"/>
+        <pc:chgData name="Thad Schwebke" userId="8a3b078b179e4a90" providerId="LiveId" clId="{704E13B9-32D7-4A28-92D8-A92CE0D0E976}" dt="2020-02-28T23:39:56.655" v="1625" actId="20577"/>
         <pc:sldMkLst>
           <pc:docMk/>
           <pc:sldMk cId="245379799" sldId="265"/>
         </pc:sldMkLst>
         <pc:spChg chg="add mod">
-          <ac:chgData name="Thad Schwebke" userId="8a3b078b179e4a90" providerId="LiveId" clId="{704E13B9-32D7-4A28-92D8-A92CE0D0E976}" dt="2020-02-28T23:01:20.723" v="1102" actId="20577"/>
+          <ac:chgData name="Thad Schwebke" userId="8a3b078b179e4a90" providerId="LiveId" clId="{704E13B9-32D7-4A28-92D8-A92CE0D0E976}" dt="2020-02-28T23:39:56.655" v="1625" actId="20577"/>
           <ac:spMkLst>
             <pc:docMk/>
             <pc:sldMk cId="245379799" sldId="265"/>
@@ -333,13 +358,13 @@
         </pc:spChg>
       </pc:sldChg>
       <pc:sldChg chg="addSp modSp mod">
-        <pc:chgData name="Thad Schwebke" userId="8a3b078b179e4a90" providerId="LiveId" clId="{704E13B9-32D7-4A28-92D8-A92CE0D0E976}" dt="2020-02-28T22:52:15.367" v="815" actId="1076"/>
+        <pc:chgData name="Thad Schwebke" userId="8a3b078b179e4a90" providerId="LiveId" clId="{704E13B9-32D7-4A28-92D8-A92CE0D0E976}" dt="2020-02-28T23:39:01.794" v="1624" actId="20577"/>
         <pc:sldMkLst>
           <pc:docMk/>
           <pc:sldMk cId="2005336270" sldId="268"/>
         </pc:sldMkLst>
         <pc:spChg chg="add mod">
-          <ac:chgData name="Thad Schwebke" userId="8a3b078b179e4a90" providerId="LiveId" clId="{704E13B9-32D7-4A28-92D8-A92CE0D0E976}" dt="2020-02-28T22:52:15.367" v="815" actId="1076"/>
+          <ac:chgData name="Thad Schwebke" userId="8a3b078b179e4a90" providerId="LiveId" clId="{704E13B9-32D7-4A28-92D8-A92CE0D0E976}" dt="2020-02-28T23:39:01.794" v="1624" actId="20577"/>
           <ac:spMkLst>
             <pc:docMk/>
             <pc:sldMk cId="2005336270" sldId="268"/>
@@ -363,20 +388,106 @@
           </ac:picMkLst>
         </pc:picChg>
       </pc:sldChg>
-      <pc:sldChg chg="modSp mod">
-        <pc:chgData name="Thad Schwebke" userId="8a3b078b179e4a90" providerId="LiveId" clId="{704E13B9-32D7-4A28-92D8-A92CE0D0E976}" dt="2020-02-28T21:38:41.253" v="4" actId="20577"/>
+      <pc:sldChg chg="delSp modSp mod">
+        <pc:chgData name="Thad Schwebke" userId="8a3b078b179e4a90" providerId="LiveId" clId="{704E13B9-32D7-4A28-92D8-A92CE0D0E976}" dt="2020-02-28T23:44:35.644" v="1655" actId="1076"/>
         <pc:sldMkLst>
           <pc:docMk/>
           <pc:sldMk cId="832593484" sldId="271"/>
         </pc:sldMkLst>
         <pc:spChg chg="mod">
-          <ac:chgData name="Thad Schwebke" userId="8a3b078b179e4a90" providerId="LiveId" clId="{704E13B9-32D7-4A28-92D8-A92CE0D0E976}" dt="2020-02-28T21:38:41.253" v="4" actId="20577"/>
+          <ac:chgData name="Thad Schwebke" userId="8a3b078b179e4a90" providerId="LiveId" clId="{704E13B9-32D7-4A28-92D8-A92CE0D0E976}" dt="2020-02-28T23:44:35.644" v="1655" actId="1076"/>
+          <ac:spMkLst>
+            <pc:docMk/>
+            <pc:sldMk cId="832593484" sldId="271"/>
+            <ac:spMk id="4" creationId="{C37B7804-918B-424E-9C73-00428C94F96C}"/>
+          </ac:spMkLst>
+        </pc:spChg>
+        <pc:spChg chg="del mod">
+          <ac:chgData name="Thad Schwebke" userId="8a3b078b179e4a90" providerId="LiveId" clId="{704E13B9-32D7-4A28-92D8-A92CE0D0E976}" dt="2020-02-28T23:44:29.142" v="1654" actId="478"/>
           <ac:spMkLst>
             <pc:docMk/>
             <pc:sldMk cId="832593484" sldId="271"/>
             <ac:spMk id="11" creationId="{A2387AF3-1DA3-4623-8B20-25111713E76F}"/>
           </ac:spMkLst>
         </pc:spChg>
+        <pc:picChg chg="del">
+          <ac:chgData name="Thad Schwebke" userId="8a3b078b179e4a90" providerId="LiveId" clId="{704E13B9-32D7-4A28-92D8-A92CE0D0E976}" dt="2020-02-28T23:44:27.333" v="1653" actId="478"/>
+          <ac:picMkLst>
+            <pc:docMk/>
+            <pc:sldMk cId="832593484" sldId="271"/>
+            <ac:picMk id="10" creationId="{A56117B1-9819-42E5-AEFC-9AD2D125A6E9}"/>
+          </ac:picMkLst>
+        </pc:picChg>
+      </pc:sldChg>
+      <pc:sldChg chg="modSp mod">
+        <pc:chgData name="Thad Schwebke" userId="8a3b078b179e4a90" providerId="LiveId" clId="{704E13B9-32D7-4A28-92D8-A92CE0D0E976}" dt="2020-02-28T23:32:29.228" v="1614" actId="20577"/>
+        <pc:sldMkLst>
+          <pc:docMk/>
+          <pc:sldMk cId="1538342588" sldId="272"/>
+        </pc:sldMkLst>
+        <pc:spChg chg="mod">
+          <ac:chgData name="Thad Schwebke" userId="8a3b078b179e4a90" providerId="LiveId" clId="{704E13B9-32D7-4A28-92D8-A92CE0D0E976}" dt="2020-02-28T23:32:29.228" v="1614" actId="20577"/>
+          <ac:spMkLst>
+            <pc:docMk/>
+            <pc:sldMk cId="1538342588" sldId="272"/>
+            <ac:spMk id="6" creationId="{68F030ED-4EC5-440E-B58F-AC0D6E56493D}"/>
+          </ac:spMkLst>
+        </pc:spChg>
+      </pc:sldChg>
+      <pc:sldChg chg="addSp delSp modSp add mod">
+        <pc:chgData name="Thad Schwebke" userId="8a3b078b179e4a90" providerId="LiveId" clId="{704E13B9-32D7-4A28-92D8-A92CE0D0E976}" dt="2020-02-28T23:47:40.202" v="2063" actId="20577"/>
+        <pc:sldMkLst>
+          <pc:docMk/>
+          <pc:sldMk cId="1420569290" sldId="274"/>
+        </pc:sldMkLst>
+        <pc:spChg chg="mod">
+          <ac:chgData name="Thad Schwebke" userId="8a3b078b179e4a90" providerId="LiveId" clId="{704E13B9-32D7-4A28-92D8-A92CE0D0E976}" dt="2020-02-28T23:44:00.976" v="1648" actId="1076"/>
+          <ac:spMkLst>
+            <pc:docMk/>
+            <pc:sldMk cId="1420569290" sldId="274"/>
+            <ac:spMk id="2" creationId="{006E9E57-AA0B-4A73-96A9-2A10F0C4C9C2}"/>
+          </ac:spMkLst>
+        </pc:spChg>
+        <pc:spChg chg="del mod">
+          <ac:chgData name="Thad Schwebke" userId="8a3b078b179e4a90" providerId="LiveId" clId="{704E13B9-32D7-4A28-92D8-A92CE0D0E976}" dt="2020-02-28T23:44:19.159" v="1651" actId="478"/>
+          <ac:spMkLst>
+            <pc:docMk/>
+            <pc:sldMk cId="1420569290" sldId="274"/>
+            <ac:spMk id="4" creationId="{C37B7804-918B-424E-9C73-00428C94F96C}"/>
+          </ac:spMkLst>
+        </pc:spChg>
+        <pc:spChg chg="add del mod">
+          <ac:chgData name="Thad Schwebke" userId="8a3b078b179e4a90" providerId="LiveId" clId="{704E13B9-32D7-4A28-92D8-A92CE0D0E976}" dt="2020-02-28T23:44:23.157" v="1652" actId="478"/>
+          <ac:spMkLst>
+            <pc:docMk/>
+            <pc:sldMk cId="1420569290" sldId="274"/>
+            <ac:spMk id="5" creationId="{18CA12CC-75B1-4813-83ED-0FD9725CD678}"/>
+          </ac:spMkLst>
+        </pc:spChg>
+        <pc:spChg chg="add mod">
+          <ac:chgData name="Thad Schwebke" userId="8a3b078b179e4a90" providerId="LiveId" clId="{704E13B9-32D7-4A28-92D8-A92CE0D0E976}" dt="2020-02-28T23:47:40.202" v="2063" actId="20577"/>
+          <ac:spMkLst>
+            <pc:docMk/>
+            <pc:sldMk cId="1420569290" sldId="274"/>
+            <ac:spMk id="9" creationId="{05646316-BE79-49C8-A6AC-F807345DB376}"/>
+          </ac:spMkLst>
+        </pc:spChg>
+        <pc:spChg chg="del">
+          <ac:chgData name="Thad Schwebke" userId="8a3b078b179e4a90" providerId="LiveId" clId="{704E13B9-32D7-4A28-92D8-A92CE0D0E976}" dt="2020-02-28T23:44:17.070" v="1650" actId="478"/>
+          <ac:spMkLst>
+            <pc:docMk/>
+            <pc:sldMk cId="1420569290" sldId="274"/>
+            <ac:spMk id="11" creationId="{A2387AF3-1DA3-4623-8B20-25111713E76F}"/>
+          </ac:spMkLst>
+        </pc:spChg>
+        <pc:picChg chg="mod">
+          <ac:chgData name="Thad Schwebke" userId="8a3b078b179e4a90" providerId="LiveId" clId="{704E13B9-32D7-4A28-92D8-A92CE0D0E976}" dt="2020-02-28T23:44:04.431" v="1649" actId="1076"/>
+          <ac:picMkLst>
+            <pc:docMk/>
+            <pc:sldMk cId="1420569290" sldId="274"/>
+            <ac:picMk id="10" creationId="{A56117B1-9819-42E5-AEFC-9AD2D125A6E9}"/>
+          </ac:picMkLst>
+        </pc:picChg>
       </pc:sldChg>
     </pc:docChg>
   </pc:docChgLst>
@@ -1006,6 +1117,185 @@
 </p:notes>
 </file>
 
+<file path=ppt/notesSlides/notesSlide10.xml><?xml version="1.0" encoding="utf-8"?>
+<p:notes xmlns:a="http://schemas.openxmlformats.org/drawingml/2006/main" xmlns:r="http://schemas.openxmlformats.org/officeDocument/2006/relationships" xmlns:p="http://schemas.openxmlformats.org/presentationml/2006/main">
+  <p:cSld>
+    <p:spTree>
+      <p:nvGrpSpPr>
+        <p:cNvPr id="1" name=""/>
+        <p:cNvGrpSpPr/>
+        <p:nvPr/>
+      </p:nvGrpSpPr>
+      <p:grpSpPr>
+        <a:xfrm>
+          <a:off x="0" y="0"/>
+          <a:ext cx="0" cy="0"/>
+          <a:chOff x="0" y="0"/>
+          <a:chExt cx="0" cy="0"/>
+        </a:xfrm>
+      </p:grpSpPr>
+      <p:sp>
+        <p:nvSpPr>
+          <p:cNvPr id="2" name="Slide Image Placeholder 1"/>
+          <p:cNvSpPr>
+            <a:spLocks noGrp="1" noRot="1" noChangeAspect="1"/>
+          </p:cNvSpPr>
+          <p:nvPr>
+            <p:ph type="sldImg"/>
+          </p:nvPr>
+        </p:nvSpPr>
+        <p:spPr/>
+      </p:sp>
+      <p:sp>
+        <p:nvSpPr>
+          <p:cNvPr id="3" name="Notes Placeholder 2"/>
+          <p:cNvSpPr>
+            <a:spLocks noGrp="1"/>
+          </p:cNvSpPr>
+          <p:nvPr>
+            <p:ph type="body" idx="1"/>
+          </p:nvPr>
+        </p:nvSpPr>
+        <p:spPr/>
+        <p:txBody>
+          <a:bodyPr/>
+          <a:lstStyle/>
+          <a:p>
+            <a:pPr marL="0" marR="0" lvl="0" indent="0" algn="l" defTabSz="914400" rtl="0" eaLnBrk="1" fontAlgn="auto" latinLnBrk="0" hangingPunct="1">
+              <a:lnSpc>
+                <a:spcPct val="100000"/>
+              </a:lnSpc>
+              <a:spcBef>
+                <a:spcPts val="0"/>
+              </a:spcBef>
+              <a:spcAft>
+                <a:spcPts val="0"/>
+              </a:spcAft>
+              <a:buClrTx/>
+              <a:buSzTx/>
+              <a:buFontTx/>
+              <a:buNone/>
+              <a:tabLst/>
+              <a:defRPr/>
+            </a:pPr>
+            <a:r>
+              <a:rPr lang="en-US" dirty="0"/>
+              <a:t>Ask the question why for each chart</a:t>
+            </a:r>
+          </a:p>
+          <a:p>
+            <a:pPr marL="0" marR="0" lvl="0" indent="0" algn="l" defTabSz="914400" rtl="0" eaLnBrk="1" fontAlgn="auto" latinLnBrk="0" hangingPunct="1">
+              <a:lnSpc>
+                <a:spcPct val="100000"/>
+              </a:lnSpc>
+              <a:spcBef>
+                <a:spcPts val="0"/>
+              </a:spcBef>
+              <a:spcAft>
+                <a:spcPts val="0"/>
+              </a:spcAft>
+              <a:buClrTx/>
+              <a:buSzTx/>
+              <a:buFontTx/>
+              <a:buNone/>
+              <a:tabLst/>
+              <a:defRPr/>
+            </a:pPr>
+            <a:endParaRPr lang="en-US" dirty="0"/>
+          </a:p>
+          <a:p>
+            <a:pPr marL="0" marR="0" lvl="0" indent="0" algn="l" defTabSz="914400" rtl="0" eaLnBrk="1" fontAlgn="auto" latinLnBrk="0" hangingPunct="1">
+              <a:lnSpc>
+                <a:spcPct val="100000"/>
+              </a:lnSpc>
+              <a:spcBef>
+                <a:spcPts val="0"/>
+              </a:spcBef>
+              <a:spcAft>
+                <a:spcPts val="0"/>
+              </a:spcAft>
+              <a:buClrTx/>
+              <a:buSzTx/>
+              <a:buFontTx/>
+              <a:buNone/>
+              <a:tabLst/>
+              <a:defRPr/>
+            </a:pPr>
+            <a:endParaRPr lang="en-US" dirty="0"/>
+          </a:p>
+          <a:p>
+            <a:pPr marL="0" marR="0" lvl="0" indent="0" algn="l" defTabSz="914400" rtl="0" eaLnBrk="1" fontAlgn="auto" latinLnBrk="0" hangingPunct="1">
+              <a:lnSpc>
+                <a:spcPct val="100000"/>
+              </a:lnSpc>
+              <a:spcBef>
+                <a:spcPts val="0"/>
+              </a:spcBef>
+              <a:spcAft>
+                <a:spcPts val="0"/>
+              </a:spcAft>
+              <a:buClrTx/>
+              <a:buSzTx/>
+              <a:buFontTx/>
+              <a:buNone/>
+              <a:tabLst/>
+              <a:defRPr/>
+            </a:pPr>
+            <a:r>
+              <a:rPr lang="en-US" dirty="0"/>
+              <a:t>Speaker: Thad Schwebke</a:t>
+            </a:r>
+          </a:p>
+          <a:p>
+            <a:endParaRPr lang="en-US" dirty="0"/>
+          </a:p>
+          <a:p>
+            <a:r>
+              <a:rPr lang="en-US" dirty="0"/>
+              <a:t>Notes: The dot plot illustrates what appears to  be a positive linear relationship between the ABB and IBU. The addition of the trend line somewhat confirms the presence of a positive linear relationship between the ABV and IBU. More analysis would be needed to confirm.</a:t>
+            </a:r>
+          </a:p>
+          <a:p>
+            <a:endParaRPr lang="en-US" dirty="0"/>
+          </a:p>
+        </p:txBody>
+      </p:sp>
+      <p:sp>
+        <p:nvSpPr>
+          <p:cNvPr id="4" name="Slide Number Placeholder 3"/>
+          <p:cNvSpPr>
+            <a:spLocks noGrp="1"/>
+          </p:cNvSpPr>
+          <p:nvPr>
+            <p:ph type="sldNum" sz="quarter" idx="5"/>
+          </p:nvPr>
+        </p:nvSpPr>
+        <p:spPr/>
+        <p:txBody>
+          <a:bodyPr/>
+          <a:lstStyle/>
+          <a:p>
+            <a:fld id="{274AE7AE-FCBF-419F-971E-04B351FA8EC0}" type="slidenum">
+              <a:rPr lang="en-US" smtClean="0"/>
+              <a:t>10</a:t>
+            </a:fld>
+            <a:endParaRPr lang="en-US"/>
+          </a:p>
+        </p:txBody>
+      </p:sp>
+    </p:spTree>
+    <p:extLst>
+      <p:ext uri="{BB962C8B-B14F-4D97-AF65-F5344CB8AC3E}">
+        <p14:creationId xmlns:p14="http://schemas.microsoft.com/office/powerpoint/2010/main" val="3427665525"/>
+      </p:ext>
+    </p:extLst>
+  </p:cSld>
+  <p:clrMapOvr>
+    <a:masterClrMapping/>
+  </p:clrMapOvr>
+</p:notes>
+</file>
+
 <file path=ppt/notesSlides/notesSlide2.xml><?xml version="1.0" encoding="utf-8"?>
 <p:notes xmlns:a="http://schemas.openxmlformats.org/drawingml/2006/main" xmlns:r="http://schemas.openxmlformats.org/officeDocument/2006/relationships" xmlns:p="http://schemas.openxmlformats.org/presentationml/2006/main">
   <p:cSld>
@@ -1350,6 +1640,158 @@
           <a:p>
             <a:r>
               <a:rPr lang="en-US" dirty="0"/>
+              <a:t>Speaker: Rajesh</a:t>
+            </a:r>
+          </a:p>
+          <a:p>
+            <a:r>
+              <a:rPr lang="en-US" dirty="0"/>
+              <a:t>Notes: Our analysis is based upon the two datasets, beers and breweries, which is provided by Budweiser</a:t>
+            </a:r>
+          </a:p>
+          <a:p>
+            <a:endParaRPr lang="en-US" dirty="0"/>
+          </a:p>
+          <a:p>
+            <a:r>
+              <a:rPr lang="en-US" sz="1200" b="0" i="1" kern="1200" dirty="0">
+                <a:solidFill>
+                  <a:schemeClr val="tx1"/>
+                </a:solidFill>
+                <a:effectLst/>
+                <a:latin typeface="+mn-lt"/>
+                <a:ea typeface="+mn-ea"/>
+                <a:cs typeface="+mn-cs"/>
+              </a:rPr>
+              <a:t>There are 62 (2.57%) observations where both ABV and IBU are empty, 943 (41.7%) observations where only IBU is empty. </a:t>
+            </a:r>
+          </a:p>
+          <a:p>
+            <a:r>
+              <a:rPr lang="en-US" sz="1200" b="0" i="1" kern="1200" dirty="0">
+                <a:solidFill>
+                  <a:schemeClr val="tx1"/>
+                </a:solidFill>
+                <a:effectLst/>
+                <a:latin typeface="+mn-lt"/>
+                <a:ea typeface="+mn-ea"/>
+                <a:cs typeface="+mn-cs"/>
+              </a:rPr>
+              <a:t>For all observations that had both only IBU empty, the NA value was changed to zero since having a non-bitter alcoholic beer is possible. Whereas we choose not to include any observations that had zero ABV. That just isn’t a real beer. This leaves us with only 2.57% of the observations not being used.</a:t>
+            </a:r>
+          </a:p>
+          <a:p>
+            <a:endParaRPr lang="en-US" sz="1200" b="0" i="1" kern="1200" dirty="0">
+              <a:solidFill>
+                <a:schemeClr val="tx1"/>
+              </a:solidFill>
+              <a:effectLst/>
+              <a:latin typeface="+mn-lt"/>
+              <a:ea typeface="+mn-ea"/>
+              <a:cs typeface="+mn-cs"/>
+            </a:endParaRPr>
+          </a:p>
+          <a:p>
+            <a:r>
+              <a:rPr lang="en-US" sz="1200" b="0" i="1" kern="1200" dirty="0">
+                <a:solidFill>
+                  <a:schemeClr val="tx1"/>
+                </a:solidFill>
+                <a:effectLst/>
+                <a:latin typeface="+mn-lt"/>
+                <a:ea typeface="+mn-ea"/>
+                <a:cs typeface="+mn-cs"/>
+              </a:rPr>
+              <a:t>This is how we addressed missing values, there are 2.6% of observations where both ABV and IBU are empty and 41.7% of total observations just IBU, which are empty. We made some realistic assumption that, a beer can exist without bitterness but probably not without alcohol. So, we have excluded all the ABV observations with NA’s and replaced IBU NA’s with zeros </a:t>
+            </a:r>
+          </a:p>
+          <a:p>
+            <a:endParaRPr lang="en-US" dirty="0"/>
+          </a:p>
+        </p:txBody>
+      </p:sp>
+      <p:sp>
+        <p:nvSpPr>
+          <p:cNvPr id="4" name="Slide Number Placeholder 3"/>
+          <p:cNvSpPr>
+            <a:spLocks noGrp="1"/>
+          </p:cNvSpPr>
+          <p:nvPr>
+            <p:ph type="sldNum" sz="quarter" idx="5"/>
+          </p:nvPr>
+        </p:nvSpPr>
+        <p:spPr/>
+        <p:txBody>
+          <a:bodyPr/>
+          <a:lstStyle/>
+          <a:p>
+            <a:fld id="{274AE7AE-FCBF-419F-971E-04B351FA8EC0}" type="slidenum">
+              <a:rPr lang="en-US" smtClean="0"/>
+              <a:t>4</a:t>
+            </a:fld>
+            <a:endParaRPr lang="en-US"/>
+          </a:p>
+        </p:txBody>
+      </p:sp>
+    </p:spTree>
+    <p:extLst>
+      <p:ext uri="{BB962C8B-B14F-4D97-AF65-F5344CB8AC3E}">
+        <p14:creationId xmlns:p14="http://schemas.microsoft.com/office/powerpoint/2010/main" val="1065355"/>
+      </p:ext>
+    </p:extLst>
+  </p:cSld>
+  <p:clrMapOvr>
+    <a:masterClrMapping/>
+  </p:clrMapOvr>
+</p:notes>
+</file>
+
+<file path=ppt/notesSlides/notesSlide5.xml><?xml version="1.0" encoding="utf-8"?>
+<p:notes xmlns:a="http://schemas.openxmlformats.org/drawingml/2006/main" xmlns:r="http://schemas.openxmlformats.org/officeDocument/2006/relationships" xmlns:p="http://schemas.openxmlformats.org/presentationml/2006/main">
+  <p:cSld>
+    <p:spTree>
+      <p:nvGrpSpPr>
+        <p:cNvPr id="1" name=""/>
+        <p:cNvGrpSpPr/>
+        <p:nvPr/>
+      </p:nvGrpSpPr>
+      <p:grpSpPr>
+        <a:xfrm>
+          <a:off x="0" y="0"/>
+          <a:ext cx="0" cy="0"/>
+          <a:chOff x="0" y="0"/>
+          <a:chExt cx="0" cy="0"/>
+        </a:xfrm>
+      </p:grpSpPr>
+      <p:sp>
+        <p:nvSpPr>
+          <p:cNvPr id="2" name="Slide Image Placeholder 1"/>
+          <p:cNvSpPr>
+            <a:spLocks noGrp="1" noRot="1" noChangeAspect="1"/>
+          </p:cNvSpPr>
+          <p:nvPr>
+            <p:ph type="sldImg"/>
+          </p:nvPr>
+        </p:nvSpPr>
+        <p:spPr/>
+      </p:sp>
+      <p:sp>
+        <p:nvSpPr>
+          <p:cNvPr id="3" name="Notes Placeholder 2"/>
+          <p:cNvSpPr>
+            <a:spLocks noGrp="1"/>
+          </p:cNvSpPr>
+          <p:nvPr>
+            <p:ph type="body" idx="1"/>
+          </p:nvPr>
+        </p:nvSpPr>
+        <p:spPr/>
+        <p:txBody>
+          <a:bodyPr/>
+          <a:lstStyle/>
+          <a:p>
+            <a:r>
+              <a:rPr lang="en-US" dirty="0"/>
               <a:t>Speaker: Kris</a:t>
             </a:r>
           </a:p>
@@ -1430,7 +1872,7 @@
           <a:p>
             <a:fld id="{274AE7AE-FCBF-419F-971E-04B351FA8EC0}" type="slidenum">
               <a:rPr lang="en-US" smtClean="0"/>
-              <a:t>4</a:t>
+              <a:t>5</a:t>
             </a:fld>
             <a:endParaRPr lang="en-US"/>
           </a:p>
@@ -1449,7 +1891,7 @@
 </p:notes>
 </file>
 
-<file path=ppt/notesSlides/notesSlide5.xml><?xml version="1.0" encoding="utf-8"?>
+<file path=ppt/notesSlides/notesSlide6.xml><?xml version="1.0" encoding="utf-8"?>
 <p:notes xmlns:a="http://schemas.openxmlformats.org/drawingml/2006/main" xmlns:r="http://schemas.openxmlformats.org/officeDocument/2006/relationships" xmlns:p="http://schemas.openxmlformats.org/presentationml/2006/main">
   <p:cSld>
     <p:spTree>
@@ -1647,7 +2089,7 @@
           <a:p>
             <a:fld id="{274AE7AE-FCBF-419F-971E-04B351FA8EC0}" type="slidenum">
               <a:rPr lang="en-US" smtClean="0"/>
-              <a:t>5</a:t>
+              <a:t>6</a:t>
             </a:fld>
             <a:endParaRPr lang="en-US"/>
           </a:p>
@@ -1666,7 +2108,7 @@
 </p:notes>
 </file>
 
-<file path=ppt/notesSlides/notesSlide6.xml><?xml version="1.0" encoding="utf-8"?>
+<file path=ppt/notesSlides/notesSlide7.xml><?xml version="1.0" encoding="utf-8"?>
 <p:notes xmlns:a="http://schemas.openxmlformats.org/drawingml/2006/main" xmlns:r="http://schemas.openxmlformats.org/officeDocument/2006/relationships" xmlns:p="http://schemas.openxmlformats.org/presentationml/2006/main">
   <p:cSld>
     <p:spTree>
@@ -1770,7 +2212,7 @@
           <a:p>
             <a:fld id="{274AE7AE-FCBF-419F-971E-04B351FA8EC0}" type="slidenum">
               <a:rPr lang="en-US" smtClean="0"/>
-              <a:t>6</a:t>
+              <a:t>7</a:t>
             </a:fld>
             <a:endParaRPr lang="en-US"/>
           </a:p>
@@ -1789,7 +2231,7 @@
 </p:notes>
 </file>
 
-<file path=ppt/notesSlides/notesSlide7.xml><?xml version="1.0" encoding="utf-8"?>
+<file path=ppt/notesSlides/notesSlide8.xml><?xml version="1.0" encoding="utf-8"?>
 <p:notes xmlns:a="http://schemas.openxmlformats.org/drawingml/2006/main" xmlns:r="http://schemas.openxmlformats.org/officeDocument/2006/relationships" xmlns:p="http://schemas.openxmlformats.org/presentationml/2006/main">
   <p:cSld>
     <p:spTree>
@@ -1879,7 +2321,7 @@
           <a:p>
             <a:fld id="{274AE7AE-FCBF-419F-971E-04B351FA8EC0}" type="slidenum">
               <a:rPr lang="en-US" smtClean="0"/>
-              <a:t>7</a:t>
+              <a:t>8</a:t>
             </a:fld>
             <a:endParaRPr lang="en-US"/>
           </a:p>
@@ -1898,7 +2340,7 @@
 </p:notes>
 </file>
 
-<file path=ppt/notesSlides/notesSlide8.xml><?xml version="1.0" encoding="utf-8"?>
+<file path=ppt/notesSlides/notesSlide9.xml><?xml version="1.0" encoding="utf-8"?>
 <p:notes xmlns:a="http://schemas.openxmlformats.org/drawingml/2006/main" xmlns:r="http://schemas.openxmlformats.org/officeDocument/2006/relationships" xmlns:p="http://schemas.openxmlformats.org/presentationml/2006/main">
   <p:cSld>
     <p:spTree>
@@ -2061,7 +2503,7 @@
           <a:p>
             <a:fld id="{274AE7AE-FCBF-419F-971E-04B351FA8EC0}" type="slidenum">
               <a:rPr lang="en-US" smtClean="0"/>
-              <a:t>8</a:t>
+              <a:t>9</a:t>
             </a:fld>
             <a:endParaRPr lang="en-US"/>
           </a:p>
@@ -2071,185 +2513,6 @@
     <p:extLst>
       <p:ext uri="{BB962C8B-B14F-4D97-AF65-F5344CB8AC3E}">
         <p14:creationId xmlns:p14="http://schemas.microsoft.com/office/powerpoint/2010/main" val="38672616"/>
-      </p:ext>
-    </p:extLst>
-  </p:cSld>
-  <p:clrMapOvr>
-    <a:masterClrMapping/>
-  </p:clrMapOvr>
-</p:notes>
-</file>
-
-<file path=ppt/notesSlides/notesSlide9.xml><?xml version="1.0" encoding="utf-8"?>
-<p:notes xmlns:a="http://schemas.openxmlformats.org/drawingml/2006/main" xmlns:r="http://schemas.openxmlformats.org/officeDocument/2006/relationships" xmlns:p="http://schemas.openxmlformats.org/presentationml/2006/main">
-  <p:cSld>
-    <p:spTree>
-      <p:nvGrpSpPr>
-        <p:cNvPr id="1" name=""/>
-        <p:cNvGrpSpPr/>
-        <p:nvPr/>
-      </p:nvGrpSpPr>
-      <p:grpSpPr>
-        <a:xfrm>
-          <a:off x="0" y="0"/>
-          <a:ext cx="0" cy="0"/>
-          <a:chOff x="0" y="0"/>
-          <a:chExt cx="0" cy="0"/>
-        </a:xfrm>
-      </p:grpSpPr>
-      <p:sp>
-        <p:nvSpPr>
-          <p:cNvPr id="2" name="Slide Image Placeholder 1"/>
-          <p:cNvSpPr>
-            <a:spLocks noGrp="1" noRot="1" noChangeAspect="1"/>
-          </p:cNvSpPr>
-          <p:nvPr>
-            <p:ph type="sldImg"/>
-          </p:nvPr>
-        </p:nvSpPr>
-        <p:spPr/>
-      </p:sp>
-      <p:sp>
-        <p:nvSpPr>
-          <p:cNvPr id="3" name="Notes Placeholder 2"/>
-          <p:cNvSpPr>
-            <a:spLocks noGrp="1"/>
-          </p:cNvSpPr>
-          <p:nvPr>
-            <p:ph type="body" idx="1"/>
-          </p:nvPr>
-        </p:nvSpPr>
-        <p:spPr/>
-        <p:txBody>
-          <a:bodyPr/>
-          <a:lstStyle/>
-          <a:p>
-            <a:pPr marL="0" marR="0" lvl="0" indent="0" algn="l" defTabSz="914400" rtl="0" eaLnBrk="1" fontAlgn="auto" latinLnBrk="0" hangingPunct="1">
-              <a:lnSpc>
-                <a:spcPct val="100000"/>
-              </a:lnSpc>
-              <a:spcBef>
-                <a:spcPts val="0"/>
-              </a:spcBef>
-              <a:spcAft>
-                <a:spcPts val="0"/>
-              </a:spcAft>
-              <a:buClrTx/>
-              <a:buSzTx/>
-              <a:buFontTx/>
-              <a:buNone/>
-              <a:tabLst/>
-              <a:defRPr/>
-            </a:pPr>
-            <a:r>
-              <a:rPr lang="en-US" dirty="0"/>
-              <a:t>Ask the question why for each chart</a:t>
-            </a:r>
-          </a:p>
-          <a:p>
-            <a:pPr marL="0" marR="0" lvl="0" indent="0" algn="l" defTabSz="914400" rtl="0" eaLnBrk="1" fontAlgn="auto" latinLnBrk="0" hangingPunct="1">
-              <a:lnSpc>
-                <a:spcPct val="100000"/>
-              </a:lnSpc>
-              <a:spcBef>
-                <a:spcPts val="0"/>
-              </a:spcBef>
-              <a:spcAft>
-                <a:spcPts val="0"/>
-              </a:spcAft>
-              <a:buClrTx/>
-              <a:buSzTx/>
-              <a:buFontTx/>
-              <a:buNone/>
-              <a:tabLst/>
-              <a:defRPr/>
-            </a:pPr>
-            <a:endParaRPr lang="en-US" dirty="0"/>
-          </a:p>
-          <a:p>
-            <a:pPr marL="0" marR="0" lvl="0" indent="0" algn="l" defTabSz="914400" rtl="0" eaLnBrk="1" fontAlgn="auto" latinLnBrk="0" hangingPunct="1">
-              <a:lnSpc>
-                <a:spcPct val="100000"/>
-              </a:lnSpc>
-              <a:spcBef>
-                <a:spcPts val="0"/>
-              </a:spcBef>
-              <a:spcAft>
-                <a:spcPts val="0"/>
-              </a:spcAft>
-              <a:buClrTx/>
-              <a:buSzTx/>
-              <a:buFontTx/>
-              <a:buNone/>
-              <a:tabLst/>
-              <a:defRPr/>
-            </a:pPr>
-            <a:endParaRPr lang="en-US" dirty="0"/>
-          </a:p>
-          <a:p>
-            <a:pPr marL="0" marR="0" lvl="0" indent="0" algn="l" defTabSz="914400" rtl="0" eaLnBrk="1" fontAlgn="auto" latinLnBrk="0" hangingPunct="1">
-              <a:lnSpc>
-                <a:spcPct val="100000"/>
-              </a:lnSpc>
-              <a:spcBef>
-                <a:spcPts val="0"/>
-              </a:spcBef>
-              <a:spcAft>
-                <a:spcPts val="0"/>
-              </a:spcAft>
-              <a:buClrTx/>
-              <a:buSzTx/>
-              <a:buFontTx/>
-              <a:buNone/>
-              <a:tabLst/>
-              <a:defRPr/>
-            </a:pPr>
-            <a:r>
-              <a:rPr lang="en-US" dirty="0"/>
-              <a:t>Speaker: Thad Schwebke</a:t>
-            </a:r>
-          </a:p>
-          <a:p>
-            <a:endParaRPr lang="en-US" dirty="0"/>
-          </a:p>
-          <a:p>
-            <a:r>
-              <a:rPr lang="en-US" dirty="0"/>
-              <a:t>Notes: The dot plot illustrates what appears to  be a positive linear relationship between the ABB and IBU. The addition of the trend line somewhat confirms the presence of a positive linear relationship between the ABV and IBU. More analysis would be needed to confirm.</a:t>
-            </a:r>
-          </a:p>
-          <a:p>
-            <a:endParaRPr lang="en-US" dirty="0"/>
-          </a:p>
-        </p:txBody>
-      </p:sp>
-      <p:sp>
-        <p:nvSpPr>
-          <p:cNvPr id="4" name="Slide Number Placeholder 3"/>
-          <p:cNvSpPr>
-            <a:spLocks noGrp="1"/>
-          </p:cNvSpPr>
-          <p:nvPr>
-            <p:ph type="sldNum" sz="quarter" idx="5"/>
-          </p:nvPr>
-        </p:nvSpPr>
-        <p:spPr/>
-        <p:txBody>
-          <a:bodyPr/>
-          <a:lstStyle/>
-          <a:p>
-            <a:fld id="{274AE7AE-FCBF-419F-971E-04B351FA8EC0}" type="slidenum">
-              <a:rPr lang="en-US" smtClean="0"/>
-              <a:t>9</a:t>
-            </a:fld>
-            <a:endParaRPr lang="en-US"/>
-          </a:p>
-        </p:txBody>
-      </p:sp>
-    </p:spTree>
-    <p:extLst>
-      <p:ext uri="{BB962C8B-B14F-4D97-AF65-F5344CB8AC3E}">
-        <p14:creationId xmlns:p14="http://schemas.microsoft.com/office/powerpoint/2010/main" val="3427665525"/>
       </p:ext>
     </p:extLst>
   </p:cSld>
@@ -20323,6 +20586,204 @@
       </p:grpSpPr>
       <p:sp>
         <p:nvSpPr>
+          <p:cNvPr id="2" name="Title 1">
+            <a:extLst>
+              <a:ext uri="{FF2B5EF4-FFF2-40B4-BE49-F238E27FC236}">
+                <a16:creationId xmlns:a16="http://schemas.microsoft.com/office/drawing/2014/main" id="{48B828A6-A73B-4DEA-BD33-B6CEB6EA43D6}"/>
+              </a:ext>
+            </a:extLst>
+          </p:cNvPr>
+          <p:cNvSpPr>
+            <a:spLocks noGrp="1"/>
+          </p:cNvSpPr>
+          <p:nvPr>
+            <p:ph type="title"/>
+          </p:nvPr>
+        </p:nvSpPr>
+        <p:spPr/>
+        <p:txBody>
+          <a:bodyPr/>
+          <a:lstStyle/>
+          <a:p>
+            <a:r>
+              <a:rPr lang="en-US" dirty="0"/>
+              <a:t>Relationship Between IBU and ABV</a:t>
+            </a:r>
+          </a:p>
+        </p:txBody>
+      </p:sp>
+      <p:pic>
+        <p:nvPicPr>
+          <p:cNvPr id="5" name="Picture 2">
+            <a:extLst>
+              <a:ext uri="{FF2B5EF4-FFF2-40B4-BE49-F238E27FC236}">
+                <a16:creationId xmlns:a16="http://schemas.microsoft.com/office/drawing/2014/main" id="{0D3A44EB-288C-4A2A-A28F-B9140C199932}"/>
+              </a:ext>
+            </a:extLst>
+          </p:cNvPr>
+          <p:cNvPicPr>
+            <a:picLocks noChangeAspect="1" noChangeArrowheads="1"/>
+          </p:cNvPicPr>
+          <p:nvPr/>
+        </p:nvPicPr>
+        <p:blipFill>
+          <a:blip r:embed="rId3" cstate="print">
+            <a:extLst>
+              <a:ext uri="{28A0092B-C50C-407E-A947-70E740481C1C}">
+                <a14:useLocalDpi xmlns:a14="http://schemas.microsoft.com/office/drawing/2010/main" val="0"/>
+              </a:ext>
+            </a:extLst>
+          </a:blip>
+          <a:srcRect/>
+          <a:stretch>
+            <a:fillRect/>
+          </a:stretch>
+        </p:blipFill>
+        <p:spPr bwMode="auto">
+          <a:xfrm>
+            <a:off x="76200" y="1063228"/>
+            <a:ext cx="3200400" cy="3200400"/>
+          </a:xfrm>
+          <a:prstGeom prst="rect">
+            <a:avLst/>
+          </a:prstGeom>
+          <a:noFill/>
+          <a:extLst>
+            <a:ext uri="{909E8E84-426E-40DD-AFC4-6F175D3DCCD1}">
+              <a14:hiddenFill xmlns:a14="http://schemas.microsoft.com/office/drawing/2010/main">
+                <a:solidFill>
+                  <a:srgbClr val="FFFFFF"/>
+                </a:solidFill>
+              </a14:hiddenFill>
+            </a:ext>
+          </a:extLst>
+        </p:spPr>
+      </p:pic>
+      <p:pic>
+        <p:nvPicPr>
+          <p:cNvPr id="6" name="Picture 4">
+            <a:extLst>
+              <a:ext uri="{FF2B5EF4-FFF2-40B4-BE49-F238E27FC236}">
+                <a16:creationId xmlns:a16="http://schemas.microsoft.com/office/drawing/2014/main" id="{63713F0D-C928-47F7-AF3B-9421268BEFA4}"/>
+              </a:ext>
+            </a:extLst>
+          </p:cNvPr>
+          <p:cNvPicPr>
+            <a:picLocks noChangeAspect="1" noChangeArrowheads="1"/>
+          </p:cNvPicPr>
+          <p:nvPr/>
+        </p:nvPicPr>
+        <p:blipFill>
+          <a:blip r:embed="rId4" cstate="print">
+            <a:extLst>
+              <a:ext uri="{28A0092B-C50C-407E-A947-70E740481C1C}">
+                <a14:useLocalDpi xmlns:a14="http://schemas.microsoft.com/office/drawing/2010/main" val="0"/>
+              </a:ext>
+            </a:extLst>
+          </a:blip>
+          <a:srcRect/>
+          <a:stretch>
+            <a:fillRect/>
+          </a:stretch>
+        </p:blipFill>
+        <p:spPr bwMode="auto">
+          <a:xfrm>
+            <a:off x="5839265" y="1063228"/>
+            <a:ext cx="3200400" cy="3200400"/>
+          </a:xfrm>
+          <a:prstGeom prst="rect">
+            <a:avLst/>
+          </a:prstGeom>
+          <a:noFill/>
+          <a:extLst>
+            <a:ext uri="{909E8E84-426E-40DD-AFC4-6F175D3DCCD1}">
+              <a14:hiddenFill xmlns:a14="http://schemas.microsoft.com/office/drawing/2010/main">
+                <a:solidFill>
+                  <a:srgbClr val="FFFFFF"/>
+                </a:solidFill>
+              </a14:hiddenFill>
+            </a:ext>
+          </a:extLst>
+        </p:spPr>
+      </p:pic>
+      <p:sp>
+        <p:nvSpPr>
+          <p:cNvPr id="3" name="TextBox 2">
+            <a:extLst>
+              <a:ext uri="{FF2B5EF4-FFF2-40B4-BE49-F238E27FC236}">
+                <a16:creationId xmlns:a16="http://schemas.microsoft.com/office/drawing/2014/main" id="{B931521C-8D09-4634-A177-CE683FD68DFA}"/>
+              </a:ext>
+            </a:extLst>
+          </p:cNvPr>
+          <p:cNvSpPr txBox="1"/>
+          <p:nvPr/>
+        </p:nvSpPr>
+        <p:spPr>
+          <a:xfrm>
+            <a:off x="3276600" y="1068348"/>
+            <a:ext cx="2362200" cy="1107996"/>
+          </a:xfrm>
+          <a:prstGeom prst="rect">
+            <a:avLst/>
+          </a:prstGeom>
+          <a:noFill/>
+        </p:spPr>
+        <p:txBody>
+          <a:bodyPr wrap="square" rtlCol="0">
+            <a:spAutoFit/>
+          </a:bodyPr>
+          <a:lstStyle/>
+          <a:p>
+            <a:pPr marL="285750" indent="-285750">
+              <a:buFont typeface="Arial" panose="020B0604020202020204" pitchFamily="34" charset="0"/>
+              <a:buChar char="•"/>
+            </a:pPr>
+            <a:r>
+              <a:rPr lang="en-US" sz="1200" dirty="0"/>
+              <a:t>Bitterness generally rises with alcohol content, however they are not clearly dependent on one another</a:t>
+            </a:r>
+          </a:p>
+          <a:p>
+            <a:pPr marL="285750" indent="-285750">
+              <a:buFont typeface="Arial" panose="020B0604020202020204" pitchFamily="34" charset="0"/>
+              <a:buChar char="•"/>
+            </a:pPr>
+            <a:endParaRPr lang="en-US" dirty="0"/>
+          </a:p>
+        </p:txBody>
+      </p:sp>
+    </p:spTree>
+    <p:extLst>
+      <p:ext uri="{BB962C8B-B14F-4D97-AF65-F5344CB8AC3E}">
+        <p14:creationId xmlns:p14="http://schemas.microsoft.com/office/powerpoint/2010/main" val="4003640020"/>
+      </p:ext>
+    </p:extLst>
+  </p:cSld>
+  <p:clrMapOvr>
+    <a:masterClrMapping/>
+  </p:clrMapOvr>
+</p:sld>
+</file>
+
+<file path=ppt/slides/slide11.xml><?xml version="1.0" encoding="utf-8"?>
+<p:sld xmlns:a="http://schemas.openxmlformats.org/drawingml/2006/main" xmlns:r="http://schemas.openxmlformats.org/officeDocument/2006/relationships" xmlns:p="http://schemas.openxmlformats.org/presentationml/2006/main">
+  <p:cSld>
+    <p:spTree>
+      <p:nvGrpSpPr>
+        <p:cNvPr id="1" name=""/>
+        <p:cNvGrpSpPr/>
+        <p:nvPr/>
+      </p:nvGrpSpPr>
+      <p:grpSpPr>
+        <a:xfrm>
+          <a:off x="0" y="0"/>
+          <a:ext cx="0" cy="0"/>
+          <a:chOff x="0" y="0"/>
+          <a:chExt cx="0" cy="0"/>
+        </a:xfrm>
+      </p:grpSpPr>
+      <p:sp>
+        <p:nvSpPr>
           <p:cNvPr id="4" name="Title 3">
             <a:extLst>
               <a:ext uri="{FF2B5EF4-FFF2-40B4-BE49-F238E27FC236}">
@@ -20440,7 +20901,7 @@
             </a:pPr>
             <a:r>
               <a:rPr lang="en-US" dirty="0"/>
-              <a:t>Brewery summary</a:t>
+              <a:t>Brewery and beer summary</a:t>
             </a:r>
           </a:p>
           <a:p>
@@ -20586,7 +21047,7 @@
         </p:nvSpPr>
         <p:spPr>
           <a:xfrm>
-            <a:off x="4038600" y="1132046"/>
+            <a:off x="4343400" y="1569978"/>
             <a:ext cx="3886200" cy="2003544"/>
           </a:xfrm>
         </p:spPr>
@@ -20732,6 +21193,106 @@
           </a:p>
         </p:txBody>
       </p:sp>
+    </p:spTree>
+    <p:extLst>
+      <p:ext uri="{BB962C8B-B14F-4D97-AF65-F5344CB8AC3E}">
+        <p14:creationId xmlns:p14="http://schemas.microsoft.com/office/powerpoint/2010/main" val="832593484"/>
+      </p:ext>
+    </p:extLst>
+  </p:cSld>
+  <p:clrMapOvr>
+    <a:masterClrMapping/>
+  </p:clrMapOvr>
+</p:sld>
+</file>
+
+<file path=ppt/slides/slide4.xml><?xml version="1.0" encoding="utf-8"?>
+<p:sld xmlns:a="http://schemas.openxmlformats.org/drawingml/2006/main" xmlns:r="http://schemas.openxmlformats.org/officeDocument/2006/relationships" xmlns:p="http://schemas.openxmlformats.org/presentationml/2006/main">
+  <p:cSld>
+    <p:spTree>
+      <p:nvGrpSpPr>
+        <p:cNvPr id="1" name=""/>
+        <p:cNvGrpSpPr/>
+        <p:nvPr/>
+      </p:nvGrpSpPr>
+      <p:grpSpPr>
+        <a:xfrm>
+          <a:off x="0" y="0"/>
+          <a:ext cx="0" cy="0"/>
+          <a:chOff x="0" y="0"/>
+          <a:chExt cx="0" cy="0"/>
+        </a:xfrm>
+      </p:grpSpPr>
+      <p:sp>
+        <p:nvSpPr>
+          <p:cNvPr id="2" name="Title 1">
+            <a:extLst>
+              <a:ext uri="{FF2B5EF4-FFF2-40B4-BE49-F238E27FC236}">
+                <a16:creationId xmlns:a16="http://schemas.microsoft.com/office/drawing/2014/main" id="{006E9E57-AA0B-4A73-96A9-2A10F0C4C9C2}"/>
+              </a:ext>
+            </a:extLst>
+          </p:cNvPr>
+          <p:cNvSpPr>
+            <a:spLocks noGrp="1"/>
+          </p:cNvSpPr>
+          <p:nvPr>
+            <p:ph type="title"/>
+          </p:nvPr>
+        </p:nvSpPr>
+        <p:spPr>
+          <a:xfrm>
+            <a:off x="1066800" y="235430"/>
+            <a:ext cx="6829002" cy="857250"/>
+          </a:xfrm>
+        </p:spPr>
+        <p:txBody>
+          <a:bodyPr/>
+          <a:lstStyle/>
+          <a:p>
+            <a:r>
+              <a:rPr lang="en-US" dirty="0"/>
+              <a:t>Sanitizing Data</a:t>
+            </a:r>
+          </a:p>
+        </p:txBody>
+      </p:sp>
+      <p:sp>
+        <p:nvSpPr>
+          <p:cNvPr id="7" name="TextBox 6">
+            <a:extLst>
+              <a:ext uri="{FF2B5EF4-FFF2-40B4-BE49-F238E27FC236}">
+                <a16:creationId xmlns:a16="http://schemas.microsoft.com/office/drawing/2014/main" id="{AF4AE53E-754B-4B0C-BE55-1F3777C60B36}"/>
+              </a:ext>
+            </a:extLst>
+          </p:cNvPr>
+          <p:cNvSpPr txBox="1"/>
+          <p:nvPr/>
+        </p:nvSpPr>
+        <p:spPr>
+          <a:xfrm>
+            <a:off x="8229600" y="4752856"/>
+            <a:ext cx="914400" cy="369332"/>
+          </a:xfrm>
+          <a:prstGeom prst="rect">
+            <a:avLst/>
+          </a:prstGeom>
+          <a:solidFill>
+            <a:schemeClr val="bg1"/>
+          </a:solidFill>
+        </p:spPr>
+        <p:txBody>
+          <a:bodyPr wrap="square" rtlCol="0">
+            <a:spAutoFit/>
+          </a:bodyPr>
+          <a:lstStyle/>
+          <a:p>
+            <a:r>
+              <a:rPr lang="en-US" dirty="0"/>
+              <a:t> </a:t>
+            </a:r>
+          </a:p>
+        </p:txBody>
+      </p:sp>
       <p:pic>
         <p:nvPicPr>
           <p:cNvPr id="10" name="Picture 9">
@@ -20754,7 +21315,7 @@
         </p:blipFill>
         <p:spPr>
           <a:xfrm>
-            <a:off x="4038600" y="3536645"/>
+            <a:off x="1600200" y="1428750"/>
             <a:ext cx="3108960" cy="1596973"/>
           </a:xfrm>
           <a:prstGeom prst="rect">
@@ -20764,70 +21325,215 @@
       </p:pic>
       <p:sp>
         <p:nvSpPr>
-          <p:cNvPr id="11" name="Rectangle 10">
+          <p:cNvPr id="9" name="Text Placeholder 3">
             <a:extLst>
               <a:ext uri="{FF2B5EF4-FFF2-40B4-BE49-F238E27FC236}">
-                <a16:creationId xmlns:a16="http://schemas.microsoft.com/office/drawing/2014/main" id="{A2387AF3-1DA3-4623-8B20-25111713E76F}"/>
+                <a16:creationId xmlns:a16="http://schemas.microsoft.com/office/drawing/2014/main" id="{05646316-BE79-49C8-A6AC-F807345DB376}"/>
               </a:ext>
             </a:extLst>
           </p:cNvPr>
-          <p:cNvSpPr/>
+          <p:cNvSpPr txBox="1">
+            <a:spLocks/>
+          </p:cNvSpPr>
           <p:nvPr/>
         </p:nvSpPr>
         <p:spPr>
           <a:xfrm>
-            <a:off x="7086600" y="3502355"/>
-            <a:ext cx="1981200" cy="1077218"/>
+            <a:off x="4876800" y="1428750"/>
+            <a:ext cx="4114800" cy="2003544"/>
           </a:xfrm>
           <a:prstGeom prst="rect">
             <a:avLst/>
           </a:prstGeom>
         </p:spPr>
         <p:txBody>
-          <a:bodyPr wrap="square">
-            <a:spAutoFit/>
-          </a:bodyPr>
-          <a:lstStyle/>
+          <a:bodyPr/>
+          <a:lstStyle>
+            <a:lvl1pPr marL="342900" indent="-342900" algn="l" defTabSz="914400" rtl="0" eaLnBrk="1" latinLnBrk="0" hangingPunct="1">
+              <a:spcBef>
+                <a:spcPct val="20000"/>
+              </a:spcBef>
+              <a:buFont typeface="Arial" panose="020B0604020202020204" pitchFamily="34" charset="0"/>
+              <a:buChar char="•"/>
+              <a:defRPr sz="3200" kern="1200">
+                <a:solidFill>
+                  <a:schemeClr val="tx1"/>
+                </a:solidFill>
+                <a:latin typeface="+mn-lt"/>
+                <a:ea typeface="+mn-ea"/>
+                <a:cs typeface="+mn-cs"/>
+              </a:defRPr>
+            </a:lvl1pPr>
+            <a:lvl2pPr marL="742950" indent="-285750" algn="l" defTabSz="914400" rtl="0" eaLnBrk="1" latinLnBrk="0" hangingPunct="1">
+              <a:spcBef>
+                <a:spcPct val="20000"/>
+              </a:spcBef>
+              <a:buFont typeface="Arial" panose="020B0604020202020204" pitchFamily="34" charset="0"/>
+              <a:buChar char="–"/>
+              <a:defRPr sz="2800" kern="1200">
+                <a:solidFill>
+                  <a:schemeClr val="tx1"/>
+                </a:solidFill>
+                <a:latin typeface="+mn-lt"/>
+                <a:ea typeface="+mn-ea"/>
+                <a:cs typeface="+mn-cs"/>
+              </a:defRPr>
+            </a:lvl2pPr>
+            <a:lvl3pPr marL="1143000" indent="-228600" algn="l" defTabSz="914400" rtl="0" eaLnBrk="1" latinLnBrk="0" hangingPunct="1">
+              <a:spcBef>
+                <a:spcPct val="20000"/>
+              </a:spcBef>
+              <a:buFont typeface="Arial" panose="020B0604020202020204" pitchFamily="34" charset="0"/>
+              <a:buChar char="•"/>
+              <a:defRPr sz="2400" kern="1200">
+                <a:solidFill>
+                  <a:schemeClr val="tx1"/>
+                </a:solidFill>
+                <a:latin typeface="+mn-lt"/>
+                <a:ea typeface="+mn-ea"/>
+                <a:cs typeface="+mn-cs"/>
+              </a:defRPr>
+            </a:lvl3pPr>
+            <a:lvl4pPr marL="1600200" indent="-228600" algn="l" defTabSz="914400" rtl="0" eaLnBrk="1" latinLnBrk="0" hangingPunct="1">
+              <a:spcBef>
+                <a:spcPct val="20000"/>
+              </a:spcBef>
+              <a:buFont typeface="Arial" panose="020B0604020202020204" pitchFamily="34" charset="0"/>
+              <a:buChar char="–"/>
+              <a:defRPr sz="2000" kern="1200">
+                <a:solidFill>
+                  <a:schemeClr val="tx1"/>
+                </a:solidFill>
+                <a:latin typeface="+mn-lt"/>
+                <a:ea typeface="+mn-ea"/>
+                <a:cs typeface="+mn-cs"/>
+              </a:defRPr>
+            </a:lvl4pPr>
+            <a:lvl5pPr marL="2057400" indent="-228600" algn="l" defTabSz="914400" rtl="0" eaLnBrk="1" latinLnBrk="0" hangingPunct="1">
+              <a:spcBef>
+                <a:spcPct val="20000"/>
+              </a:spcBef>
+              <a:buFont typeface="Arial" panose="020B0604020202020204" pitchFamily="34" charset="0"/>
+              <a:buChar char="»"/>
+              <a:defRPr sz="2000" kern="1200">
+                <a:solidFill>
+                  <a:schemeClr val="tx1"/>
+                </a:solidFill>
+                <a:latin typeface="+mn-lt"/>
+                <a:ea typeface="+mn-ea"/>
+                <a:cs typeface="+mn-cs"/>
+              </a:defRPr>
+            </a:lvl5pPr>
+            <a:lvl6pPr marL="2514600" indent="-228600" algn="l" defTabSz="914400" rtl="0" eaLnBrk="1" latinLnBrk="0" hangingPunct="1">
+              <a:spcBef>
+                <a:spcPct val="20000"/>
+              </a:spcBef>
+              <a:buFont typeface="Arial" panose="020B0604020202020204" pitchFamily="34" charset="0"/>
+              <a:buChar char="•"/>
+              <a:defRPr sz="2000" kern="1200">
+                <a:solidFill>
+                  <a:schemeClr val="tx1"/>
+                </a:solidFill>
+                <a:latin typeface="+mn-lt"/>
+                <a:ea typeface="+mn-ea"/>
+                <a:cs typeface="+mn-cs"/>
+              </a:defRPr>
+            </a:lvl6pPr>
+            <a:lvl7pPr marL="2971800" indent="-228600" algn="l" defTabSz="914400" rtl="0" eaLnBrk="1" latinLnBrk="0" hangingPunct="1">
+              <a:spcBef>
+                <a:spcPct val="20000"/>
+              </a:spcBef>
+              <a:buFont typeface="Arial" panose="020B0604020202020204" pitchFamily="34" charset="0"/>
+              <a:buChar char="•"/>
+              <a:defRPr sz="2000" kern="1200">
+                <a:solidFill>
+                  <a:schemeClr val="tx1"/>
+                </a:solidFill>
+                <a:latin typeface="+mn-lt"/>
+                <a:ea typeface="+mn-ea"/>
+                <a:cs typeface="+mn-cs"/>
+              </a:defRPr>
+            </a:lvl7pPr>
+            <a:lvl8pPr marL="3429000" indent="-228600" algn="l" defTabSz="914400" rtl="0" eaLnBrk="1" latinLnBrk="0" hangingPunct="1">
+              <a:spcBef>
+                <a:spcPct val="20000"/>
+              </a:spcBef>
+              <a:buFont typeface="Arial" panose="020B0604020202020204" pitchFamily="34" charset="0"/>
+              <a:buChar char="•"/>
+              <a:defRPr sz="2000" kern="1200">
+                <a:solidFill>
+                  <a:schemeClr val="tx1"/>
+                </a:solidFill>
+                <a:latin typeface="+mn-lt"/>
+                <a:ea typeface="+mn-ea"/>
+                <a:cs typeface="+mn-cs"/>
+              </a:defRPr>
+            </a:lvl8pPr>
+            <a:lvl9pPr marL="3886200" indent="-228600" algn="l" defTabSz="914400" rtl="0" eaLnBrk="1" latinLnBrk="0" hangingPunct="1">
+              <a:spcBef>
+                <a:spcPct val="20000"/>
+              </a:spcBef>
+              <a:buFont typeface="Arial" panose="020B0604020202020204" pitchFamily="34" charset="0"/>
+              <a:buChar char="•"/>
+              <a:defRPr sz="2000" kern="1200">
+                <a:solidFill>
+                  <a:schemeClr val="tx1"/>
+                </a:solidFill>
+                <a:latin typeface="+mn-lt"/>
+                <a:ea typeface="+mn-ea"/>
+                <a:cs typeface="+mn-cs"/>
+              </a:defRPr>
+            </a:lvl9pPr>
+          </a:lstStyle>
           <a:p>
-            <a:pPr marL="160020"/>
+            <a:pPr indent="-182880"/>
             <a:r>
-              <a:rPr lang="en-US" sz="1200" b="1" dirty="0"/>
-              <a:t>Data Decisions</a:t>
+              <a:rPr lang="en-US" sz="1200" dirty="0"/>
+              <a:t>62 (2.57%) observations both ABV and IBU were empty</a:t>
             </a:r>
           </a:p>
           <a:p>
-            <a:pPr marL="274320" indent="-182880">
-              <a:buFont typeface="Arial" panose="020B0604020202020204" pitchFamily="34" charset="0"/>
-              <a:buChar char="•"/>
-            </a:pPr>
+            <a:pPr indent="-182880"/>
             <a:r>
               <a:rPr lang="en-US" sz="1200" dirty="0"/>
-              <a:t>Excluded all beers with no ABV</a:t>
+              <a:t>943 (41.7%) observations only IBU is empty</a:t>
             </a:r>
           </a:p>
           <a:p>
-            <a:pPr marL="274320" indent="-182880">
-              <a:buFont typeface="Arial" panose="020B0604020202020204" pitchFamily="34" charset="0"/>
-              <a:buChar char="•"/>
-            </a:pPr>
+            <a:pPr indent="-182880"/>
+            <a:r>
+              <a:rPr lang="en-US" sz="1200" b="1"/>
+              <a:t>Factoid</a:t>
+            </a:r>
+            <a:r>
+              <a:rPr lang="en-US" sz="1200"/>
+              <a:t>: </a:t>
+            </a:r>
             <a:r>
               <a:rPr lang="en-US" sz="1200" dirty="0"/>
-              <a:t>Included beers with no IBU</a:t>
+              <a:t>Budweiser Prohibition Brew is the only non-alcoholic beer, and which is not part of the dataset</a:t>
             </a:r>
           </a:p>
           <a:p>
-            <a:pPr indent="-194310">
-              <a:buFont typeface="Arial" panose="020B0604020202020204" pitchFamily="34" charset="0"/>
-              <a:buChar char="•"/>
-            </a:pPr>
-            <a:endParaRPr lang="en-US" sz="400" dirty="0"/>
+            <a:pPr indent="-182880"/>
+            <a:r>
+              <a:rPr lang="en-US" sz="1200" dirty="0"/>
+              <a:t>We made some realistic assumption that, a beer can exist without bitterness but probably not without alcohol. </a:t>
+            </a:r>
+          </a:p>
+          <a:p>
+            <a:pPr indent="-182880"/>
+            <a:r>
+              <a:rPr lang="en-US" sz="1200" dirty="0"/>
+              <a:t>We excluded all the ABV observations with NA’s and replace IBU NA’s with zero’s</a:t>
+            </a:r>
           </a:p>
         </p:txBody>
       </p:sp>
     </p:spTree>
     <p:extLst>
       <p:ext uri="{BB962C8B-B14F-4D97-AF65-F5344CB8AC3E}">
-        <p14:creationId xmlns:p14="http://schemas.microsoft.com/office/powerpoint/2010/main" val="832593484"/>
+        <p14:creationId xmlns:p14="http://schemas.microsoft.com/office/powerpoint/2010/main" val="1420569290"/>
       </p:ext>
     </p:extLst>
   </p:cSld>
@@ -20837,7 +21543,7 @@
 </p:sld>
 </file>
 
-<file path=ppt/slides/slide4.xml><?xml version="1.0" encoding="utf-8"?>
+<file path=ppt/slides/slide5.xml><?xml version="1.0" encoding="utf-8"?>
 <p:sld xmlns:a="http://schemas.openxmlformats.org/drawingml/2006/main" xmlns:r="http://schemas.openxmlformats.org/officeDocument/2006/relationships" xmlns:p="http://schemas.openxmlformats.org/presentationml/2006/main">
   <p:cSld>
     <p:spTree>
@@ -21069,7 +21775,7 @@
         </p:nvGrpSpPr>
         <p:grpSpPr>
           <a:xfrm>
-            <a:off x="1247422" y="3028950"/>
+            <a:off x="1183376" y="2874588"/>
             <a:ext cx="688948" cy="455472"/>
             <a:chOff x="2377815" y="3751637"/>
             <a:chExt cx="956872" cy="632599"/>
@@ -21909,6 +22615,85 @@
           </a:prstGeom>
         </p:spPr>
       </p:pic>
+      <p:sp>
+        <p:nvSpPr>
+          <p:cNvPr id="33" name="TextBox 32">
+            <a:extLst>
+              <a:ext uri="{FF2B5EF4-FFF2-40B4-BE49-F238E27FC236}">
+                <a16:creationId xmlns:a16="http://schemas.microsoft.com/office/drawing/2014/main" id="{3B5514CC-B342-484B-B4C3-307C7ED89E56}"/>
+              </a:ext>
+            </a:extLst>
+          </p:cNvPr>
+          <p:cNvSpPr txBox="1"/>
+          <p:nvPr/>
+        </p:nvSpPr>
+        <p:spPr>
+          <a:xfrm>
+            <a:off x="3362934" y="2204190"/>
+            <a:ext cx="457200" cy="1005840"/>
+          </a:xfrm>
+          <a:prstGeom prst="rect">
+            <a:avLst/>
+          </a:prstGeom>
+          <a:noFill/>
+          <a:ln w="19050">
+            <a:solidFill>
+              <a:srgbClr val="00B050"/>
+            </a:solidFill>
+          </a:ln>
+        </p:spPr>
+        <p:txBody>
+          <a:bodyPr wrap="square" rtlCol="0">
+            <a:spAutoFit/>
+          </a:bodyPr>
+          <a:lstStyle/>
+          <a:p>
+            <a:r>
+              <a:rPr lang="en-US" dirty="0"/>
+              <a:t> </a:t>
+            </a:r>
+          </a:p>
+        </p:txBody>
+      </p:sp>
+      <p:sp>
+        <p:nvSpPr>
+          <p:cNvPr id="34" name="TextBox 33">
+            <a:extLst>
+              <a:ext uri="{FF2B5EF4-FFF2-40B4-BE49-F238E27FC236}">
+                <a16:creationId xmlns:a16="http://schemas.microsoft.com/office/drawing/2014/main" id="{0627BCC2-5CCE-4713-83E3-2B9538750BC3}"/>
+              </a:ext>
+            </a:extLst>
+          </p:cNvPr>
+          <p:cNvSpPr txBox="1"/>
+          <p:nvPr/>
+        </p:nvSpPr>
+        <p:spPr>
+          <a:xfrm>
+            <a:off x="3131197" y="1988477"/>
+            <a:ext cx="258190" cy="369332"/>
+          </a:xfrm>
+          <a:prstGeom prst="rect">
+            <a:avLst/>
+          </a:prstGeom>
+          <a:noFill/>
+        </p:spPr>
+        <p:txBody>
+          <a:bodyPr wrap="square" rtlCol="0">
+            <a:spAutoFit/>
+          </a:bodyPr>
+          <a:lstStyle/>
+          <a:p>
+            <a:r>
+              <a:rPr lang="en-US" dirty="0">
+                <a:solidFill>
+                  <a:srgbClr val="00B050"/>
+                </a:solidFill>
+              </a:rPr>
+              <a:t>4</a:t>
+            </a:r>
+          </a:p>
+        </p:txBody>
+      </p:sp>
     </p:spTree>
     <p:extLst>
       <p:ext uri="{BB962C8B-B14F-4D97-AF65-F5344CB8AC3E}">
@@ -21922,7 +22707,7 @@
 </p:sld>
 </file>
 
-<file path=ppt/slides/slide5.xml><?xml version="1.0" encoding="utf-8"?>
+<file path=ppt/slides/slide6.xml><?xml version="1.0" encoding="utf-8"?>
 <p:sld xmlns:a="http://schemas.openxmlformats.org/drawingml/2006/main" xmlns:r="http://schemas.openxmlformats.org/officeDocument/2006/relationships" xmlns:p="http://schemas.openxmlformats.org/presentationml/2006/main">
   <p:cSld>
     <p:spTree>
@@ -22115,7 +22900,7 @@
             </a:pPr>
             <a:r>
               <a:rPr lang="en-US" dirty="0"/>
-              <a:t>ABU median range is 6.7% (NV) to 5.19% (UT)</a:t>
+              <a:t>ABV median range is 6.7% (NV) to 5.19% (UT)</a:t>
             </a:r>
           </a:p>
         </p:txBody>
@@ -22253,7 +23038,7 @@
 </p:sld>
 </file>
 
-<file path=ppt/slides/slide6.xml><?xml version="1.0" encoding="utf-8"?>
+<file path=ppt/slides/slide7.xml><?xml version="1.0" encoding="utf-8"?>
 <p:sld xmlns:a="http://schemas.openxmlformats.org/drawingml/2006/main" xmlns:r="http://schemas.openxmlformats.org/officeDocument/2006/relationships" xmlns:p="http://schemas.openxmlformats.org/presentationml/2006/main">
   <p:cSld>
     <p:spTree>
@@ -22446,7 +23231,7 @@
             </a:pPr>
             <a:r>
               <a:rPr lang="en-US" sz="1200" dirty="0"/>
-              <a:t>Dogs Day Summer Ale (PA – 28) ha the lowest non-zero IBU</a:t>
+              <a:t>Dogs Day Summer Ale (PA – 28) has the lowest non-zero IBU</a:t>
             </a:r>
           </a:p>
           <a:p>
@@ -22484,7 +23269,7 @@
 </p:sld>
 </file>
 
-<file path=ppt/slides/slide7.xml><?xml version="1.0" encoding="utf-8"?>
+<file path=ppt/slides/slide8.xml><?xml version="1.0" encoding="utf-8"?>
 <p:sld xmlns:a="http://schemas.openxmlformats.org/drawingml/2006/main" xmlns:r="http://schemas.openxmlformats.org/officeDocument/2006/relationships" xmlns:p="http://schemas.openxmlformats.org/presentationml/2006/main">
   <p:cSld>
     <p:spTree>
@@ -22591,7 +23376,7 @@
             </a:pPr>
             <a:r>
               <a:rPr lang="en-US" sz="1200" dirty="0" err="1"/>
-              <a:t>Delewar</a:t>
+              <a:t>Deleware</a:t>
             </a:r>
             <a:r>
               <a:rPr lang="en-US" sz="1200" dirty="0"/>
@@ -22717,7 +23502,7 @@
 </p:sld>
 </file>
 
-<file path=ppt/slides/slide8.xml><?xml version="1.0" encoding="utf-8"?>
+<file path=ppt/slides/slide9.xml><?xml version="1.0" encoding="utf-8"?>
 <p:sld xmlns:a="http://schemas.openxmlformats.org/drawingml/2006/main" xmlns:r="http://schemas.openxmlformats.org/officeDocument/2006/relationships" xmlns:p="http://schemas.openxmlformats.org/presentationml/2006/main">
   <p:cSld>
     <p:spTree>
@@ -22966,204 +23751,6 @@
     <p:extLst>
       <p:ext uri="{BB962C8B-B14F-4D97-AF65-F5344CB8AC3E}">
         <p14:creationId xmlns:p14="http://schemas.microsoft.com/office/powerpoint/2010/main" val="1387322310"/>
-      </p:ext>
-    </p:extLst>
-  </p:cSld>
-  <p:clrMapOvr>
-    <a:masterClrMapping/>
-  </p:clrMapOvr>
-</p:sld>
-</file>
-
-<file path=ppt/slides/slide9.xml><?xml version="1.0" encoding="utf-8"?>
-<p:sld xmlns:a="http://schemas.openxmlformats.org/drawingml/2006/main" xmlns:r="http://schemas.openxmlformats.org/officeDocument/2006/relationships" xmlns:p="http://schemas.openxmlformats.org/presentationml/2006/main">
-  <p:cSld>
-    <p:spTree>
-      <p:nvGrpSpPr>
-        <p:cNvPr id="1" name=""/>
-        <p:cNvGrpSpPr/>
-        <p:nvPr/>
-      </p:nvGrpSpPr>
-      <p:grpSpPr>
-        <a:xfrm>
-          <a:off x="0" y="0"/>
-          <a:ext cx="0" cy="0"/>
-          <a:chOff x="0" y="0"/>
-          <a:chExt cx="0" cy="0"/>
-        </a:xfrm>
-      </p:grpSpPr>
-      <p:sp>
-        <p:nvSpPr>
-          <p:cNvPr id="2" name="Title 1">
-            <a:extLst>
-              <a:ext uri="{FF2B5EF4-FFF2-40B4-BE49-F238E27FC236}">
-                <a16:creationId xmlns:a16="http://schemas.microsoft.com/office/drawing/2014/main" id="{48B828A6-A73B-4DEA-BD33-B6CEB6EA43D6}"/>
-              </a:ext>
-            </a:extLst>
-          </p:cNvPr>
-          <p:cNvSpPr>
-            <a:spLocks noGrp="1"/>
-          </p:cNvSpPr>
-          <p:nvPr>
-            <p:ph type="title"/>
-          </p:nvPr>
-        </p:nvSpPr>
-        <p:spPr/>
-        <p:txBody>
-          <a:bodyPr/>
-          <a:lstStyle/>
-          <a:p>
-            <a:r>
-              <a:rPr lang="en-US" dirty="0"/>
-              <a:t>Relationship Between IBU and ABV</a:t>
-            </a:r>
-          </a:p>
-        </p:txBody>
-      </p:sp>
-      <p:pic>
-        <p:nvPicPr>
-          <p:cNvPr id="5" name="Picture 2">
-            <a:extLst>
-              <a:ext uri="{FF2B5EF4-FFF2-40B4-BE49-F238E27FC236}">
-                <a16:creationId xmlns:a16="http://schemas.microsoft.com/office/drawing/2014/main" id="{0D3A44EB-288C-4A2A-A28F-B9140C199932}"/>
-              </a:ext>
-            </a:extLst>
-          </p:cNvPr>
-          <p:cNvPicPr>
-            <a:picLocks noChangeAspect="1" noChangeArrowheads="1"/>
-          </p:cNvPicPr>
-          <p:nvPr/>
-        </p:nvPicPr>
-        <p:blipFill>
-          <a:blip r:embed="rId3" cstate="print">
-            <a:extLst>
-              <a:ext uri="{28A0092B-C50C-407E-A947-70E740481C1C}">
-                <a14:useLocalDpi xmlns:a14="http://schemas.microsoft.com/office/drawing/2010/main" val="0"/>
-              </a:ext>
-            </a:extLst>
-          </a:blip>
-          <a:srcRect/>
-          <a:stretch>
-            <a:fillRect/>
-          </a:stretch>
-        </p:blipFill>
-        <p:spPr bwMode="auto">
-          <a:xfrm>
-            <a:off x="76200" y="1063228"/>
-            <a:ext cx="3200400" cy="3200400"/>
-          </a:xfrm>
-          <a:prstGeom prst="rect">
-            <a:avLst/>
-          </a:prstGeom>
-          <a:noFill/>
-          <a:extLst>
-            <a:ext uri="{909E8E84-426E-40DD-AFC4-6F175D3DCCD1}">
-              <a14:hiddenFill xmlns:a14="http://schemas.microsoft.com/office/drawing/2010/main">
-                <a:solidFill>
-                  <a:srgbClr val="FFFFFF"/>
-                </a:solidFill>
-              </a14:hiddenFill>
-            </a:ext>
-          </a:extLst>
-        </p:spPr>
-      </p:pic>
-      <p:pic>
-        <p:nvPicPr>
-          <p:cNvPr id="6" name="Picture 4">
-            <a:extLst>
-              <a:ext uri="{FF2B5EF4-FFF2-40B4-BE49-F238E27FC236}">
-                <a16:creationId xmlns:a16="http://schemas.microsoft.com/office/drawing/2014/main" id="{63713F0D-C928-47F7-AF3B-9421268BEFA4}"/>
-              </a:ext>
-            </a:extLst>
-          </p:cNvPr>
-          <p:cNvPicPr>
-            <a:picLocks noChangeAspect="1" noChangeArrowheads="1"/>
-          </p:cNvPicPr>
-          <p:nvPr/>
-        </p:nvPicPr>
-        <p:blipFill>
-          <a:blip r:embed="rId4" cstate="print">
-            <a:extLst>
-              <a:ext uri="{28A0092B-C50C-407E-A947-70E740481C1C}">
-                <a14:useLocalDpi xmlns:a14="http://schemas.microsoft.com/office/drawing/2010/main" val="0"/>
-              </a:ext>
-            </a:extLst>
-          </a:blip>
-          <a:srcRect/>
-          <a:stretch>
-            <a:fillRect/>
-          </a:stretch>
-        </p:blipFill>
-        <p:spPr bwMode="auto">
-          <a:xfrm>
-            <a:off x="5839265" y="1063228"/>
-            <a:ext cx="3200400" cy="3200400"/>
-          </a:xfrm>
-          <a:prstGeom prst="rect">
-            <a:avLst/>
-          </a:prstGeom>
-          <a:noFill/>
-          <a:extLst>
-            <a:ext uri="{909E8E84-426E-40DD-AFC4-6F175D3DCCD1}">
-              <a14:hiddenFill xmlns:a14="http://schemas.microsoft.com/office/drawing/2010/main">
-                <a:solidFill>
-                  <a:srgbClr val="FFFFFF"/>
-                </a:solidFill>
-              </a14:hiddenFill>
-            </a:ext>
-          </a:extLst>
-        </p:spPr>
-      </p:pic>
-      <p:sp>
-        <p:nvSpPr>
-          <p:cNvPr id="3" name="TextBox 2">
-            <a:extLst>
-              <a:ext uri="{FF2B5EF4-FFF2-40B4-BE49-F238E27FC236}">
-                <a16:creationId xmlns:a16="http://schemas.microsoft.com/office/drawing/2014/main" id="{B931521C-8D09-4634-A177-CE683FD68DFA}"/>
-              </a:ext>
-            </a:extLst>
-          </p:cNvPr>
-          <p:cNvSpPr txBox="1"/>
-          <p:nvPr/>
-        </p:nvSpPr>
-        <p:spPr>
-          <a:xfrm>
-            <a:off x="3276600" y="1068348"/>
-            <a:ext cx="2362200" cy="1107996"/>
-          </a:xfrm>
-          <a:prstGeom prst="rect">
-            <a:avLst/>
-          </a:prstGeom>
-          <a:noFill/>
-        </p:spPr>
-        <p:txBody>
-          <a:bodyPr wrap="square" rtlCol="0">
-            <a:spAutoFit/>
-          </a:bodyPr>
-          <a:lstStyle/>
-          <a:p>
-            <a:pPr marL="285750" indent="-285750">
-              <a:buFont typeface="Arial" panose="020B0604020202020204" pitchFamily="34" charset="0"/>
-              <a:buChar char="•"/>
-            </a:pPr>
-            <a:r>
-              <a:rPr lang="en-US" sz="1200" dirty="0"/>
-              <a:t>Bitterness generally rises with alcohol content, however they are not clearly dependent on one another</a:t>
-            </a:r>
-          </a:p>
-          <a:p>
-            <a:pPr marL="285750" indent="-285750">
-              <a:buFont typeface="Arial" panose="020B0604020202020204" pitchFamily="34" charset="0"/>
-              <a:buChar char="•"/>
-            </a:pPr>
-            <a:endParaRPr lang="en-US" dirty="0"/>
-          </a:p>
-        </p:txBody>
-      </p:sp>
-    </p:spTree>
-    <p:extLst>
-      <p:ext uri="{BB962C8B-B14F-4D97-AF65-F5344CB8AC3E}">
-        <p14:creationId xmlns:p14="http://schemas.microsoft.com/office/powerpoint/2010/main" val="4003640020"/>
       </p:ext>
     </p:extLst>
   </p:cSld>

</xml_diff>

<commit_message>
Updated Missing Values Slide
Updated Missing Values Slide
</commit_message>
<xml_diff>
--- a/DS6306 Group Project 1 v2.pptx
+++ b/DS6306 Group Project 1 v2.pptx
@@ -1649,8 +1649,13 @@
           <a:p>
             <a:r>
               <a:rPr lang="en-US" dirty="0"/>
-              <a:t>Speaker: Rajesh</a:t>
+              <a:t>Speaker</a:t>
             </a:r>
+            <a:r>
+              <a:rPr lang="en-US"/>
+              <a:t>: Rajesh </a:t>
+            </a:r>
+            <a:endParaRPr lang="en-US" dirty="0"/>
           </a:p>
           <a:p>
             <a:r>

</xml_diff>